<commit_message>
agregado origenes, portada y oop
</commit_message>
<xml_diff>
--- a/Java_English - Alberto.pptx
+++ b/Java_English - Alberto.pptx
@@ -5,17 +5,20 @@
     <p:sldMasterId id="2147483648" r:id="rId1"/>
   </p:sldMasterIdLst>
   <p:notesMasterIdLst>
-    <p:notesMasterId r:id="rId7"/>
+    <p:notesMasterId r:id="rId10"/>
   </p:notesMasterIdLst>
   <p:handoutMasterIdLst>
-    <p:handoutMasterId r:id="rId8"/>
+    <p:handoutMasterId r:id="rId11"/>
   </p:handoutMasterIdLst>
   <p:sldIdLst>
-    <p:sldId id="263" r:id="rId2"/>
-    <p:sldId id="264" r:id="rId3"/>
-    <p:sldId id="262" r:id="rId4"/>
-    <p:sldId id="265" r:id="rId5"/>
-    <p:sldId id="260" r:id="rId6"/>
+    <p:sldId id="256" r:id="rId2"/>
+    <p:sldId id="257" r:id="rId3"/>
+    <p:sldId id="266" r:id="rId4"/>
+    <p:sldId id="267" r:id="rId5"/>
+    <p:sldId id="264" r:id="rId6"/>
+    <p:sldId id="262" r:id="rId7"/>
+    <p:sldId id="265" r:id="rId8"/>
+    <p:sldId id="260" r:id="rId9"/>
   </p:sldIdLst>
   <p:sldSz cx="12192000" cy="6858000"/>
   <p:notesSz cx="6858000" cy="9144000"/>
@@ -160,7 +163,7 @@
           <p:cNvPr id="2" name="Marcador de encabezado 1">
             <a:extLst>
               <a:ext uri="{FF2B5EF4-FFF2-40B4-BE49-F238E27FC236}">
-                <a16:creationId xmlns:a16="http://schemas.microsoft.com/office/drawing/2014/main" xmlns="" id="{6A13C77B-70EC-427E-91BC-F24E456C4485}"/>
+                <a16:creationId xmlns:a16="http://schemas.microsoft.com/office/drawing/2014/main" id="{6A13C77B-70EC-427E-91BC-F24E456C4485}"/>
               </a:ext>
             </a:extLst>
           </p:cNvPr>
@@ -197,7 +200,7 @@
           <p:cNvPr id="3" name="Marcador de fecha 2">
             <a:extLst>
               <a:ext uri="{FF2B5EF4-FFF2-40B4-BE49-F238E27FC236}">
-                <a16:creationId xmlns:a16="http://schemas.microsoft.com/office/drawing/2014/main" xmlns="" id="{ECF03710-4D21-4187-AF6A-CD406EC8A5DC}"/>
+                <a16:creationId xmlns:a16="http://schemas.microsoft.com/office/drawing/2014/main" id="{ECF03710-4D21-4187-AF6A-CD406EC8A5DC}"/>
               </a:ext>
             </a:extLst>
           </p:cNvPr>
@@ -227,7 +230,7 @@
           <a:p>
             <a:fld id="{38842C34-3ADE-4FD4-9C00-531CE095E69B}" type="datetimeFigureOut">
               <a:rPr lang="es-ES" smtClean="0"/>
-              <a:t>25/11/2023</a:t>
+              <a:t>26/11/2023</a:t>
             </a:fld>
             <a:endParaRPr lang="es-ES"/>
           </a:p>
@@ -238,7 +241,7 @@
           <p:cNvPr id="4" name="Marcador de pie de página 3">
             <a:extLst>
               <a:ext uri="{FF2B5EF4-FFF2-40B4-BE49-F238E27FC236}">
-                <a16:creationId xmlns:a16="http://schemas.microsoft.com/office/drawing/2014/main" xmlns="" id="{812E1D92-BF6C-48F2-B7D3-811E8193907E}"/>
+                <a16:creationId xmlns:a16="http://schemas.microsoft.com/office/drawing/2014/main" id="{812E1D92-BF6C-48F2-B7D3-811E8193907E}"/>
               </a:ext>
             </a:extLst>
           </p:cNvPr>
@@ -275,7 +278,7 @@
           <p:cNvPr id="5" name="Marcador de número de diapositiva 4">
             <a:extLst>
               <a:ext uri="{FF2B5EF4-FFF2-40B4-BE49-F238E27FC236}">
-                <a16:creationId xmlns:a16="http://schemas.microsoft.com/office/drawing/2014/main" xmlns="" id="{E663B743-1197-4765-A3A6-7FD28E7E0383}"/>
+                <a16:creationId xmlns:a16="http://schemas.microsoft.com/office/drawing/2014/main" id="{E663B743-1197-4765-A3A6-7FD28E7E0383}"/>
               </a:ext>
             </a:extLst>
           </p:cNvPr>
@@ -405,7 +408,7 @@
           <a:p>
             <a:fld id="{53B32EAB-D150-4754-B6B6-D45B2A209BBC}" type="datetimeFigureOut">
               <a:rPr lang="es-ES" noProof="0" smtClean="0"/>
-              <a:t>25/11/2023</a:t>
+              <a:t>26/11/2023</a:t>
             </a:fld>
             <a:endParaRPr lang="es-ES" noProof="0"/>
           </a:p>
@@ -673,6 +676,90 @@
 </p:notesMaster>
 </file>
 
+<file path=ppt/notesSlides/notesSlide1.xml><?xml version="1.0" encoding="utf-8"?>
+<p:notes xmlns:a="http://schemas.openxmlformats.org/drawingml/2006/main" xmlns:r="http://schemas.openxmlformats.org/officeDocument/2006/relationships" xmlns:p="http://schemas.openxmlformats.org/presentationml/2006/main">
+  <p:cSld>
+    <p:spTree>
+      <p:nvGrpSpPr>
+        <p:cNvPr id="1" name=""/>
+        <p:cNvGrpSpPr/>
+        <p:nvPr/>
+      </p:nvGrpSpPr>
+      <p:grpSpPr>
+        <a:xfrm>
+          <a:off x="0" y="0"/>
+          <a:ext cx="0" cy="0"/>
+          <a:chOff x="0" y="0"/>
+          <a:chExt cx="0" cy="0"/>
+        </a:xfrm>
+      </p:grpSpPr>
+      <p:sp>
+        <p:nvSpPr>
+          <p:cNvPr id="2" name="Marcador de imagen de diapositiva 1"/>
+          <p:cNvSpPr>
+            <a:spLocks noGrp="1" noRot="1" noChangeAspect="1"/>
+          </p:cNvSpPr>
+          <p:nvPr>
+            <p:ph type="sldImg"/>
+          </p:nvPr>
+        </p:nvSpPr>
+        <p:spPr/>
+      </p:sp>
+      <p:sp>
+        <p:nvSpPr>
+          <p:cNvPr id="3" name="Marcador de notas 2"/>
+          <p:cNvSpPr>
+            <a:spLocks noGrp="1"/>
+          </p:cNvSpPr>
+          <p:nvPr>
+            <p:ph type="body" idx="1"/>
+          </p:nvPr>
+        </p:nvSpPr>
+        <p:spPr/>
+        <p:txBody>
+          <a:bodyPr/>
+          <a:lstStyle/>
+          <a:p>
+            <a:endParaRPr lang="es-ES"/>
+          </a:p>
+        </p:txBody>
+      </p:sp>
+      <p:sp>
+        <p:nvSpPr>
+          <p:cNvPr id="4" name="Marcador de número de diapositiva 3"/>
+          <p:cNvSpPr>
+            <a:spLocks noGrp="1"/>
+          </p:cNvSpPr>
+          <p:nvPr>
+            <p:ph type="sldNum" sz="quarter" idx="5"/>
+          </p:nvPr>
+        </p:nvSpPr>
+        <p:spPr/>
+        <p:txBody>
+          <a:bodyPr/>
+          <a:lstStyle/>
+          <a:p>
+            <a:fld id="{369A8F9B-0A3B-447F-9BEC-7A5FC4ECC70F}" type="slidenum">
+              <a:rPr lang="es-ES" smtClean="0"/>
+              <a:t>1</a:t>
+            </a:fld>
+            <a:endParaRPr lang="es-ES"/>
+          </a:p>
+        </p:txBody>
+      </p:sp>
+    </p:spTree>
+    <p:extLst>
+      <p:ext uri="{BB962C8B-B14F-4D97-AF65-F5344CB8AC3E}">
+        <p14:creationId xmlns:p14="http://schemas.microsoft.com/office/powerpoint/2010/main" val="1125873499"/>
+      </p:ext>
+    </p:extLst>
+  </p:cSld>
+  <p:clrMapOvr>
+    <a:masterClrMapping/>
+  </p:clrMapOvr>
+</p:notes>
+</file>
+
 <file path=ppt/slideLayouts/slideLayout1.xml><?xml version="1.0" encoding="utf-8"?>
 <p:sldLayout xmlns:a="http://schemas.openxmlformats.org/drawingml/2006/main" xmlns:r="http://schemas.openxmlformats.org/officeDocument/2006/relationships" xmlns:p="http://schemas.openxmlformats.org/presentationml/2006/main" showMasterSp="0" type="title" preserve="1">
   <p:cSld name="Diapositiva de título">
@@ -723,7 +810,7 @@
           <a:noFill/>
           <a:extLst>
             <a:ext uri="{909E8E84-426E-40dd-AFC4-6F175D3DCCD1}">
-              <a14:hiddenFill xmlns:a14="http://schemas.microsoft.com/office/drawing/2010/main" xmlns="">
+              <a14:hiddenFill xmlns="" xmlns:a14="http://schemas.microsoft.com/office/drawing/2010/main">
                 <a:solidFill>
                   <a:srgbClr val="FFFFFF"/>
                 </a:solidFill>
@@ -783,7 +870,7 @@
             </a:ln>
             <a:extLst>
               <a:ext uri="{91240B29-F687-4f45-9708-019B960494DF}">
-                <a14:hiddenLine xmlns:a14="http://schemas.microsoft.com/office/drawing/2010/main" xmlns="" w="9525">
+                <a14:hiddenLine xmlns="" xmlns:a14="http://schemas.microsoft.com/office/drawing/2010/main" w="9525">
                   <a:solidFill>
                     <a:srgbClr val="000000"/>
                   </a:solidFill>
@@ -873,7 +960,7 @@
             </a:ln>
             <a:extLst>
               <a:ext uri="{91240B29-F687-4f45-9708-019B960494DF}">
-                <a14:hiddenLine xmlns:a14="http://schemas.microsoft.com/office/drawing/2010/main" xmlns="" w="9525">
+                <a14:hiddenLine xmlns="" xmlns:a14="http://schemas.microsoft.com/office/drawing/2010/main" w="9525">
                   <a:solidFill>
                     <a:srgbClr val="000000"/>
                   </a:solidFill>
@@ -963,7 +1050,7 @@
             </a:ln>
             <a:extLst>
               <a:ext uri="{91240B29-F687-4f45-9708-019B960494DF}">
-                <a14:hiddenLine xmlns:a14="http://schemas.microsoft.com/office/drawing/2010/main" xmlns="" w="9525">
+                <a14:hiddenLine xmlns="" xmlns:a14="http://schemas.microsoft.com/office/drawing/2010/main" w="9525">
                   <a:solidFill>
                     <a:srgbClr val="000000"/>
                   </a:solidFill>
@@ -997,7 +1084,7 @@
             </a:ln>
             <a:extLst>
               <a:ext uri="{91240B29-F687-4f45-9708-019B960494DF}">
-                <a14:hiddenLine xmlns:a14="http://schemas.microsoft.com/office/drawing/2010/main" xmlns="" w="9525">
+                <a14:hiddenLine xmlns="" xmlns:a14="http://schemas.microsoft.com/office/drawing/2010/main" w="9525">
                   <a:solidFill>
                     <a:srgbClr val="000000"/>
                   </a:solidFill>
@@ -1087,7 +1174,7 @@
             </a:ln>
             <a:extLst>
               <a:ext uri="{91240B29-F687-4f45-9708-019B960494DF}">
-                <a14:hiddenLine xmlns:a14="http://schemas.microsoft.com/office/drawing/2010/main" xmlns="" w="9525">
+                <a14:hiddenLine xmlns="" xmlns:a14="http://schemas.microsoft.com/office/drawing/2010/main" w="9525">
                   <a:solidFill>
                     <a:srgbClr val="000000"/>
                   </a:solidFill>
@@ -1149,7 +1236,7 @@
             </a:ln>
             <a:extLst>
               <a:ext uri="{91240B29-F687-4f45-9708-019B960494DF}">
-                <a14:hiddenLine xmlns:a14="http://schemas.microsoft.com/office/drawing/2010/main" xmlns="" w="9525">
+                <a14:hiddenLine xmlns="" xmlns:a14="http://schemas.microsoft.com/office/drawing/2010/main" w="9525">
                   <a:solidFill>
                     <a:srgbClr val="000000"/>
                   </a:solidFill>
@@ -1211,7 +1298,7 @@
             </a:ln>
             <a:extLst>
               <a:ext uri="{91240B29-F687-4f45-9708-019B960494DF}">
-                <a14:hiddenLine xmlns:a14="http://schemas.microsoft.com/office/drawing/2010/main" xmlns="" w="9525">
+                <a14:hiddenLine xmlns="" xmlns:a14="http://schemas.microsoft.com/office/drawing/2010/main" w="9525">
                   <a:solidFill>
                     <a:srgbClr val="000000"/>
                   </a:solidFill>
@@ -1301,7 +1388,7 @@
             </a:ln>
             <a:extLst>
               <a:ext uri="{91240B29-F687-4f45-9708-019B960494DF}">
-                <a14:hiddenLine xmlns:a14="http://schemas.microsoft.com/office/drawing/2010/main" xmlns="" w="9525">
+                <a14:hiddenLine xmlns="" xmlns:a14="http://schemas.microsoft.com/office/drawing/2010/main" w="9525">
                   <a:solidFill>
                     <a:srgbClr val="000000"/>
                   </a:solidFill>
@@ -1363,7 +1450,7 @@
             </a:ln>
             <a:extLst>
               <a:ext uri="{91240B29-F687-4f45-9708-019B960494DF}">
-                <a14:hiddenLine xmlns:a14="http://schemas.microsoft.com/office/drawing/2010/main" xmlns="" w="9525">
+                <a14:hiddenLine xmlns="" xmlns:a14="http://schemas.microsoft.com/office/drawing/2010/main" w="9525">
                   <a:solidFill>
                     <a:srgbClr val="000000"/>
                   </a:solidFill>
@@ -1425,7 +1512,7 @@
             </a:ln>
             <a:extLst>
               <a:ext uri="{91240B29-F687-4f45-9708-019B960494DF}">
-                <a14:hiddenLine xmlns:a14="http://schemas.microsoft.com/office/drawing/2010/main" xmlns="" w="9525">
+                <a14:hiddenLine xmlns="" xmlns:a14="http://schemas.microsoft.com/office/drawing/2010/main" w="9525">
                   <a:solidFill>
                     <a:srgbClr val="000000"/>
                   </a:solidFill>
@@ -1515,7 +1602,7 @@
             </a:ln>
             <a:extLst>
               <a:ext uri="{91240B29-F687-4f45-9708-019B960494DF}">
-                <a14:hiddenLine xmlns:a14="http://schemas.microsoft.com/office/drawing/2010/main" xmlns="" w="9525">
+                <a14:hiddenLine xmlns="" xmlns:a14="http://schemas.microsoft.com/office/drawing/2010/main" w="9525">
                   <a:solidFill>
                     <a:srgbClr val="000000"/>
                   </a:solidFill>
@@ -1605,7 +1692,7 @@
             </a:ln>
             <a:extLst>
               <a:ext uri="{91240B29-F687-4f45-9708-019B960494DF}">
-                <a14:hiddenLine xmlns:a14="http://schemas.microsoft.com/office/drawing/2010/main" xmlns="" w="9525">
+                <a14:hiddenLine xmlns="" xmlns:a14="http://schemas.microsoft.com/office/drawing/2010/main" w="9525">
                   <a:solidFill>
                     <a:srgbClr val="000000"/>
                   </a:solidFill>
@@ -1667,7 +1754,7 @@
             </a:ln>
             <a:extLst>
               <a:ext uri="{91240B29-F687-4f45-9708-019B960494DF}">
-                <a14:hiddenLine xmlns:a14="http://schemas.microsoft.com/office/drawing/2010/main" xmlns="" w="9525">
+                <a14:hiddenLine xmlns="" xmlns:a14="http://schemas.microsoft.com/office/drawing/2010/main" w="9525">
                   <a:solidFill>
                     <a:srgbClr val="000000"/>
                   </a:solidFill>
@@ -1777,7 +1864,7 @@
             </a:ln>
             <a:extLst>
               <a:ext uri="{91240B29-F687-4f45-9708-019B960494DF}">
-                <a14:hiddenLine xmlns:a14="http://schemas.microsoft.com/office/drawing/2010/main" xmlns="" w="9525">
+                <a14:hiddenLine xmlns="" xmlns:a14="http://schemas.microsoft.com/office/drawing/2010/main" w="9525">
                   <a:solidFill>
                     <a:srgbClr val="000000"/>
                   </a:solidFill>
@@ -1839,7 +1926,7 @@
             </a:ln>
             <a:extLst>
               <a:ext uri="{91240B29-F687-4f45-9708-019B960494DF}">
-                <a14:hiddenLine xmlns:a14="http://schemas.microsoft.com/office/drawing/2010/main" xmlns="" w="9525">
+                <a14:hiddenLine xmlns="" xmlns:a14="http://schemas.microsoft.com/office/drawing/2010/main" w="9525">
                   <a:solidFill>
                     <a:srgbClr val="000000"/>
                   </a:solidFill>
@@ -1929,7 +2016,7 @@
             </a:ln>
             <a:extLst>
               <a:ext uri="{91240B29-F687-4f45-9708-019B960494DF}">
-                <a14:hiddenLine xmlns:a14="http://schemas.microsoft.com/office/drawing/2010/main" xmlns="" w="9525">
+                <a14:hiddenLine xmlns="" xmlns:a14="http://schemas.microsoft.com/office/drawing/2010/main" w="9525">
                   <a:solidFill>
                     <a:srgbClr val="000000"/>
                   </a:solidFill>
@@ -2019,7 +2106,7 @@
             </a:ln>
             <a:extLst>
               <a:ext uri="{91240B29-F687-4f45-9708-019B960494DF}">
-                <a14:hiddenLine xmlns:a14="http://schemas.microsoft.com/office/drawing/2010/main" xmlns="" w="9525">
+                <a14:hiddenLine xmlns="" xmlns:a14="http://schemas.microsoft.com/office/drawing/2010/main" w="9525">
                   <a:solidFill>
                     <a:srgbClr val="000000"/>
                   </a:solidFill>
@@ -2081,7 +2168,7 @@
             </a:ln>
             <a:extLst>
               <a:ext uri="{91240B29-F687-4f45-9708-019B960494DF}">
-                <a14:hiddenLine xmlns:a14="http://schemas.microsoft.com/office/drawing/2010/main" xmlns="" w="9525">
+                <a14:hiddenLine xmlns="" xmlns:a14="http://schemas.microsoft.com/office/drawing/2010/main" w="9525">
                   <a:solidFill>
                     <a:srgbClr val="000000"/>
                   </a:solidFill>
@@ -2171,7 +2258,7 @@
             </a:ln>
             <a:extLst>
               <a:ext uri="{91240B29-F687-4f45-9708-019B960494DF}">
-                <a14:hiddenLine xmlns:a14="http://schemas.microsoft.com/office/drawing/2010/main" xmlns="" w="9525">
+                <a14:hiddenLine xmlns="" xmlns:a14="http://schemas.microsoft.com/office/drawing/2010/main" w="9525">
                   <a:solidFill>
                     <a:srgbClr val="000000"/>
                   </a:solidFill>
@@ -2261,7 +2348,7 @@
             </a:ln>
             <a:extLst>
               <a:ext uri="{91240B29-F687-4f45-9708-019B960494DF}">
-                <a14:hiddenLine xmlns:a14="http://schemas.microsoft.com/office/drawing/2010/main" xmlns="" w="9525">
+                <a14:hiddenLine xmlns="" xmlns:a14="http://schemas.microsoft.com/office/drawing/2010/main" w="9525">
                   <a:solidFill>
                     <a:srgbClr val="000000"/>
                   </a:solidFill>
@@ -2317,7 +2404,7 @@
             </a:ln>
             <a:extLst>
               <a:ext uri="{91240B29-F687-4f45-9708-019B960494DF}">
-                <a14:hiddenLine xmlns:a14="http://schemas.microsoft.com/office/drawing/2010/main" xmlns="" w="9525">
+                <a14:hiddenLine xmlns="" xmlns:a14="http://schemas.microsoft.com/office/drawing/2010/main" w="9525">
                   <a:solidFill>
                     <a:srgbClr val="000000"/>
                   </a:solidFill>
@@ -2407,7 +2494,7 @@
             </a:ln>
             <a:extLst>
               <a:ext uri="{91240B29-F687-4f45-9708-019B960494DF}">
-                <a14:hiddenLine xmlns:a14="http://schemas.microsoft.com/office/drawing/2010/main" xmlns="" w="9525">
+                <a14:hiddenLine xmlns="" xmlns:a14="http://schemas.microsoft.com/office/drawing/2010/main" w="9525">
                   <a:solidFill>
                     <a:srgbClr val="000000"/>
                   </a:solidFill>
@@ -2463,7 +2550,7 @@
             </a:ln>
             <a:extLst>
               <a:ext uri="{91240B29-F687-4f45-9708-019B960494DF}">
-                <a14:hiddenLine xmlns:a14="http://schemas.microsoft.com/office/drawing/2010/main" xmlns="" w="9525">
+                <a14:hiddenLine xmlns="" xmlns:a14="http://schemas.microsoft.com/office/drawing/2010/main" w="9525">
                   <a:solidFill>
                     <a:srgbClr val="000000"/>
                   </a:solidFill>
@@ -2553,7 +2640,7 @@
             </a:ln>
             <a:extLst>
               <a:ext uri="{91240B29-F687-4f45-9708-019B960494DF}">
-                <a14:hiddenLine xmlns:a14="http://schemas.microsoft.com/office/drawing/2010/main" xmlns="" w="9525">
+                <a14:hiddenLine xmlns="" xmlns:a14="http://schemas.microsoft.com/office/drawing/2010/main" w="9525">
                   <a:solidFill>
                     <a:srgbClr val="000000"/>
                   </a:solidFill>
@@ -2621,7 +2708,7 @@
             </a:ln>
             <a:extLst>
               <a:ext uri="{91240B29-F687-4f45-9708-019B960494DF}">
-                <a14:hiddenLine xmlns:a14="http://schemas.microsoft.com/office/drawing/2010/main" xmlns="" w="9525">
+                <a14:hiddenLine xmlns="" xmlns:a14="http://schemas.microsoft.com/office/drawing/2010/main" w="9525">
                   <a:solidFill>
                     <a:srgbClr val="000000"/>
                   </a:solidFill>
@@ -2711,7 +2798,7 @@
             </a:ln>
             <a:extLst>
               <a:ext uri="{91240B29-F687-4f45-9708-019B960494DF}">
-                <a14:hiddenLine xmlns:a14="http://schemas.microsoft.com/office/drawing/2010/main" xmlns="" w="9525">
+                <a14:hiddenLine xmlns="" xmlns:a14="http://schemas.microsoft.com/office/drawing/2010/main" w="9525">
                   <a:solidFill>
                     <a:srgbClr val="000000"/>
                   </a:solidFill>
@@ -2779,7 +2866,7 @@
             </a:ln>
             <a:extLst>
               <a:ext uri="{91240B29-F687-4f45-9708-019B960494DF}">
-                <a14:hiddenLine xmlns:a14="http://schemas.microsoft.com/office/drawing/2010/main" xmlns="" w="9525">
+                <a14:hiddenLine xmlns="" xmlns:a14="http://schemas.microsoft.com/office/drawing/2010/main" w="9525">
                   <a:solidFill>
                     <a:srgbClr val="000000"/>
                   </a:solidFill>
@@ -2869,7 +2956,7 @@
             </a:ln>
             <a:extLst>
               <a:ext uri="{91240B29-F687-4f45-9708-019B960494DF}">
-                <a14:hiddenLine xmlns:a14="http://schemas.microsoft.com/office/drawing/2010/main" xmlns="" w="9525">
+                <a14:hiddenLine xmlns="" xmlns:a14="http://schemas.microsoft.com/office/drawing/2010/main" w="9525">
                   <a:solidFill>
                     <a:srgbClr val="000000"/>
                   </a:solidFill>
@@ -2903,7 +2990,7 @@
             </a:ln>
             <a:extLst>
               <a:ext uri="{91240B29-F687-4f45-9708-019B960494DF}">
-                <a14:hiddenLine xmlns:a14="http://schemas.microsoft.com/office/drawing/2010/main" xmlns="" w="9525">
+                <a14:hiddenLine xmlns="" xmlns:a14="http://schemas.microsoft.com/office/drawing/2010/main" w="9525">
                   <a:solidFill>
                     <a:srgbClr val="000000"/>
                   </a:solidFill>
@@ -2993,7 +3080,7 @@
             </a:ln>
             <a:extLst>
               <a:ext uri="{91240B29-F687-4f45-9708-019B960494DF}">
-                <a14:hiddenLine xmlns:a14="http://schemas.microsoft.com/office/drawing/2010/main" xmlns="" w="9525">
+                <a14:hiddenLine xmlns="" xmlns:a14="http://schemas.microsoft.com/office/drawing/2010/main" w="9525">
                   <a:solidFill>
                     <a:srgbClr val="000000"/>
                   </a:solidFill>
@@ -3055,7 +3142,7 @@
             </a:ln>
             <a:extLst>
               <a:ext uri="{91240B29-F687-4f45-9708-019B960494DF}">
-                <a14:hiddenLine xmlns:a14="http://schemas.microsoft.com/office/drawing/2010/main" xmlns="" w="9525">
+                <a14:hiddenLine xmlns="" xmlns:a14="http://schemas.microsoft.com/office/drawing/2010/main" w="9525">
                   <a:solidFill>
                     <a:srgbClr val="000000"/>
                   </a:solidFill>
@@ -3117,7 +3204,7 @@
             </a:ln>
             <a:extLst>
               <a:ext uri="{91240B29-F687-4f45-9708-019B960494DF}">
-                <a14:hiddenLine xmlns:a14="http://schemas.microsoft.com/office/drawing/2010/main" xmlns="" w="9525">
+                <a14:hiddenLine xmlns="" xmlns:a14="http://schemas.microsoft.com/office/drawing/2010/main" w="9525">
                   <a:solidFill>
                     <a:srgbClr val="000000"/>
                   </a:solidFill>
@@ -3207,7 +3294,7 @@
             </a:ln>
             <a:extLst>
               <a:ext uri="{91240B29-F687-4f45-9708-019B960494DF}">
-                <a14:hiddenLine xmlns:a14="http://schemas.microsoft.com/office/drawing/2010/main" xmlns="" w="9525">
+                <a14:hiddenLine xmlns="" xmlns:a14="http://schemas.microsoft.com/office/drawing/2010/main" w="9525">
                   <a:solidFill>
                     <a:srgbClr val="000000"/>
                   </a:solidFill>
@@ -3275,7 +3362,7 @@
             </a:ln>
             <a:extLst>
               <a:ext uri="{91240B29-F687-4f45-9708-019B960494DF}">
-                <a14:hiddenLine xmlns:a14="http://schemas.microsoft.com/office/drawing/2010/main" xmlns="" w="9525">
+                <a14:hiddenLine xmlns="" xmlns:a14="http://schemas.microsoft.com/office/drawing/2010/main" w="9525">
                   <a:solidFill>
                     <a:srgbClr val="000000"/>
                   </a:solidFill>
@@ -3337,7 +3424,7 @@
             </a:ln>
             <a:extLst>
               <a:ext uri="{91240B29-F687-4f45-9708-019B960494DF}">
-                <a14:hiddenLine xmlns:a14="http://schemas.microsoft.com/office/drawing/2010/main" xmlns="" w="9525">
+                <a14:hiddenLine xmlns="" xmlns:a14="http://schemas.microsoft.com/office/drawing/2010/main" w="9525">
                   <a:solidFill>
                     <a:srgbClr val="000000"/>
                   </a:solidFill>
@@ -3427,7 +3514,7 @@
             </a:ln>
             <a:extLst>
               <a:ext uri="{91240B29-F687-4f45-9708-019B960494DF}">
-                <a14:hiddenLine xmlns:a14="http://schemas.microsoft.com/office/drawing/2010/main" xmlns="" w="9525">
+                <a14:hiddenLine xmlns="" xmlns:a14="http://schemas.microsoft.com/office/drawing/2010/main" w="9525">
                   <a:solidFill>
                     <a:srgbClr val="000000"/>
                   </a:solidFill>
@@ -3489,7 +3576,7 @@
             </a:ln>
             <a:extLst>
               <a:ext uri="{91240B29-F687-4f45-9708-019B960494DF}">
-                <a14:hiddenLine xmlns:a14="http://schemas.microsoft.com/office/drawing/2010/main" xmlns="" w="9525">
+                <a14:hiddenLine xmlns="" xmlns:a14="http://schemas.microsoft.com/office/drawing/2010/main" w="9525">
                   <a:solidFill>
                     <a:srgbClr val="000000"/>
                   </a:solidFill>
@@ -3579,7 +3666,7 @@
             </a:ln>
             <a:extLst>
               <a:ext uri="{91240B29-F687-4f45-9708-019B960494DF}">
-                <a14:hiddenLine xmlns:a14="http://schemas.microsoft.com/office/drawing/2010/main" xmlns="" w="9525">
+                <a14:hiddenLine xmlns="" xmlns:a14="http://schemas.microsoft.com/office/drawing/2010/main" w="9525">
                   <a:solidFill>
                     <a:srgbClr val="000000"/>
                   </a:solidFill>
@@ -3641,7 +3728,7 @@
             </a:ln>
             <a:extLst>
               <a:ext uri="{91240B29-F687-4f45-9708-019B960494DF}">
-                <a14:hiddenLine xmlns:a14="http://schemas.microsoft.com/office/drawing/2010/main" xmlns="" w="9525">
+                <a14:hiddenLine xmlns="" xmlns:a14="http://schemas.microsoft.com/office/drawing/2010/main" w="9525">
                   <a:solidFill>
                     <a:srgbClr val="000000"/>
                   </a:solidFill>
@@ -3731,7 +3818,7 @@
             </a:ln>
             <a:extLst>
               <a:ext uri="{91240B29-F687-4f45-9708-019B960494DF}">
-                <a14:hiddenLine xmlns:a14="http://schemas.microsoft.com/office/drawing/2010/main" xmlns="" w="9525">
+                <a14:hiddenLine xmlns="" xmlns:a14="http://schemas.microsoft.com/office/drawing/2010/main" w="9525">
                   <a:solidFill>
                     <a:srgbClr val="000000"/>
                   </a:solidFill>
@@ -3765,7 +3852,7 @@
             </a:ln>
             <a:extLst>
               <a:ext uri="{91240B29-F687-4f45-9708-019B960494DF}">
-                <a14:hiddenLine xmlns:a14="http://schemas.microsoft.com/office/drawing/2010/main" xmlns="" w="9525">
+                <a14:hiddenLine xmlns="" xmlns:a14="http://schemas.microsoft.com/office/drawing/2010/main" w="9525">
                   <a:solidFill>
                     <a:srgbClr val="000000"/>
                   </a:solidFill>
@@ -3830,7 +3917,7 @@
             </a:ln>
             <a:extLst>
               <a:ext uri="{91240B29-F687-4f45-9708-019B960494DF}">
-                <a14:hiddenLine xmlns:a14="http://schemas.microsoft.com/office/drawing/2010/main" xmlns="" w="9525">
+                <a14:hiddenLine xmlns="" xmlns:a14="http://schemas.microsoft.com/office/drawing/2010/main" w="9525">
                   <a:solidFill>
                     <a:srgbClr val="000000"/>
                   </a:solidFill>
@@ -3920,7 +4007,7 @@
             </a:ln>
             <a:extLst>
               <a:ext uri="{91240B29-F687-4f45-9708-019B960494DF}">
-                <a14:hiddenLine xmlns:a14="http://schemas.microsoft.com/office/drawing/2010/main" xmlns="" w="9525">
+                <a14:hiddenLine xmlns="" xmlns:a14="http://schemas.microsoft.com/office/drawing/2010/main" w="9525">
                   <a:solidFill>
                     <a:srgbClr val="000000"/>
                   </a:solidFill>
@@ -3982,7 +4069,7 @@
             </a:ln>
             <a:extLst>
               <a:ext uri="{91240B29-F687-4f45-9708-019B960494DF}">
-                <a14:hiddenLine xmlns:a14="http://schemas.microsoft.com/office/drawing/2010/main" xmlns="" w="9525">
+                <a14:hiddenLine xmlns="" xmlns:a14="http://schemas.microsoft.com/office/drawing/2010/main" w="9525">
                   <a:solidFill>
                     <a:srgbClr val="000000"/>
                   </a:solidFill>
@@ -4072,7 +4159,7 @@
             </a:ln>
             <a:extLst>
               <a:ext uri="{91240B29-F687-4f45-9708-019B960494DF}">
-                <a14:hiddenLine xmlns:a14="http://schemas.microsoft.com/office/drawing/2010/main" xmlns="" w="9525">
+                <a14:hiddenLine xmlns="" xmlns:a14="http://schemas.microsoft.com/office/drawing/2010/main" w="9525">
                   <a:solidFill>
                     <a:srgbClr val="000000"/>
                   </a:solidFill>
@@ -4162,7 +4249,7 @@
             </a:ln>
             <a:extLst>
               <a:ext uri="{91240B29-F687-4f45-9708-019B960494DF}">
-                <a14:hiddenLine xmlns:a14="http://schemas.microsoft.com/office/drawing/2010/main" xmlns="" w="9525">
+                <a14:hiddenLine xmlns="" xmlns:a14="http://schemas.microsoft.com/office/drawing/2010/main" w="9525">
                   <a:solidFill>
                     <a:srgbClr val="000000"/>
                   </a:solidFill>
@@ -4227,7 +4314,7 @@
             </a:ln>
             <a:extLst>
               <a:ext uri="{91240B29-F687-4f45-9708-019B960494DF}">
-                <a14:hiddenLine xmlns:a14="http://schemas.microsoft.com/office/drawing/2010/main" xmlns="" w="9525">
+                <a14:hiddenLine xmlns="" xmlns:a14="http://schemas.microsoft.com/office/drawing/2010/main" w="9525">
                   <a:solidFill>
                     <a:srgbClr val="000000"/>
                   </a:solidFill>
@@ -4289,7 +4376,7 @@
             </a:ln>
             <a:extLst>
               <a:ext uri="{91240B29-F687-4f45-9708-019B960494DF}">
-                <a14:hiddenLine xmlns:a14="http://schemas.microsoft.com/office/drawing/2010/main" xmlns="" w="9525">
+                <a14:hiddenLine xmlns="" xmlns:a14="http://schemas.microsoft.com/office/drawing/2010/main" w="9525">
                   <a:solidFill>
                     <a:srgbClr val="000000"/>
                   </a:solidFill>
@@ -4379,7 +4466,7 @@
             </a:ln>
             <a:extLst>
               <a:ext uri="{91240B29-F687-4f45-9708-019B960494DF}">
-                <a14:hiddenLine xmlns:a14="http://schemas.microsoft.com/office/drawing/2010/main" xmlns="" w="9525">
+                <a14:hiddenLine xmlns="" xmlns:a14="http://schemas.microsoft.com/office/drawing/2010/main" w="9525">
                   <a:solidFill>
                     <a:srgbClr val="000000"/>
                   </a:solidFill>
@@ -4469,7 +4556,7 @@
             </a:ln>
             <a:extLst>
               <a:ext uri="{91240B29-F687-4f45-9708-019B960494DF}">
-                <a14:hiddenLine xmlns:a14="http://schemas.microsoft.com/office/drawing/2010/main" xmlns="" w="9525">
+                <a14:hiddenLine xmlns="" xmlns:a14="http://schemas.microsoft.com/office/drawing/2010/main" w="9525">
                   <a:solidFill>
                     <a:srgbClr val="000000"/>
                   </a:solidFill>
@@ -4531,7 +4618,7 @@
             </a:ln>
             <a:extLst>
               <a:ext uri="{91240B29-F687-4f45-9708-019B960494DF}">
-                <a14:hiddenLine xmlns:a14="http://schemas.microsoft.com/office/drawing/2010/main" xmlns="" w="9525">
+                <a14:hiddenLine xmlns="" xmlns:a14="http://schemas.microsoft.com/office/drawing/2010/main" w="9525">
                   <a:solidFill>
                     <a:srgbClr val="000000"/>
                   </a:solidFill>
@@ -4651,7 +4738,7 @@
             </a:ln>
             <a:extLst>
               <a:ext uri="{91240B29-F687-4f45-9708-019B960494DF}">
-                <a14:hiddenLine xmlns:a14="http://schemas.microsoft.com/office/drawing/2010/main" xmlns="" w="9525">
+                <a14:hiddenLine xmlns="" xmlns:a14="http://schemas.microsoft.com/office/drawing/2010/main" w="9525">
                   <a:solidFill>
                     <a:srgbClr val="000000"/>
                   </a:solidFill>
@@ -4719,7 +4806,7 @@
             </a:ln>
             <a:extLst>
               <a:ext uri="{91240B29-F687-4f45-9708-019B960494DF}">
-                <a14:hiddenLine xmlns:a14="http://schemas.microsoft.com/office/drawing/2010/main" xmlns="" w="9525">
+                <a14:hiddenLine xmlns="" xmlns:a14="http://schemas.microsoft.com/office/drawing/2010/main" w="9525">
                   <a:solidFill>
                     <a:srgbClr val="000000"/>
                   </a:solidFill>
@@ -4809,7 +4896,7 @@
             </a:ln>
             <a:extLst>
               <a:ext uri="{91240B29-F687-4f45-9708-019B960494DF}">
-                <a14:hiddenLine xmlns:a14="http://schemas.microsoft.com/office/drawing/2010/main" xmlns="" w="9525">
+                <a14:hiddenLine xmlns="" xmlns:a14="http://schemas.microsoft.com/office/drawing/2010/main" w="9525">
                   <a:solidFill>
                     <a:srgbClr val="000000"/>
                   </a:solidFill>
@@ -4950,7 +5037,7 @@
             <a:pPr rtl="0"/>
             <a:fld id="{53679892-51BE-4C79-9032-7473C572FBCD}" type="datetime1">
               <a:rPr lang="es-ES" noProof="0" smtClean="0"/>
-              <a:t>25/11/2023</a:t>
+              <a:t>26/11/2023</a:t>
             </a:fld>
             <a:endParaRPr lang="es-ES" noProof="0"/>
           </a:p>
@@ -5214,7 +5301,7 @@
             <a:pPr rtl="0"/>
             <a:fld id="{18425EA1-F648-4049-AD9A-F25DAA183EE8}" type="datetime1">
               <a:rPr lang="es-ES" noProof="0" smtClean="0"/>
-              <a:t>25/11/2023</a:t>
+              <a:t>26/11/2023</a:t>
             </a:fld>
             <a:endParaRPr lang="es-ES" noProof="0"/>
           </a:p>
@@ -5408,7 +5495,7 @@
             <a:pPr rtl="0"/>
             <a:fld id="{E944F516-20E2-4381-9952-C3E5172FC12A}" type="datetime1">
               <a:rPr lang="es-ES" noProof="0" smtClean="0"/>
-              <a:t>25/11/2023</a:t>
+              <a:t>26/11/2023</a:t>
             </a:fld>
             <a:endParaRPr lang="es-ES" noProof="0"/>
           </a:p>
@@ -5669,7 +5756,7 @@
             <a:pPr rtl="0"/>
             <a:fld id="{B8FDBEC5-D859-4363-9A3D-D04ACDBBDBC8}" type="datetime1">
               <a:rPr lang="es-ES" noProof="0" smtClean="0"/>
-              <a:t>25/11/2023</a:t>
+              <a:t>26/11/2023</a:t>
             </a:fld>
             <a:endParaRPr lang="es-ES" noProof="0"/>
           </a:p>
@@ -6101,7 +6188,7 @@
             <a:pPr rtl="0"/>
             <a:fld id="{10193AE0-C308-4E6C-A5C9-9E4366659949}" type="datetime1">
               <a:rPr lang="es-ES" noProof="0" smtClean="0"/>
-              <a:t>25/11/2023</a:t>
+              <a:t>26/11/2023</a:t>
             </a:fld>
             <a:endParaRPr lang="es-ES" noProof="0"/>
           </a:p>
@@ -6645,7 +6732,7 @@
             <a:pPr rtl="0"/>
             <a:fld id="{D976A01D-C322-4A99-A9B8-CB9EAAF3F796}" type="datetime1">
               <a:rPr lang="es-ES" noProof="0" smtClean="0"/>
-              <a:t>25/11/2023</a:t>
+              <a:t>26/11/2023</a:t>
             </a:fld>
             <a:endParaRPr lang="es-ES" noProof="0"/>
           </a:p>
@@ -7360,7 +7447,7 @@
             <a:pPr rtl="0"/>
             <a:fld id="{A15ADA64-BBA0-4B2E-B92A-F51B837322EC}" type="datetime1">
               <a:rPr lang="es-ES" noProof="0" smtClean="0"/>
-              <a:t>25/11/2023</a:t>
+              <a:t>26/11/2023</a:t>
             </a:fld>
             <a:endParaRPr lang="es-ES" noProof="0"/>
           </a:p>
@@ -7527,7 +7614,7 @@
             <a:pPr rtl="0"/>
             <a:fld id="{818752D6-1556-45C7-86E8-B146907A0AF6}" type="datetime1">
               <a:rPr lang="es-ES" noProof="0" smtClean="0"/>
-              <a:t>25/11/2023</a:t>
+              <a:t>26/11/2023</a:t>
             </a:fld>
             <a:endParaRPr lang="es-ES" noProof="0"/>
           </a:p>
@@ -7704,7 +7791,7 @@
             <a:pPr rtl="0"/>
             <a:fld id="{1B8F7CEA-13C7-4FEA-8C1A-0A5383197599}" type="datetime1">
               <a:rPr lang="es-ES" noProof="0" smtClean="0"/>
-              <a:t>25/11/2023</a:t>
+              <a:t>26/11/2023</a:t>
             </a:fld>
             <a:endParaRPr lang="es-ES" noProof="0"/>
           </a:p>
@@ -7871,7 +7958,7 @@
             <a:pPr rtl="0"/>
             <a:fld id="{AF097B57-B72F-420B-A8B3-006069A971F8}" type="datetime1">
               <a:rPr lang="es-ES" noProof="0" smtClean="0"/>
-              <a:t>25/11/2023</a:t>
+              <a:t>26/11/2023</a:t>
             </a:fld>
             <a:endParaRPr lang="es-ES" noProof="0"/>
           </a:p>
@@ -8119,7 +8206,7 @@
             <a:pPr rtl="0"/>
             <a:fld id="{E9B8A8E5-B735-43D5-B8A8-F9364991DBAE}" type="datetime1">
               <a:rPr lang="es-ES" noProof="0" smtClean="0"/>
-              <a:t>25/11/2023</a:t>
+              <a:t>26/11/2023</a:t>
             </a:fld>
             <a:endParaRPr lang="es-ES" noProof="0"/>
           </a:p>
@@ -8347,7 +8434,7 @@
             <a:pPr rtl="0"/>
             <a:fld id="{89C64DD1-C385-4F10-9CD2-DD93C702F068}" type="datetime1">
               <a:rPr lang="es-ES" noProof="0" smtClean="0"/>
-              <a:t>25/11/2023</a:t>
+              <a:t>26/11/2023</a:t>
             </a:fld>
             <a:endParaRPr lang="es-ES" noProof="0"/>
           </a:p>
@@ -8724,7 +8811,7 @@
             <a:pPr rtl="0"/>
             <a:fld id="{B51227E5-EAF8-4A16-84BD-E3150A48D32B}" type="datetime1">
               <a:rPr lang="es-ES" noProof="0" smtClean="0"/>
-              <a:t>25/11/2023</a:t>
+              <a:t>26/11/2023</a:t>
             </a:fld>
             <a:endParaRPr lang="es-ES" noProof="0"/>
           </a:p>
@@ -8840,7 +8927,7 @@
             <a:pPr rtl="0"/>
             <a:fld id="{5D4A2405-EADC-49A9-A212-B14F59A595D1}" type="datetime1">
               <a:rPr lang="es-ES" noProof="0" smtClean="0"/>
-              <a:t>25/11/2023</a:t>
+              <a:t>26/11/2023</a:t>
             </a:fld>
             <a:endParaRPr lang="es-ES" noProof="0"/>
           </a:p>
@@ -8933,7 +9020,7 @@
             <a:pPr rtl="0"/>
             <a:fld id="{4923801C-93E6-4BBB-A3C6-DF8FA5AF99A7}" type="datetime1">
               <a:rPr lang="es-ES" noProof="0" smtClean="0"/>
-              <a:t>25/11/2023</a:t>
+              <a:t>26/11/2023</a:t>
             </a:fld>
             <a:endParaRPr lang="es-ES" noProof="0"/>
           </a:p>
@@ -9179,7 +9266,7 @@
             <a:pPr rtl="0"/>
             <a:fld id="{AFBA167B-534C-4C9B-B1D3-207F6508C18C}" type="datetime1">
               <a:rPr lang="es-ES" noProof="0" smtClean="0"/>
-              <a:t>25/11/2023</a:t>
+              <a:t>26/11/2023</a:t>
             </a:fld>
             <a:endParaRPr lang="es-ES" noProof="0"/>
           </a:p>
@@ -9457,7 +9544,7 @@
             <a:pPr rtl="0"/>
             <a:fld id="{8609DEB8-87A0-494F-8121-A23D0AA457E9}" type="datetime1">
               <a:rPr lang="es-ES" noProof="0" smtClean="0"/>
-              <a:t>25/11/2023</a:t>
+              <a:t>26/11/2023</a:t>
             </a:fld>
             <a:endParaRPr lang="es-ES" noProof="0"/>
           </a:p>
@@ -9570,7 +9657,7 @@
           <a:noFill/>
           <a:extLst>
             <a:ext uri="{909E8E84-426E-40dd-AFC4-6F175D3DCCD1}">
-              <a14:hiddenFill xmlns:a14="http://schemas.microsoft.com/office/drawing/2010/main" xmlns="">
+              <a14:hiddenFill xmlns="" xmlns:a14="http://schemas.microsoft.com/office/drawing/2010/main">
                 <a:solidFill>
                   <a:srgbClr val="FFFFFF"/>
                 </a:solidFill>
@@ -9644,7 +9731,7 @@
               </a:ln>
               <a:extLst>
                 <a:ext uri="{91240B29-F687-4f45-9708-019B960494DF}">
-                  <a14:hiddenLine xmlns:a14="http://schemas.microsoft.com/office/drawing/2010/main" xmlns="" w="9525">
+                  <a14:hiddenLine xmlns="" xmlns:a14="http://schemas.microsoft.com/office/drawing/2010/main" w="9525">
                     <a:solidFill>
                       <a:srgbClr val="000000"/>
                     </a:solidFill>
@@ -9734,7 +9821,7 @@
               </a:ln>
               <a:extLst>
                 <a:ext uri="{91240B29-F687-4f45-9708-019B960494DF}">
-                  <a14:hiddenLine xmlns:a14="http://schemas.microsoft.com/office/drawing/2010/main" xmlns="" w="9525">
+                  <a14:hiddenLine xmlns="" xmlns:a14="http://schemas.microsoft.com/office/drawing/2010/main" w="9525">
                     <a:solidFill>
                       <a:srgbClr val="000000"/>
                     </a:solidFill>
@@ -9824,7 +9911,7 @@
               </a:ln>
               <a:extLst>
                 <a:ext uri="{91240B29-F687-4f45-9708-019B960494DF}">
-                  <a14:hiddenLine xmlns:a14="http://schemas.microsoft.com/office/drawing/2010/main" xmlns="" w="9525">
+                  <a14:hiddenLine xmlns="" xmlns:a14="http://schemas.microsoft.com/office/drawing/2010/main" w="9525">
                     <a:solidFill>
                       <a:srgbClr val="000000"/>
                     </a:solidFill>
@@ -9886,7 +9973,7 @@
               </a:ln>
               <a:extLst>
                 <a:ext uri="{91240B29-F687-4f45-9708-019B960494DF}">
-                  <a14:hiddenLine xmlns:a14="http://schemas.microsoft.com/office/drawing/2010/main" xmlns="" w="9525">
+                  <a14:hiddenLine xmlns="" xmlns:a14="http://schemas.microsoft.com/office/drawing/2010/main" w="9525">
                     <a:solidFill>
                       <a:srgbClr val="000000"/>
                     </a:solidFill>
@@ -9976,7 +10063,7 @@
               </a:ln>
               <a:extLst>
                 <a:ext uri="{91240B29-F687-4f45-9708-019B960494DF}">
-                  <a14:hiddenLine xmlns:a14="http://schemas.microsoft.com/office/drawing/2010/main" xmlns="" w="9525">
+                  <a14:hiddenLine xmlns="" xmlns:a14="http://schemas.microsoft.com/office/drawing/2010/main" w="9525">
                     <a:solidFill>
                       <a:srgbClr val="000000"/>
                     </a:solidFill>
@@ -10038,7 +10125,7 @@
               </a:ln>
               <a:extLst>
                 <a:ext uri="{91240B29-F687-4f45-9708-019B960494DF}">
-                  <a14:hiddenLine xmlns:a14="http://schemas.microsoft.com/office/drawing/2010/main" xmlns="" w="9525">
+                  <a14:hiddenLine xmlns="" xmlns:a14="http://schemas.microsoft.com/office/drawing/2010/main" w="9525">
                     <a:solidFill>
                       <a:srgbClr val="000000"/>
                     </a:solidFill>
@@ -10100,7 +10187,7 @@
               </a:ln>
               <a:extLst>
                 <a:ext uri="{91240B29-F687-4f45-9708-019B960494DF}">
-                  <a14:hiddenLine xmlns:a14="http://schemas.microsoft.com/office/drawing/2010/main" xmlns="" w="9525">
+                  <a14:hiddenLine xmlns="" xmlns:a14="http://schemas.microsoft.com/office/drawing/2010/main" w="9525">
                     <a:solidFill>
                       <a:srgbClr val="000000"/>
                     </a:solidFill>
@@ -10190,7 +10277,7 @@
               </a:ln>
               <a:extLst>
                 <a:ext uri="{91240B29-F687-4f45-9708-019B960494DF}">
-                  <a14:hiddenLine xmlns:a14="http://schemas.microsoft.com/office/drawing/2010/main" xmlns="" w="9525">
+                  <a14:hiddenLine xmlns="" xmlns:a14="http://schemas.microsoft.com/office/drawing/2010/main" w="9525">
                     <a:solidFill>
                       <a:srgbClr val="000000"/>
                     </a:solidFill>
@@ -10280,7 +10367,7 @@
               </a:ln>
               <a:extLst>
                 <a:ext uri="{91240B29-F687-4f45-9708-019B960494DF}">
-                  <a14:hiddenLine xmlns:a14="http://schemas.microsoft.com/office/drawing/2010/main" xmlns="" w="9525">
+                  <a14:hiddenLine xmlns="" xmlns:a14="http://schemas.microsoft.com/office/drawing/2010/main" w="9525">
                     <a:solidFill>
                       <a:srgbClr val="000000"/>
                     </a:solidFill>
@@ -10342,7 +10429,7 @@
               </a:ln>
               <a:extLst>
                 <a:ext uri="{91240B29-F687-4f45-9708-019B960494DF}">
-                  <a14:hiddenLine xmlns:a14="http://schemas.microsoft.com/office/drawing/2010/main" xmlns="" w="9525">
+                  <a14:hiddenLine xmlns="" xmlns:a14="http://schemas.microsoft.com/office/drawing/2010/main" w="9525">
                     <a:solidFill>
                       <a:srgbClr val="000000"/>
                     </a:solidFill>
@@ -10452,7 +10539,7 @@
               </a:ln>
               <a:extLst>
                 <a:ext uri="{91240B29-F687-4f45-9708-019B960494DF}">
-                  <a14:hiddenLine xmlns:a14="http://schemas.microsoft.com/office/drawing/2010/main" xmlns="" w="9525">
+                  <a14:hiddenLine xmlns="" xmlns:a14="http://schemas.microsoft.com/office/drawing/2010/main" w="9525">
                     <a:solidFill>
                       <a:srgbClr val="000000"/>
                     </a:solidFill>
@@ -10536,7 +10623,7 @@
               </a:ln>
               <a:extLst>
                 <a:ext uri="{91240B29-F687-4f45-9708-019B960494DF}">
-                  <a14:hiddenLine xmlns:a14="http://schemas.microsoft.com/office/drawing/2010/main" xmlns="" w="9525">
+                  <a14:hiddenLine xmlns="" xmlns:a14="http://schemas.microsoft.com/office/drawing/2010/main" w="9525">
                     <a:solidFill>
                       <a:srgbClr val="000000"/>
                     </a:solidFill>
@@ -10598,7 +10685,7 @@
               </a:ln>
               <a:extLst>
                 <a:ext uri="{91240B29-F687-4f45-9708-019B960494DF}">
-                  <a14:hiddenLine xmlns:a14="http://schemas.microsoft.com/office/drawing/2010/main" xmlns="" w="9525">
+                  <a14:hiddenLine xmlns="" xmlns:a14="http://schemas.microsoft.com/office/drawing/2010/main" w="9525">
                     <a:solidFill>
                       <a:srgbClr val="000000"/>
                     </a:solidFill>
@@ -10660,7 +10747,7 @@
               </a:ln>
               <a:extLst>
                 <a:ext uri="{91240B29-F687-4f45-9708-019B960494DF}">
-                  <a14:hiddenLine xmlns:a14="http://schemas.microsoft.com/office/drawing/2010/main" xmlns="" w="9525">
+                  <a14:hiddenLine xmlns="" xmlns:a14="http://schemas.microsoft.com/office/drawing/2010/main" w="9525">
                     <a:solidFill>
                       <a:srgbClr val="000000"/>
                     </a:solidFill>
@@ -10750,7 +10837,7 @@
               </a:ln>
               <a:extLst>
                 <a:ext uri="{91240B29-F687-4f45-9708-019B960494DF}">
-                  <a14:hiddenLine xmlns:a14="http://schemas.microsoft.com/office/drawing/2010/main" xmlns="" w="9525">
+                  <a14:hiddenLine xmlns="" xmlns:a14="http://schemas.microsoft.com/office/drawing/2010/main" w="9525">
                     <a:solidFill>
                       <a:srgbClr val="000000"/>
                     </a:solidFill>
@@ -10784,7 +10871,7 @@
               </a:ln>
               <a:extLst>
                 <a:ext uri="{91240B29-F687-4f45-9708-019B960494DF}">
-                  <a14:hiddenLine xmlns:a14="http://schemas.microsoft.com/office/drawing/2010/main" xmlns="" w="9525">
+                  <a14:hiddenLine xmlns="" xmlns:a14="http://schemas.microsoft.com/office/drawing/2010/main" w="9525">
                     <a:solidFill>
                       <a:srgbClr val="000000"/>
                     </a:solidFill>
@@ -10849,7 +10936,7 @@
               </a:ln>
               <a:extLst>
                 <a:ext uri="{91240B29-F687-4f45-9708-019B960494DF}">
-                  <a14:hiddenLine xmlns:a14="http://schemas.microsoft.com/office/drawing/2010/main" xmlns="" w="9525">
+                  <a14:hiddenLine xmlns="" xmlns:a14="http://schemas.microsoft.com/office/drawing/2010/main" w="9525">
                     <a:solidFill>
                       <a:srgbClr val="000000"/>
                     </a:solidFill>
@@ -10939,7 +11026,7 @@
               </a:ln>
               <a:extLst>
                 <a:ext uri="{91240B29-F687-4f45-9708-019B960494DF}">
-                  <a14:hiddenLine xmlns:a14="http://schemas.microsoft.com/office/drawing/2010/main" xmlns="" w="9525">
+                  <a14:hiddenLine xmlns="" xmlns:a14="http://schemas.microsoft.com/office/drawing/2010/main" w="9525">
                     <a:solidFill>
                       <a:srgbClr val="000000"/>
                     </a:solidFill>
@@ -11001,7 +11088,7 @@
               </a:ln>
               <a:extLst>
                 <a:ext uri="{91240B29-F687-4f45-9708-019B960494DF}">
-                  <a14:hiddenLine xmlns:a14="http://schemas.microsoft.com/office/drawing/2010/main" xmlns="" w="9525">
+                  <a14:hiddenLine xmlns="" xmlns:a14="http://schemas.microsoft.com/office/drawing/2010/main" w="9525">
                     <a:solidFill>
                       <a:srgbClr val="000000"/>
                     </a:solidFill>
@@ -11091,7 +11178,7 @@
               </a:ln>
               <a:extLst>
                 <a:ext uri="{91240B29-F687-4f45-9708-019B960494DF}">
-                  <a14:hiddenLine xmlns:a14="http://schemas.microsoft.com/office/drawing/2010/main" xmlns="" w="9525">
+                  <a14:hiddenLine xmlns="" xmlns:a14="http://schemas.microsoft.com/office/drawing/2010/main" w="9525">
                     <a:solidFill>
                       <a:srgbClr val="000000"/>
                     </a:solidFill>
@@ -11156,7 +11243,7 @@
               </a:ln>
               <a:extLst>
                 <a:ext uri="{91240B29-F687-4f45-9708-019B960494DF}">
-                  <a14:hiddenLine xmlns:a14="http://schemas.microsoft.com/office/drawing/2010/main" xmlns="" w="9525">
+                  <a14:hiddenLine xmlns="" xmlns:a14="http://schemas.microsoft.com/office/drawing/2010/main" w="9525">
                     <a:solidFill>
                       <a:srgbClr val="000000"/>
                     </a:solidFill>
@@ -11218,7 +11305,7 @@
               </a:ln>
               <a:extLst>
                 <a:ext uri="{91240B29-F687-4f45-9708-019B960494DF}">
-                  <a14:hiddenLine xmlns:a14="http://schemas.microsoft.com/office/drawing/2010/main" xmlns="" w="9525">
+                  <a14:hiddenLine xmlns="" xmlns:a14="http://schemas.microsoft.com/office/drawing/2010/main" w="9525">
                     <a:solidFill>
                       <a:srgbClr val="000000"/>
                     </a:solidFill>
@@ -11308,7 +11395,7 @@
               </a:ln>
               <a:extLst>
                 <a:ext uri="{91240B29-F687-4f45-9708-019B960494DF}">
-                  <a14:hiddenLine xmlns:a14="http://schemas.microsoft.com/office/drawing/2010/main" xmlns="" w="9525">
+                  <a14:hiddenLine xmlns="" xmlns:a14="http://schemas.microsoft.com/office/drawing/2010/main" w="9525">
                     <a:solidFill>
                       <a:srgbClr val="000000"/>
                     </a:solidFill>
@@ -11398,7 +11485,7 @@
               </a:ln>
               <a:extLst>
                 <a:ext uri="{91240B29-F687-4f45-9708-019B960494DF}">
-                  <a14:hiddenLine xmlns:a14="http://schemas.microsoft.com/office/drawing/2010/main" xmlns="" w="9525">
+                  <a14:hiddenLine xmlns="" xmlns:a14="http://schemas.microsoft.com/office/drawing/2010/main" w="9525">
                     <a:solidFill>
                       <a:srgbClr val="000000"/>
                     </a:solidFill>
@@ -11463,7 +11550,7 @@
               </a:ln>
               <a:extLst>
                 <a:ext uri="{91240B29-F687-4f45-9708-019B960494DF}">
-                  <a14:hiddenLine xmlns:a14="http://schemas.microsoft.com/office/drawing/2010/main" xmlns="" w="9525">
+                  <a14:hiddenLine xmlns="" xmlns:a14="http://schemas.microsoft.com/office/drawing/2010/main" w="9525">
                     <a:solidFill>
                       <a:srgbClr val="000000"/>
                     </a:solidFill>
@@ -11583,7 +11670,7 @@
               </a:ln>
               <a:extLst>
                 <a:ext uri="{91240B29-F687-4f45-9708-019B960494DF}">
-                  <a14:hiddenLine xmlns:a14="http://schemas.microsoft.com/office/drawing/2010/main" xmlns="" w="9525">
+                  <a14:hiddenLine xmlns="" xmlns:a14="http://schemas.microsoft.com/office/drawing/2010/main" w="9525">
                     <a:solidFill>
                       <a:srgbClr val="000000"/>
                     </a:solidFill>
@@ -11681,7 +11768,7 @@
               </a:ln>
               <a:extLst>
                 <a:ext uri="{91240B29-F687-4f45-9708-019B960494DF}">
-                  <a14:hiddenLine xmlns:a14="http://schemas.microsoft.com/office/drawing/2010/main" xmlns="" w="9525">
+                  <a14:hiddenLine xmlns="" xmlns:a14="http://schemas.microsoft.com/office/drawing/2010/main" w="9525">
                     <a:solidFill>
                       <a:srgbClr val="000000"/>
                     </a:solidFill>
@@ -11796,7 +11883,7 @@
               </a:ln>
               <a:extLst>
                 <a:ext uri="{91240B29-F687-4f45-9708-019B960494DF}">
-                  <a14:hiddenLine xmlns:a14="http://schemas.microsoft.com/office/drawing/2010/main" xmlns="" w="9525">
+                  <a14:hiddenLine xmlns="" xmlns:a14="http://schemas.microsoft.com/office/drawing/2010/main" w="9525">
                     <a:solidFill>
                       <a:srgbClr val="000000"/>
                     </a:solidFill>
@@ -11886,7 +11973,7 @@
               </a:ln>
               <a:extLst>
                 <a:ext uri="{91240B29-F687-4f45-9708-019B960494DF}">
-                  <a14:hiddenLine xmlns:a14="http://schemas.microsoft.com/office/drawing/2010/main" xmlns="" w="9525">
+                  <a14:hiddenLine xmlns="" xmlns:a14="http://schemas.microsoft.com/office/drawing/2010/main" w="9525">
                     <a:solidFill>
                       <a:srgbClr val="000000"/>
                     </a:solidFill>
@@ -11951,7 +12038,7 @@
               </a:ln>
               <a:extLst>
                 <a:ext uri="{91240B29-F687-4f45-9708-019B960494DF}">
-                  <a14:hiddenLine xmlns:a14="http://schemas.microsoft.com/office/drawing/2010/main" xmlns="" w="9525">
+                  <a14:hiddenLine xmlns="" xmlns:a14="http://schemas.microsoft.com/office/drawing/2010/main" w="9525">
                     <a:solidFill>
                       <a:srgbClr val="000000"/>
                     </a:solidFill>
@@ -12041,7 +12128,7 @@
               </a:ln>
               <a:extLst>
                 <a:ext uri="{91240B29-F687-4f45-9708-019B960494DF}">
-                  <a14:hiddenLine xmlns:a14="http://schemas.microsoft.com/office/drawing/2010/main" xmlns="" w="9525">
+                  <a14:hiddenLine xmlns="" xmlns:a14="http://schemas.microsoft.com/office/drawing/2010/main" w="9525">
                     <a:solidFill>
                       <a:srgbClr val="000000"/>
                     </a:solidFill>
@@ -12109,7 +12196,7 @@
               </a:ln>
               <a:extLst>
                 <a:ext uri="{91240B29-F687-4f45-9708-019B960494DF}">
-                  <a14:hiddenLine xmlns:a14="http://schemas.microsoft.com/office/drawing/2010/main" xmlns="" w="9525">
+                  <a14:hiddenLine xmlns="" xmlns:a14="http://schemas.microsoft.com/office/drawing/2010/main" w="9525">
                     <a:solidFill>
                       <a:srgbClr val="000000"/>
                     </a:solidFill>
@@ -12199,7 +12286,7 @@
               </a:ln>
               <a:extLst>
                 <a:ext uri="{91240B29-F687-4f45-9708-019B960494DF}">
-                  <a14:hiddenLine xmlns:a14="http://schemas.microsoft.com/office/drawing/2010/main" xmlns="" w="9525">
+                  <a14:hiddenLine xmlns="" xmlns:a14="http://schemas.microsoft.com/office/drawing/2010/main" w="9525">
                     <a:solidFill>
                       <a:srgbClr val="000000"/>
                     </a:solidFill>
@@ -12267,7 +12354,7 @@
               </a:ln>
               <a:extLst>
                 <a:ext uri="{91240B29-F687-4f45-9708-019B960494DF}">
-                  <a14:hiddenLine xmlns:a14="http://schemas.microsoft.com/office/drawing/2010/main" xmlns="" w="9525">
+                  <a14:hiddenLine xmlns="" xmlns:a14="http://schemas.microsoft.com/office/drawing/2010/main" w="9525">
                     <a:solidFill>
                       <a:srgbClr val="000000"/>
                     </a:solidFill>
@@ -12357,7 +12444,7 @@
               </a:ln>
               <a:extLst>
                 <a:ext uri="{91240B29-F687-4f45-9708-019B960494DF}">
-                  <a14:hiddenLine xmlns:a14="http://schemas.microsoft.com/office/drawing/2010/main" xmlns="" w="9525">
+                  <a14:hiddenLine xmlns="" xmlns:a14="http://schemas.microsoft.com/office/drawing/2010/main" w="9525">
                     <a:solidFill>
                       <a:srgbClr val="000000"/>
                     </a:solidFill>
@@ -12391,7 +12478,7 @@
               </a:ln>
               <a:extLst>
                 <a:ext uri="{91240B29-F687-4f45-9708-019B960494DF}">
-                  <a14:hiddenLine xmlns:a14="http://schemas.microsoft.com/office/drawing/2010/main" xmlns="" w="9525">
+                  <a14:hiddenLine xmlns="" xmlns:a14="http://schemas.microsoft.com/office/drawing/2010/main" w="9525">
                     <a:solidFill>
                       <a:srgbClr val="000000"/>
                     </a:solidFill>
@@ -12532,7 +12619,7 @@
             <a:pPr rtl="0"/>
             <a:fld id="{69434DCA-7D87-482A-B826-DA8947791FB1}" type="datetime1">
               <a:rPr lang="es-ES" noProof="0" smtClean="0"/>
-              <a:t>25/11/2023</a:t>
+              <a:t>26/11/2023</a:t>
             </a:fld>
             <a:endParaRPr lang="es-ES" noProof="0"/>
           </a:p>
@@ -12953,90 +13040,78 @@
       </p:grpSpPr>
       <p:sp>
         <p:nvSpPr>
-          <p:cNvPr id="2" name="Título 1"/>
+          <p:cNvPr id="3" name="Subtítulo 2"/>
           <p:cNvSpPr>
             <a:spLocks noGrp="1"/>
           </p:cNvSpPr>
           <p:nvPr>
-            <p:ph type="title"/>
-          </p:nvPr>
-        </p:nvSpPr>
-        <p:spPr/>
-        <p:txBody>
-          <a:bodyPr/>
-          <a:lstStyle/>
-          <a:p>
-            <a:r>
-              <a:rPr lang="es-ES" b="1" dirty="0" smtClean="0"/>
-              <a:t>OJBECT ORIENTATION IN JAVA</a:t>
-            </a:r>
-            <a:endParaRPr lang="es-ES" b="1" dirty="0"/>
-          </a:p>
-        </p:txBody>
-      </p:sp>
-      <p:sp>
-        <p:nvSpPr>
-          <p:cNvPr id="3" name="Marcador de contenido 2"/>
-          <p:cNvSpPr>
-            <a:spLocks noGrp="1"/>
-          </p:cNvSpPr>
-          <p:nvPr>
-            <p:ph idx="1"/>
+            <p:ph type="subTitle" idx="1"/>
           </p:nvPr>
         </p:nvSpPr>
         <p:spPr>
           <a:xfrm>
-            <a:off x="1141413" y="2249487"/>
-            <a:ext cx="6838806" cy="3541714"/>
+            <a:off x="1895474" y="4678363"/>
+            <a:ext cx="8791575" cy="1655762"/>
           </a:xfrm>
         </p:spPr>
         <p:txBody>
-          <a:bodyPr/>
+          <a:bodyPr vert="horz" lIns="91440" tIns="45720" rIns="91440" bIns="45720" rtlCol="0" anchor="t">
+            <a:normAutofit/>
+          </a:bodyPr>
           <a:lstStyle/>
           <a:p>
             <a:r>
-              <a:rPr lang="en-US" dirty="0" smtClean="0"/>
-              <a:t>Java </a:t>
-            </a:r>
-            <a:r>
-              <a:rPr lang="en-US" dirty="0"/>
-              <a:t>is an </a:t>
-            </a:r>
-            <a:r>
-              <a:rPr lang="en-US" b="1" dirty="0"/>
-              <a:t>object-oriented programming language</a:t>
-            </a:r>
-            <a:r>
-              <a:rPr lang="en-US" dirty="0" smtClean="0"/>
-              <a:t>.</a:t>
-            </a:r>
-          </a:p>
-          <a:p>
-            <a:endParaRPr lang="en-US" dirty="0"/>
-          </a:p>
-          <a:p>
-            <a:endParaRPr lang="es-ES" dirty="0"/>
+              <a:rPr lang="es-ES" dirty="0"/>
+              <a:t>Grupo 04</a:t>
+            </a:r>
+          </a:p>
+          <a:p>
+            <a:r>
+              <a:rPr lang="es-ES" dirty="0"/>
+              <a:t>Alberto Saboya – </a:t>
+            </a:r>
+            <a:r>
+              <a:rPr lang="es-ES" dirty="0" err="1"/>
+              <a:t>Anabella</a:t>
+            </a:r>
+            <a:r>
+              <a:rPr lang="es-ES" dirty="0"/>
+              <a:t> aceto – </a:t>
+            </a:r>
+            <a:r>
+              <a:rPr lang="es-ES" dirty="0" err="1"/>
+              <a:t>david</a:t>
+            </a:r>
+            <a:r>
+              <a:rPr lang="es-ES" dirty="0"/>
+              <a:t> rodríguez</a:t>
+            </a:r>
           </a:p>
         </p:txBody>
       </p:sp>
       <p:pic>
         <p:nvPicPr>
-          <p:cNvPr id="6" name="Imagen 5"/>
+          <p:cNvPr id="6" name="Imagen 5" descr="Logotipo&#10;&#10;Descripción generada automáticamente">
+            <a:extLst>
+              <a:ext uri="{FF2B5EF4-FFF2-40B4-BE49-F238E27FC236}">
+                <a16:creationId xmlns:a16="http://schemas.microsoft.com/office/drawing/2014/main" id="{ABDC1BA5-0B7A-9592-E602-9E12BFB62DB4}"/>
+              </a:ext>
+            </a:extLst>
+          </p:cNvPr>
           <p:cNvPicPr>
             <a:picLocks noChangeAspect="1"/>
           </p:cNvPicPr>
           <p:nvPr/>
         </p:nvPicPr>
-        <p:blipFill>
-          <a:blip r:embed="rId2"/>
-          <a:stretch>
-            <a:fillRect/>
-          </a:stretch>
+        <p:blipFill rotWithShape="1">
+          <a:blip r:embed="rId3"/>
+          <a:srcRect r="12862" b="15789"/>
+          <a:stretch/>
         </p:blipFill>
         <p:spPr>
           <a:xfrm>
-            <a:off x="8255486" y="2097088"/>
-            <a:ext cx="3568883" cy="3219615"/>
+            <a:off x="2827336" y="1247168"/>
+            <a:ext cx="5804676" cy="2772382"/>
           </a:xfrm>
           <a:prstGeom prst="rect">
             <a:avLst/>
@@ -13046,7 +13121,7 @@
     </p:spTree>
     <p:extLst>
       <p:ext uri="{BB962C8B-B14F-4D97-AF65-F5344CB8AC3E}">
-        <p14:creationId xmlns:p14="http://schemas.microsoft.com/office/powerpoint/2010/main" val="1585215087"/>
+        <p14:creationId xmlns:p14="http://schemas.microsoft.com/office/powerpoint/2010/main" val="3856144342"/>
       </p:ext>
     </p:extLst>
   </p:cSld>
@@ -13075,7 +13150,13 @@
       </p:grpSpPr>
       <p:sp>
         <p:nvSpPr>
-          <p:cNvPr id="2" name="Título 1"/>
+          <p:cNvPr id="2" name="Título 1">
+            <a:extLst>
+              <a:ext uri="{FF2B5EF4-FFF2-40B4-BE49-F238E27FC236}">
+                <a16:creationId xmlns:a16="http://schemas.microsoft.com/office/drawing/2014/main" id="{15D7F636-FF34-D8C8-CE64-B73F810ADA11}"/>
+              </a:ext>
+            </a:extLst>
+          </p:cNvPr>
           <p:cNvSpPr>
             <a:spLocks noGrp="1"/>
           </p:cNvSpPr>
@@ -13083,46 +13164,44 @@
             <p:ph type="title"/>
           </p:nvPr>
         </p:nvSpPr>
-        <p:spPr/>
+        <p:spPr>
+          <a:xfrm>
+            <a:off x="1143001" y="425087"/>
+            <a:ext cx="9905998" cy="726705"/>
+          </a:xfrm>
+        </p:spPr>
         <p:txBody>
           <a:bodyPr/>
           <a:lstStyle/>
           <a:p>
             <a:r>
-              <a:rPr lang="es-ES" b="1" dirty="0" err="1" smtClean="0"/>
-              <a:t>Memory</a:t>
-            </a:r>
-            <a:r>
-              <a:rPr lang="es-ES" b="1" dirty="0" smtClean="0"/>
-              <a:t> </a:t>
-            </a:r>
-            <a:r>
-              <a:rPr lang="es-ES" b="1" dirty="0" err="1" smtClean="0"/>
-              <a:t>management</a:t>
-            </a:r>
-            <a:r>
-              <a:rPr lang="es-ES" b="1" dirty="0" smtClean="0"/>
-              <a:t> and </a:t>
-            </a:r>
-            <a:r>
-              <a:rPr lang="es-ES" b="1" dirty="0" err="1" smtClean="0"/>
-              <a:t>garbaje</a:t>
-            </a:r>
-            <a:r>
-              <a:rPr lang="es-ES" b="1" dirty="0" smtClean="0"/>
-              <a:t> </a:t>
-            </a:r>
-            <a:r>
-              <a:rPr lang="es-ES" b="1" dirty="0" err="1" smtClean="0"/>
-              <a:t>collection</a:t>
-            </a:r>
-            <a:endParaRPr lang="es-ES" b="1" dirty="0"/>
+              <a:rPr lang="es-ES" dirty="0" err="1"/>
+              <a:t>Its</a:t>
+            </a:r>
+            <a:r>
+              <a:rPr lang="es-ES" dirty="0"/>
+              <a:t> </a:t>
+            </a:r>
+            <a:r>
+              <a:rPr lang="es-ES" dirty="0" err="1"/>
+              <a:t>origins</a:t>
+            </a:r>
+            <a:r>
+              <a:rPr lang="es-ES" dirty="0"/>
+              <a:t>...</a:t>
+            </a:r>
           </a:p>
         </p:txBody>
       </p:sp>
       <p:sp>
         <p:nvSpPr>
-          <p:cNvPr id="3" name="Marcador de contenido 2"/>
+          <p:cNvPr id="3" name="Marcador de contenido 2">
+            <a:extLst>
+              <a:ext uri="{FF2B5EF4-FFF2-40B4-BE49-F238E27FC236}">
+                <a16:creationId xmlns:a16="http://schemas.microsoft.com/office/drawing/2014/main" id="{DF3ED317-2E7B-F525-4FDA-C4CBD9486AD9}"/>
+              </a:ext>
+            </a:extLst>
+          </p:cNvPr>
           <p:cNvSpPr>
             <a:spLocks noGrp="1"/>
           </p:cNvSpPr>
@@ -13130,44 +13209,654 @@
             <p:ph idx="1"/>
           </p:nvPr>
         </p:nvSpPr>
-        <p:spPr/>
+        <p:spPr>
+          <a:xfrm>
+            <a:off x="659424" y="1676663"/>
+            <a:ext cx="10550769" cy="3994375"/>
+          </a:xfrm>
+        </p:spPr>
         <p:txBody>
-          <a:bodyPr/>
+          <a:bodyPr vert="horz" lIns="91440" tIns="45720" rIns="91440" bIns="45720" rtlCol="0" anchor="t">
+            <a:normAutofit/>
+          </a:bodyPr>
           <a:lstStyle/>
           <a:p>
             <a:r>
-              <a:rPr lang="en-US" b="1" dirty="0"/>
-              <a:t>Automatic Memory Management:</a:t>
-            </a:r>
-            <a:r>
-              <a:rPr lang="en-US" dirty="0"/>
-              <a:t> Java uses a garbage collector to automatically manage memory.</a:t>
-            </a:r>
-            <a:endParaRPr lang="es-ES" dirty="0"/>
-          </a:p>
-          <a:p>
-            <a:endParaRPr lang="es-ES" dirty="0"/>
+              <a:rPr lang="es-ES" sz="2900" dirty="0" err="1">
+                <a:solidFill>
+                  <a:srgbClr val="FFFFFF"/>
+                </a:solidFill>
+                <a:ea typeface="+mn-lt"/>
+                <a:cs typeface="+mn-lt"/>
+              </a:rPr>
+              <a:t>It</a:t>
+            </a:r>
+            <a:r>
+              <a:rPr lang="es-ES" sz="2900" dirty="0">
+                <a:solidFill>
+                  <a:srgbClr val="FFFFFF"/>
+                </a:solidFill>
+                <a:ea typeface="+mn-lt"/>
+                <a:cs typeface="+mn-lt"/>
+              </a:rPr>
+              <a:t> </a:t>
+            </a:r>
+            <a:r>
+              <a:rPr lang="es-ES" sz="2900" dirty="0" err="1">
+                <a:solidFill>
+                  <a:srgbClr val="FFFFFF"/>
+                </a:solidFill>
+                <a:ea typeface="+mn-lt"/>
+                <a:cs typeface="+mn-lt"/>
+              </a:rPr>
+              <a:t>was</a:t>
+            </a:r>
+            <a:r>
+              <a:rPr lang="es-ES" sz="2900" dirty="0">
+                <a:solidFill>
+                  <a:srgbClr val="FFFFFF"/>
+                </a:solidFill>
+                <a:ea typeface="+mn-lt"/>
+                <a:cs typeface="+mn-lt"/>
+              </a:rPr>
+              <a:t> </a:t>
+            </a:r>
+            <a:r>
+              <a:rPr lang="es-ES" sz="2900" dirty="0" err="1">
+                <a:solidFill>
+                  <a:srgbClr val="FFFFFF"/>
+                </a:solidFill>
+                <a:ea typeface="+mn-lt"/>
+                <a:cs typeface="+mn-lt"/>
+              </a:rPr>
+              <a:t>launched</a:t>
+            </a:r>
+            <a:r>
+              <a:rPr lang="es-ES" sz="2900" dirty="0">
+                <a:solidFill>
+                  <a:srgbClr val="FFFFFF"/>
+                </a:solidFill>
+                <a:ea typeface="+mn-lt"/>
+                <a:cs typeface="+mn-lt"/>
+              </a:rPr>
+              <a:t> in June 1991.</a:t>
+            </a:r>
+          </a:p>
+          <a:p>
+            <a:r>
+              <a:rPr lang="es-ES" sz="2900" dirty="0">
+                <a:solidFill>
+                  <a:srgbClr val="FFFFFF"/>
+                </a:solidFill>
+              </a:rPr>
+              <a:t>In 1996 </a:t>
+            </a:r>
+            <a:r>
+              <a:rPr lang="es-ES" sz="2900" dirty="0" err="1">
+                <a:solidFill>
+                  <a:srgbClr val="FFFFFF"/>
+                </a:solidFill>
+              </a:rPr>
+              <a:t>Sun</a:t>
+            </a:r>
+            <a:r>
+              <a:rPr lang="es-ES" sz="2900" dirty="0">
+                <a:solidFill>
+                  <a:srgbClr val="FFFFFF"/>
+                </a:solidFill>
+              </a:rPr>
+              <a:t> Microsystems </a:t>
+            </a:r>
+            <a:r>
+              <a:rPr lang="es-ES" sz="2900" dirty="0" err="1">
+                <a:solidFill>
+                  <a:srgbClr val="FFFFFF"/>
+                </a:solidFill>
+                <a:ea typeface="+mn-lt"/>
+                <a:cs typeface="+mn-lt"/>
+              </a:rPr>
+              <a:t>the</a:t>
+            </a:r>
+            <a:r>
+              <a:rPr lang="es-ES" sz="2900" dirty="0">
+                <a:solidFill>
+                  <a:srgbClr val="FFFFFF"/>
+                </a:solidFill>
+                <a:ea typeface="+mn-lt"/>
+                <a:cs typeface="+mn-lt"/>
+              </a:rPr>
+              <a:t> </a:t>
+            </a:r>
+            <a:r>
+              <a:rPr lang="es-ES" sz="2900" dirty="0" err="1">
+                <a:solidFill>
+                  <a:srgbClr val="FFFFFF"/>
+                </a:solidFill>
+                <a:ea typeface="+mn-lt"/>
+                <a:cs typeface="+mn-lt"/>
+              </a:rPr>
+              <a:t>first</a:t>
+            </a:r>
+            <a:r>
+              <a:rPr lang="es-ES" sz="2900" dirty="0">
+                <a:solidFill>
+                  <a:srgbClr val="FFFFFF"/>
+                </a:solidFill>
+                <a:ea typeface="+mn-lt"/>
+                <a:cs typeface="+mn-lt"/>
+              </a:rPr>
+              <a:t> </a:t>
+            </a:r>
+            <a:r>
+              <a:rPr lang="es-ES" sz="2900" dirty="0" err="1">
+                <a:solidFill>
+                  <a:srgbClr val="FFFFFF"/>
+                </a:solidFill>
+                <a:ea typeface="+mn-lt"/>
+                <a:cs typeface="+mn-lt"/>
+              </a:rPr>
+              <a:t>public</a:t>
+            </a:r>
+            <a:r>
+              <a:rPr lang="es-ES" sz="2900" dirty="0">
+                <a:solidFill>
+                  <a:srgbClr val="FFFFFF"/>
+                </a:solidFill>
+                <a:ea typeface="+mn-lt"/>
+                <a:cs typeface="+mn-lt"/>
+              </a:rPr>
+              <a:t> </a:t>
+            </a:r>
+            <a:r>
+              <a:rPr lang="es-ES" sz="2900" dirty="0" err="1">
+                <a:solidFill>
+                  <a:srgbClr val="FFFFFF"/>
+                </a:solidFill>
+                <a:ea typeface="+mn-lt"/>
+                <a:cs typeface="+mn-lt"/>
+              </a:rPr>
+              <a:t>implementation</a:t>
+            </a:r>
+            <a:r>
+              <a:rPr lang="es-ES" sz="2900" dirty="0">
+                <a:solidFill>
+                  <a:srgbClr val="FFFFFF"/>
+                </a:solidFill>
+                <a:ea typeface="+mn-lt"/>
+                <a:cs typeface="+mn-lt"/>
+              </a:rPr>
+              <a:t> </a:t>
+            </a:r>
+            <a:r>
+              <a:rPr lang="es-ES" sz="2900" dirty="0" err="1">
+                <a:solidFill>
+                  <a:srgbClr val="FFFFFF"/>
+                </a:solidFill>
+                <a:ea typeface="+mn-lt"/>
+                <a:cs typeface="+mn-lt"/>
+              </a:rPr>
+              <a:t>of</a:t>
+            </a:r>
+            <a:r>
+              <a:rPr lang="es-ES" sz="2900" dirty="0">
+                <a:solidFill>
+                  <a:srgbClr val="FFFFFF"/>
+                </a:solidFill>
+                <a:ea typeface="+mn-lt"/>
+                <a:cs typeface="+mn-lt"/>
+              </a:rPr>
+              <a:t> Java 1.0</a:t>
+            </a:r>
+            <a:endParaRPr lang="es-ES" sz="2900" dirty="0">
+              <a:solidFill>
+                <a:srgbClr val="FFFFFF"/>
+              </a:solidFill>
+            </a:endParaRPr>
+          </a:p>
+          <a:p>
+            <a:r>
+              <a:rPr lang="es-ES" sz="2900" dirty="0">
+                <a:solidFill>
+                  <a:srgbClr val="FFFFFF"/>
+                </a:solidFill>
+                <a:ea typeface="+mn-lt"/>
+                <a:cs typeface="+mn-lt"/>
+              </a:rPr>
+              <a:t>In 1998, Java 2 </a:t>
+            </a:r>
+            <a:r>
+              <a:rPr lang="es-ES" sz="2900" dirty="0" err="1">
+                <a:solidFill>
+                  <a:srgbClr val="FFFFFF"/>
+                </a:solidFill>
+                <a:ea typeface="+mn-lt"/>
+                <a:cs typeface="+mn-lt"/>
+              </a:rPr>
+              <a:t>was</a:t>
+            </a:r>
+            <a:r>
+              <a:rPr lang="es-ES" sz="2900" dirty="0">
+                <a:solidFill>
+                  <a:srgbClr val="FFFFFF"/>
+                </a:solidFill>
+                <a:ea typeface="+mn-lt"/>
+                <a:cs typeface="+mn-lt"/>
+              </a:rPr>
+              <a:t> </a:t>
+            </a:r>
+            <a:r>
+              <a:rPr lang="es-ES" sz="2900" dirty="0" err="1">
+                <a:solidFill>
+                  <a:srgbClr val="FFFFFF"/>
+                </a:solidFill>
+                <a:ea typeface="+mn-lt"/>
+                <a:cs typeface="+mn-lt"/>
+              </a:rPr>
+              <a:t>released</a:t>
+            </a:r>
+            <a:r>
+              <a:rPr lang="es-ES" sz="2900" dirty="0">
+                <a:solidFill>
+                  <a:srgbClr val="FFFFFF"/>
+                </a:solidFill>
+                <a:ea typeface="+mn-lt"/>
+                <a:cs typeface="+mn-lt"/>
+              </a:rPr>
+              <a:t> and </a:t>
+            </a:r>
+            <a:r>
+              <a:rPr lang="es-ES" sz="2900" dirty="0" err="1">
+                <a:solidFill>
+                  <a:srgbClr val="FFFFFF"/>
+                </a:solidFill>
+                <a:ea typeface="+mn-lt"/>
+                <a:cs typeface="+mn-lt"/>
+              </a:rPr>
+              <a:t>it</a:t>
+            </a:r>
+            <a:r>
+              <a:rPr lang="es-ES" sz="2900" dirty="0">
+                <a:solidFill>
+                  <a:srgbClr val="FFFFFF"/>
+                </a:solidFill>
+                <a:ea typeface="+mn-lt"/>
+                <a:cs typeface="+mn-lt"/>
+              </a:rPr>
+              <a:t> </a:t>
+            </a:r>
+            <a:r>
+              <a:rPr lang="es-ES" sz="2900" dirty="0" err="1">
+                <a:solidFill>
+                  <a:srgbClr val="FFFFFF"/>
+                </a:solidFill>
+                <a:ea typeface="+mn-lt"/>
+                <a:cs typeface="+mn-lt"/>
+              </a:rPr>
+              <a:t>added</a:t>
+            </a:r>
+            <a:r>
+              <a:rPr lang="es-ES" sz="2900" dirty="0">
+                <a:solidFill>
+                  <a:srgbClr val="FFFFFF"/>
+                </a:solidFill>
+                <a:ea typeface="+mn-lt"/>
+                <a:cs typeface="+mn-lt"/>
+              </a:rPr>
+              <a:t> </a:t>
+            </a:r>
+            <a:r>
+              <a:rPr lang="es-ES" sz="2900" dirty="0" err="1">
+                <a:solidFill>
+                  <a:srgbClr val="FFFFFF"/>
+                </a:solidFill>
+                <a:ea typeface="+mn-lt"/>
+                <a:cs typeface="+mn-lt"/>
+              </a:rPr>
+              <a:t>multiple</a:t>
+            </a:r>
+            <a:r>
+              <a:rPr lang="es-ES" sz="2900" dirty="0">
+                <a:solidFill>
+                  <a:srgbClr val="FFFFFF"/>
+                </a:solidFill>
+                <a:ea typeface="+mn-lt"/>
+                <a:cs typeface="+mn-lt"/>
+              </a:rPr>
+              <a:t> </a:t>
+            </a:r>
+            <a:r>
+              <a:rPr lang="es-ES" sz="2900" dirty="0" err="1">
+                <a:solidFill>
+                  <a:srgbClr val="FFFFFF"/>
+                </a:solidFill>
+                <a:ea typeface="+mn-lt"/>
+                <a:cs typeface="+mn-lt"/>
+              </a:rPr>
+              <a:t>configurations</a:t>
+            </a:r>
+            <a:r>
+              <a:rPr lang="es-ES" sz="2900" dirty="0">
+                <a:solidFill>
+                  <a:srgbClr val="FFFFFF"/>
+                </a:solidFill>
+                <a:ea typeface="+mn-lt"/>
+                <a:cs typeface="+mn-lt"/>
+              </a:rPr>
+              <a:t> </a:t>
+            </a:r>
+            <a:r>
+              <a:rPr lang="es-ES" sz="2900" dirty="0" err="1">
+                <a:solidFill>
+                  <a:srgbClr val="FFFFFF"/>
+                </a:solidFill>
+                <a:ea typeface="+mn-lt"/>
+                <a:cs typeface="+mn-lt"/>
+              </a:rPr>
+              <a:t>designed</a:t>
+            </a:r>
+            <a:r>
+              <a:rPr lang="es-ES" sz="2900" dirty="0">
+                <a:solidFill>
+                  <a:srgbClr val="FFFFFF"/>
+                </a:solidFill>
+                <a:ea typeface="+mn-lt"/>
+                <a:cs typeface="+mn-lt"/>
+              </a:rPr>
+              <a:t> </a:t>
+            </a:r>
+            <a:r>
+              <a:rPr lang="es-ES" sz="2900" dirty="0" err="1">
+                <a:solidFill>
+                  <a:srgbClr val="FFFFFF"/>
+                </a:solidFill>
+                <a:ea typeface="+mn-lt"/>
+                <a:cs typeface="+mn-lt"/>
+              </a:rPr>
+              <a:t>for</a:t>
+            </a:r>
+            <a:r>
+              <a:rPr lang="es-ES" sz="2900" dirty="0">
+                <a:solidFill>
+                  <a:srgbClr val="FFFFFF"/>
+                </a:solidFill>
+                <a:ea typeface="+mn-lt"/>
+                <a:cs typeface="+mn-lt"/>
+              </a:rPr>
+              <a:t> </a:t>
+            </a:r>
+            <a:r>
+              <a:rPr lang="es-ES" sz="2900" dirty="0" err="1">
+                <a:solidFill>
+                  <a:srgbClr val="FFFFFF"/>
+                </a:solidFill>
+                <a:ea typeface="+mn-lt"/>
+                <a:cs typeface="+mn-lt"/>
+              </a:rPr>
+              <a:t>different</a:t>
+            </a:r>
+            <a:r>
+              <a:rPr lang="es-ES" sz="2900" dirty="0">
+                <a:solidFill>
+                  <a:srgbClr val="FFFFFF"/>
+                </a:solidFill>
+                <a:ea typeface="+mn-lt"/>
+                <a:cs typeface="+mn-lt"/>
+              </a:rPr>
+              <a:t> </a:t>
+            </a:r>
+            <a:r>
+              <a:rPr lang="es-ES" sz="2900" dirty="0" err="1">
+                <a:solidFill>
+                  <a:srgbClr val="FFFFFF"/>
+                </a:solidFill>
+                <a:ea typeface="+mn-lt"/>
+                <a:cs typeface="+mn-lt"/>
+              </a:rPr>
+              <a:t>types</a:t>
+            </a:r>
+            <a:r>
+              <a:rPr lang="es-ES" sz="2900" dirty="0">
+                <a:solidFill>
+                  <a:srgbClr val="FFFFFF"/>
+                </a:solidFill>
+                <a:ea typeface="+mn-lt"/>
+                <a:cs typeface="+mn-lt"/>
+              </a:rPr>
+              <a:t> </a:t>
+            </a:r>
+            <a:r>
+              <a:rPr lang="es-ES" sz="2900" dirty="0" err="1">
+                <a:solidFill>
+                  <a:srgbClr val="FFFFFF"/>
+                </a:solidFill>
+                <a:ea typeface="+mn-lt"/>
+                <a:cs typeface="+mn-lt"/>
+              </a:rPr>
+              <a:t>of</a:t>
+            </a:r>
+            <a:r>
+              <a:rPr lang="es-ES" sz="2900" dirty="0">
+                <a:solidFill>
+                  <a:srgbClr val="FFFFFF"/>
+                </a:solidFill>
+                <a:ea typeface="+mn-lt"/>
+                <a:cs typeface="+mn-lt"/>
+              </a:rPr>
+              <a:t> </a:t>
+            </a:r>
+            <a:r>
+              <a:rPr lang="es-ES" sz="2900" dirty="0" err="1">
+                <a:solidFill>
+                  <a:srgbClr val="FFFFFF"/>
+                </a:solidFill>
+                <a:ea typeface="+mn-lt"/>
+                <a:cs typeface="+mn-lt"/>
+              </a:rPr>
+              <a:t>platforms</a:t>
+            </a:r>
+            <a:r>
+              <a:rPr lang="es-ES" sz="2900" dirty="0">
+                <a:solidFill>
+                  <a:srgbClr val="FFFFFF"/>
+                </a:solidFill>
+                <a:ea typeface="+mn-lt"/>
+                <a:cs typeface="+mn-lt"/>
+              </a:rPr>
+              <a:t>.</a:t>
+            </a:r>
+            <a:endParaRPr lang="es-ES" sz="2900" dirty="0">
+              <a:solidFill>
+                <a:srgbClr val="FFFFFF"/>
+              </a:solidFill>
+            </a:endParaRPr>
+          </a:p>
+          <a:p>
+            <a:r>
+              <a:rPr lang="es-ES" sz="2900" dirty="0">
+                <a:solidFill>
+                  <a:srgbClr val="FFFFFF"/>
+                </a:solidFill>
+              </a:rPr>
+              <a:t>In 2006 </a:t>
+            </a:r>
+            <a:r>
+              <a:rPr lang="es-ES" sz="2900" dirty="0" err="1">
+                <a:solidFill>
+                  <a:srgbClr val="FFFFFF"/>
+                </a:solidFill>
+              </a:rPr>
+              <a:t>is</a:t>
+            </a:r>
+            <a:r>
+              <a:rPr lang="es-ES" sz="2900" dirty="0">
+                <a:solidFill>
+                  <a:srgbClr val="FFFFFF"/>
+                </a:solidFill>
+              </a:rPr>
+              <a:t> </a:t>
+            </a:r>
+            <a:r>
+              <a:rPr lang="es-ES" sz="2900" dirty="0" err="1">
+                <a:solidFill>
+                  <a:srgbClr val="FFFFFF"/>
+                </a:solidFill>
+              </a:rPr>
+              <a:t>launched</a:t>
+            </a:r>
+            <a:r>
+              <a:rPr lang="es-ES" sz="2900" dirty="0">
+                <a:solidFill>
+                  <a:srgbClr val="FFFFFF"/>
+                </a:solidFill>
+              </a:rPr>
+              <a:t> as</a:t>
+            </a:r>
+            <a:r>
+              <a:rPr lang="es-ES" sz="2900" dirty="0">
+                <a:solidFill>
+                  <a:srgbClr val="FFFFFF"/>
+                </a:solidFill>
+                <a:ea typeface="+mn-lt"/>
+                <a:cs typeface="+mn-lt"/>
+              </a:rPr>
+              <a:t> free and open-</a:t>
+            </a:r>
+            <a:r>
+              <a:rPr lang="es-ES" sz="2900" dirty="0" err="1">
+                <a:solidFill>
+                  <a:srgbClr val="FFFFFF"/>
+                </a:solidFill>
+                <a:ea typeface="+mn-lt"/>
+                <a:cs typeface="+mn-lt"/>
+              </a:rPr>
+              <a:t>source</a:t>
+            </a:r>
+            <a:r>
+              <a:rPr lang="es-ES" sz="2900" dirty="0">
+                <a:solidFill>
+                  <a:srgbClr val="FFFFFF"/>
+                </a:solidFill>
+                <a:ea typeface="+mn-lt"/>
+                <a:cs typeface="+mn-lt"/>
+              </a:rPr>
+              <a:t> software.</a:t>
+            </a:r>
+            <a:endParaRPr lang="es-ES" sz="2900" dirty="0">
+              <a:solidFill>
+                <a:srgbClr val="FFFFFF"/>
+              </a:solidFill>
+            </a:endParaRPr>
+          </a:p>
+          <a:p>
+            <a:r>
+              <a:rPr lang="es-ES" sz="2900" dirty="0">
+                <a:solidFill>
+                  <a:srgbClr val="FFFFFF"/>
+                </a:solidFill>
+              </a:rPr>
+              <a:t>In 2009, </a:t>
+            </a:r>
+            <a:r>
+              <a:rPr lang="es-ES" sz="2900" dirty="0">
+                <a:solidFill>
+                  <a:srgbClr val="FFFFFF"/>
+                </a:solidFill>
+                <a:ea typeface="+mn-lt"/>
+                <a:cs typeface="+mn-lt"/>
+              </a:rPr>
+              <a:t>Oracle </a:t>
+            </a:r>
+            <a:r>
+              <a:rPr lang="es-ES" sz="2900" dirty="0" err="1">
+                <a:solidFill>
+                  <a:srgbClr val="FFFFFF"/>
+                </a:solidFill>
+                <a:ea typeface="+mn-lt"/>
+                <a:cs typeface="+mn-lt"/>
+              </a:rPr>
+              <a:t>Corporation</a:t>
+            </a:r>
+            <a:r>
+              <a:rPr lang="es-ES" sz="2900" dirty="0">
+                <a:solidFill>
+                  <a:srgbClr val="FFFFFF"/>
+                </a:solidFill>
+                <a:ea typeface="+mn-lt"/>
+                <a:cs typeface="+mn-lt"/>
+              </a:rPr>
+              <a:t> </a:t>
+            </a:r>
+            <a:r>
+              <a:rPr lang="es-ES" sz="2900" dirty="0" err="1">
+                <a:solidFill>
+                  <a:srgbClr val="FFFFFF"/>
+                </a:solidFill>
+                <a:ea typeface="+mn-lt"/>
+                <a:cs typeface="+mn-lt"/>
+              </a:rPr>
+              <a:t>acquared</a:t>
+            </a:r>
+            <a:r>
+              <a:rPr lang="es-ES" sz="2900" dirty="0">
+                <a:solidFill>
+                  <a:srgbClr val="FFFFFF"/>
+                </a:solidFill>
+                <a:ea typeface="+mn-lt"/>
+                <a:cs typeface="+mn-lt"/>
+              </a:rPr>
+              <a:t> </a:t>
+            </a:r>
+            <a:r>
+              <a:rPr lang="es-ES" sz="2900" dirty="0" err="1">
+                <a:solidFill>
+                  <a:srgbClr val="FFFFFF"/>
+                </a:solidFill>
+                <a:ea typeface="+mn-lt"/>
+                <a:cs typeface="+mn-lt"/>
+              </a:rPr>
+              <a:t>Sun</a:t>
+            </a:r>
+            <a:r>
+              <a:rPr lang="es-ES" sz="2900" dirty="0">
+                <a:solidFill>
+                  <a:srgbClr val="FFFFFF"/>
+                </a:solidFill>
+                <a:ea typeface="+mn-lt"/>
+                <a:cs typeface="+mn-lt"/>
+              </a:rPr>
+              <a:t> Microsystems.</a:t>
+            </a:r>
+            <a:endParaRPr lang="es-ES" sz="2900" dirty="0">
+              <a:solidFill>
+                <a:srgbClr val="FFFFFF"/>
+              </a:solidFill>
+            </a:endParaRPr>
           </a:p>
         </p:txBody>
       </p:sp>
       <p:pic>
         <p:nvPicPr>
-          <p:cNvPr id="4" name="Imagen 3"/>
+          <p:cNvPr id="5" name="Imagen 4" descr="Imagen que contiene Esquemático&#10;&#10;Descripción generada automáticamente">
+            <a:extLst>
+              <a:ext uri="{FF2B5EF4-FFF2-40B4-BE49-F238E27FC236}">
+                <a16:creationId xmlns:a16="http://schemas.microsoft.com/office/drawing/2014/main" id="{B6B1AB78-CEF4-0ED6-FCFF-61F7CE432F4F}"/>
+              </a:ext>
+            </a:extLst>
+          </p:cNvPr>
           <p:cNvPicPr>
             <a:picLocks noChangeAspect="1"/>
           </p:cNvPicPr>
           <p:nvPr/>
         </p:nvPicPr>
-        <p:blipFill>
+        <p:blipFill rotWithShape="1">
           <a:blip r:embed="rId2"/>
-          <a:stretch>
-            <a:fillRect/>
-          </a:stretch>
+          <a:srcRect l="42376" t="8077" r="12803" b="32820"/>
+          <a:stretch/>
         </p:blipFill>
         <p:spPr>
           <a:xfrm>
-            <a:off x="1385454" y="2954898"/>
-            <a:ext cx="4655128" cy="4655128"/>
+            <a:off x="9434146" y="163985"/>
+            <a:ext cx="1872762" cy="1975614"/>
           </a:xfrm>
           <a:prstGeom prst="rect">
             <a:avLst/>
@@ -13177,7 +13866,7 @@
     </p:spTree>
     <p:extLst>
       <p:ext uri="{BB962C8B-B14F-4D97-AF65-F5344CB8AC3E}">
-        <p14:creationId xmlns:p14="http://schemas.microsoft.com/office/powerpoint/2010/main" val="528157625"/>
+        <p14:creationId xmlns:p14="http://schemas.microsoft.com/office/powerpoint/2010/main" val="339073453"/>
       </p:ext>
     </p:extLst>
   </p:cSld>
@@ -13214,20 +13903,20 @@
             <p:ph type="title"/>
           </p:nvPr>
         </p:nvSpPr>
-        <p:spPr/>
+        <p:spPr>
+          <a:xfrm>
+            <a:off x="1053490" y="451464"/>
+            <a:ext cx="9905998" cy="999267"/>
+          </a:xfrm>
+        </p:spPr>
         <p:txBody>
           <a:bodyPr/>
           <a:lstStyle/>
           <a:p>
             <a:r>
-              <a:rPr lang="es-ES" b="1" dirty="0" err="1"/>
-              <a:t>Extensive</a:t>
-            </a:r>
-            <a:r>
               <a:rPr lang="es-ES" b="1" dirty="0"/>
-              <a:t> Standard Library</a:t>
-            </a:r>
-            <a:endParaRPr lang="es-ES" b="1" dirty="0"/>
+              <a:t>OJBECT ORIENTATION IN JAVA</a:t>
+            </a:r>
           </a:p>
         </p:txBody>
       </p:sp>
@@ -13243,193 +13932,137 @@
         </p:nvSpPr>
         <p:spPr>
           <a:xfrm>
-            <a:off x="1141412" y="3256250"/>
-            <a:ext cx="9905999" cy="1555895"/>
+            <a:off x="861645" y="1688122"/>
+            <a:ext cx="7966565" cy="4457701"/>
           </a:xfrm>
         </p:spPr>
         <p:txBody>
-          <a:bodyPr/>
+          <a:bodyPr>
+            <a:normAutofit/>
+          </a:bodyPr>
           <a:lstStyle/>
           <a:p>
-            <a:pPr lvl="0"/>
-            <a:r>
-              <a:rPr lang="es-ES" dirty="0" smtClean="0"/>
-              <a:t>Java </a:t>
-            </a:r>
-            <a:r>
-              <a:rPr lang="es-ES" dirty="0"/>
-              <a:t>comes </a:t>
-            </a:r>
-            <a:r>
-              <a:rPr lang="es-ES" dirty="0" err="1"/>
-              <a:t>with</a:t>
-            </a:r>
-            <a:r>
-              <a:rPr lang="es-ES" dirty="0"/>
-              <a:t> </a:t>
-            </a:r>
-            <a:r>
-              <a:rPr lang="es-ES" dirty="0" err="1"/>
-              <a:t>an</a:t>
-            </a:r>
-            <a:r>
-              <a:rPr lang="es-ES" dirty="0"/>
-              <a:t> </a:t>
-            </a:r>
-            <a:r>
-              <a:rPr lang="es-ES" dirty="0" err="1"/>
-              <a:t>extensive</a:t>
-            </a:r>
-            <a:r>
-              <a:rPr lang="es-ES" dirty="0"/>
-              <a:t> standard </a:t>
-            </a:r>
-            <a:r>
-              <a:rPr lang="es-ES" dirty="0" err="1"/>
-              <a:t>library</a:t>
-            </a:r>
-            <a:r>
-              <a:rPr lang="es-ES" dirty="0"/>
-              <a:t> </a:t>
-            </a:r>
-            <a:r>
-              <a:rPr lang="es-ES" dirty="0" err="1"/>
-              <a:t>that</a:t>
-            </a:r>
-            <a:r>
-              <a:rPr lang="es-ES" dirty="0"/>
-              <a:t> </a:t>
-            </a:r>
-            <a:r>
-              <a:rPr lang="es-ES" dirty="0" err="1"/>
-              <a:t>provides</a:t>
-            </a:r>
-            <a:r>
-              <a:rPr lang="es-ES" dirty="0"/>
-              <a:t> </a:t>
-            </a:r>
-            <a:r>
-              <a:rPr lang="es-ES" dirty="0" err="1"/>
-              <a:t>classes</a:t>
-            </a:r>
-            <a:r>
-              <a:rPr lang="es-ES" dirty="0"/>
-              <a:t> and </a:t>
-            </a:r>
-            <a:r>
-              <a:rPr lang="es-ES" dirty="0" err="1"/>
-              <a:t>methods</a:t>
-            </a:r>
-            <a:r>
-              <a:rPr lang="es-ES" dirty="0"/>
-              <a:t> </a:t>
-            </a:r>
-            <a:r>
-              <a:rPr lang="es-ES" dirty="0" err="1"/>
-              <a:t>for</a:t>
-            </a:r>
-            <a:r>
-              <a:rPr lang="es-ES" dirty="0"/>
-              <a:t> </a:t>
-            </a:r>
-            <a:r>
-              <a:rPr lang="es-ES" dirty="0" err="1"/>
-              <a:t>various</a:t>
-            </a:r>
-            <a:r>
-              <a:rPr lang="es-ES" dirty="0"/>
-              <a:t> </a:t>
-            </a:r>
-            <a:r>
-              <a:rPr lang="es-ES" dirty="0" err="1"/>
-              <a:t>tasks</a:t>
-            </a:r>
-            <a:r>
-              <a:rPr lang="es-ES" dirty="0"/>
-              <a:t>, </a:t>
-            </a:r>
-            <a:r>
-              <a:rPr lang="es-ES" dirty="0" err="1"/>
-              <a:t>from</a:t>
-            </a:r>
-            <a:r>
-              <a:rPr lang="es-ES" dirty="0"/>
-              <a:t> </a:t>
-            </a:r>
-            <a:r>
-              <a:rPr lang="es-ES" dirty="0" err="1"/>
-              <a:t>string</a:t>
-            </a:r>
-            <a:r>
-              <a:rPr lang="es-ES" dirty="0"/>
-              <a:t> </a:t>
-            </a:r>
-            <a:r>
-              <a:rPr lang="es-ES" dirty="0" err="1"/>
-              <a:t>manipulation</a:t>
-            </a:r>
-            <a:r>
-              <a:rPr lang="es-ES" dirty="0"/>
-              <a:t> </a:t>
-            </a:r>
-            <a:r>
-              <a:rPr lang="es-ES" dirty="0" err="1"/>
-              <a:t>to</a:t>
-            </a:r>
-            <a:r>
-              <a:rPr lang="es-ES" dirty="0"/>
-              <a:t> </a:t>
-            </a:r>
-            <a:r>
-              <a:rPr lang="es-ES" dirty="0" err="1"/>
-              <a:t>network</a:t>
-            </a:r>
-            <a:r>
-              <a:rPr lang="es-ES" dirty="0"/>
-              <a:t> </a:t>
-            </a:r>
-            <a:r>
-              <a:rPr lang="es-ES" dirty="0" err="1"/>
-              <a:t>operations</a:t>
-            </a:r>
-            <a:r>
-              <a:rPr lang="es-ES" dirty="0"/>
+            <a:r>
+              <a:rPr lang="en-US" dirty="0"/>
+              <a:t>Java is an </a:t>
+            </a:r>
+            <a:r>
+              <a:rPr lang="en-US" b="1" dirty="0"/>
+              <a:t>object-oriented programming language</a:t>
+            </a:r>
+            <a:r>
+              <a:rPr lang="en-US" dirty="0"/>
               <a:t>.</a:t>
             </a:r>
+          </a:p>
+          <a:p>
+            <a:pPr algn="l">
+              <a:buFont typeface="Arial" panose="020B0604020202020204" pitchFamily="34" charset="0"/>
+              <a:buChar char="•"/>
+            </a:pPr>
+            <a:r>
+              <a:rPr lang="en-US" b="0" i="0" dirty="0">
+                <a:solidFill>
+                  <a:srgbClr val="ECECF1"/>
+                </a:solidFill>
+                <a:effectLst/>
+                <a:latin typeface="Söhne"/>
+              </a:rPr>
+              <a:t>Based on the concept of "objects" encapsulating data and behavior</a:t>
+            </a:r>
+          </a:p>
+          <a:p>
+            <a:pPr algn="l">
+              <a:buFont typeface="Arial" panose="020B0604020202020204" pitchFamily="34" charset="0"/>
+              <a:buChar char="•"/>
+            </a:pPr>
+            <a:r>
+              <a:rPr lang="en-US" b="0" i="0" dirty="0">
+                <a:solidFill>
+                  <a:srgbClr val="ECECF1"/>
+                </a:solidFill>
+                <a:effectLst/>
+                <a:latin typeface="Söhne"/>
+              </a:rPr>
+              <a:t>Java is a widely used, object-oriented programming language</a:t>
+            </a:r>
+          </a:p>
+          <a:p>
+            <a:pPr algn="l">
+              <a:buFont typeface="Arial" panose="020B0604020202020204" pitchFamily="34" charset="0"/>
+              <a:buChar char="•"/>
+            </a:pPr>
+            <a:r>
+              <a:rPr lang="en-US" b="0" i="0" dirty="0">
+                <a:solidFill>
+                  <a:srgbClr val="ECECF1"/>
+                </a:solidFill>
+                <a:effectLst/>
+                <a:latin typeface="Söhne"/>
+              </a:rPr>
+              <a:t>Key Aspects:</a:t>
+            </a:r>
+          </a:p>
+          <a:p>
+            <a:pPr marL="742950" lvl="1" indent="-285750" algn="l">
+              <a:buFont typeface="Arial" panose="020B0604020202020204" pitchFamily="34" charset="0"/>
+              <a:buChar char="•"/>
+            </a:pPr>
+            <a:r>
+              <a:rPr lang="en-US" b="0" i="0" dirty="0">
+                <a:solidFill>
+                  <a:srgbClr val="ECECF1"/>
+                </a:solidFill>
+                <a:effectLst/>
+                <a:latin typeface="Söhne"/>
+              </a:rPr>
+              <a:t>Everything in Java is considered an object</a:t>
+            </a:r>
+          </a:p>
+          <a:p>
+            <a:pPr marL="742950" lvl="1" indent="-285750" algn="l">
+              <a:buFont typeface="Arial" panose="020B0604020202020204" pitchFamily="34" charset="0"/>
+              <a:buChar char="•"/>
+            </a:pPr>
+            <a:r>
+              <a:rPr lang="en-US" b="0" i="0" dirty="0">
+                <a:solidFill>
+                  <a:srgbClr val="ECECF1"/>
+                </a:solidFill>
+                <a:effectLst/>
+                <a:latin typeface="Söhne"/>
+              </a:rPr>
+              <a:t>Objects are instances of classes, serving as blueprints</a:t>
+            </a:r>
+          </a:p>
+          <a:p>
+            <a:pPr marL="742950" lvl="1" indent="-285750" algn="l">
+              <a:buFont typeface="Arial" panose="020B0604020202020204" pitchFamily="34" charset="0"/>
+              <a:buChar char="•"/>
+            </a:pPr>
+            <a:r>
+              <a:rPr lang="en-US" b="0" i="0" dirty="0">
+                <a:solidFill>
+                  <a:srgbClr val="ECECF1"/>
+                </a:solidFill>
+                <a:effectLst/>
+                <a:latin typeface="Söhne"/>
+              </a:rPr>
+              <a:t>Classes define properties (attributes) and behaviors (methods)</a:t>
+            </a:r>
+          </a:p>
+          <a:p>
+            <a:endParaRPr lang="en-US" dirty="0"/>
           </a:p>
           <a:p>
             <a:endParaRPr lang="es-ES" dirty="0"/>
           </a:p>
         </p:txBody>
       </p:sp>
-      <p:pic>
-        <p:nvPicPr>
-          <p:cNvPr id="4" name="Imagen 3"/>
-          <p:cNvPicPr>
-            <a:picLocks noChangeAspect="1"/>
-          </p:cNvPicPr>
-          <p:nvPr/>
-        </p:nvPicPr>
-        <p:blipFill>
-          <a:blip r:embed="rId2"/>
-          <a:stretch>
-            <a:fillRect/>
-          </a:stretch>
-        </p:blipFill>
-        <p:spPr>
-          <a:xfrm>
-            <a:off x="8416452" y="476536"/>
-            <a:ext cx="3090701" cy="2128119"/>
-          </a:xfrm>
-          <a:prstGeom prst="rect">
-            <a:avLst/>
-          </a:prstGeom>
-        </p:spPr>
-      </p:pic>
     </p:spTree>
     <p:extLst>
       <p:ext uri="{BB962C8B-B14F-4D97-AF65-F5344CB8AC3E}">
-        <p14:creationId xmlns:p14="http://schemas.microsoft.com/office/powerpoint/2010/main" val="1712957340"/>
+        <p14:creationId xmlns:p14="http://schemas.microsoft.com/office/powerpoint/2010/main" val="3037264697"/>
       </p:ext>
     </p:extLst>
   </p:cSld>
@@ -13458,7 +14091,13 @@
       </p:grpSpPr>
       <p:sp>
         <p:nvSpPr>
-          <p:cNvPr id="2" name="Título 1"/>
+          <p:cNvPr id="2" name="Título 1">
+            <a:extLst>
+              <a:ext uri="{FF2B5EF4-FFF2-40B4-BE49-F238E27FC236}">
+                <a16:creationId xmlns:a16="http://schemas.microsoft.com/office/drawing/2014/main" id="{74BEBA16-9604-EB9B-5CC3-DED19C6FCB0E}"/>
+              </a:ext>
+            </a:extLst>
+          </p:cNvPr>
           <p:cNvSpPr>
             <a:spLocks noGrp="1"/>
           </p:cNvSpPr>
@@ -13466,26 +14105,39 @@
             <p:ph type="title"/>
           </p:nvPr>
         </p:nvSpPr>
-        <p:spPr/>
+        <p:spPr>
+          <a:xfrm>
+            <a:off x="1141413" y="618518"/>
+            <a:ext cx="9905998" cy="884967"/>
+          </a:xfrm>
+        </p:spPr>
         <p:txBody>
           <a:bodyPr/>
           <a:lstStyle/>
           <a:p>
             <a:r>
-              <a:rPr lang="es-ES" b="1" dirty="0" smtClean="0"/>
-              <a:t>JAVA EE and se </a:t>
-            </a:r>
-            <a:r>
-              <a:rPr lang="es-ES" b="1" dirty="0" err="1" smtClean="0"/>
-              <a:t>platform</a:t>
-            </a:r>
-            <a:endParaRPr lang="es-ES" b="1" dirty="0"/>
+              <a:rPr lang="en-US" b="1" i="0" dirty="0">
+                <a:solidFill>
+                  <a:srgbClr val="ECECF1"/>
+                </a:solidFill>
+                <a:effectLst/>
+                <a:latin typeface="Söhne"/>
+              </a:rPr>
+              <a:t>Principles of Object Orientation in Java</a:t>
+            </a:r>
+            <a:endParaRPr lang="es-ES" dirty="0"/>
           </a:p>
         </p:txBody>
       </p:sp>
       <p:sp>
         <p:nvSpPr>
-          <p:cNvPr id="3" name="Marcador de contenido 2"/>
+          <p:cNvPr id="3" name="Marcador de contenido 2">
+            <a:extLst>
+              <a:ext uri="{FF2B5EF4-FFF2-40B4-BE49-F238E27FC236}">
+                <a16:creationId xmlns:a16="http://schemas.microsoft.com/office/drawing/2014/main" id="{849F777A-0F6D-1885-69C4-928F5AFA1CA5}"/>
+              </a:ext>
+            </a:extLst>
+          </p:cNvPr>
           <p:cNvSpPr>
             <a:spLocks noGrp="1"/>
           </p:cNvSpPr>
@@ -13498,14 +14150,158 @@
           <a:bodyPr/>
           <a:lstStyle/>
           <a:p>
-            <a:endParaRPr lang="es-ES"/>
+            <a:r>
+              <a:rPr lang="es-ES" b="0" i="0" dirty="0" err="1">
+                <a:solidFill>
+                  <a:srgbClr val="ECECF1"/>
+                </a:solidFill>
+                <a:effectLst/>
+                <a:latin typeface="Söhne"/>
+              </a:rPr>
+              <a:t>Encapsulation</a:t>
+            </a:r>
+            <a:r>
+              <a:rPr lang="es-ES" dirty="0">
+                <a:solidFill>
+                  <a:srgbClr val="ECECF1"/>
+                </a:solidFill>
+                <a:latin typeface="Söhne"/>
+              </a:rPr>
+              <a:t>.</a:t>
+            </a:r>
+          </a:p>
+          <a:p>
+            <a:r>
+              <a:rPr lang="es-ES" b="0" i="0" dirty="0" err="1">
+                <a:solidFill>
+                  <a:srgbClr val="ECECF1"/>
+                </a:solidFill>
+                <a:effectLst/>
+                <a:latin typeface="Söhne"/>
+              </a:rPr>
+              <a:t>Inheritance</a:t>
+            </a:r>
+            <a:r>
+              <a:rPr lang="es-ES" dirty="0">
+                <a:solidFill>
+                  <a:srgbClr val="ECECF1"/>
+                </a:solidFill>
+                <a:latin typeface="Söhne"/>
+              </a:rPr>
+              <a:t>.</a:t>
+            </a:r>
+          </a:p>
+          <a:p>
+            <a:r>
+              <a:rPr lang="es-ES" b="0" i="0" dirty="0" err="1">
+                <a:solidFill>
+                  <a:srgbClr val="ECECF1"/>
+                </a:solidFill>
+                <a:effectLst/>
+                <a:latin typeface="Söhne"/>
+              </a:rPr>
+              <a:t>Polymorphism</a:t>
+            </a:r>
+            <a:r>
+              <a:rPr lang="es-ES" dirty="0">
+                <a:solidFill>
+                  <a:srgbClr val="ECECF1"/>
+                </a:solidFill>
+                <a:latin typeface="Söhne"/>
+              </a:rPr>
+              <a:t>.</a:t>
+            </a:r>
+          </a:p>
+          <a:p>
+            <a:r>
+              <a:rPr lang="es-ES" b="0" i="0" dirty="0" err="1">
+                <a:solidFill>
+                  <a:srgbClr val="ECECF1"/>
+                </a:solidFill>
+                <a:effectLst/>
+                <a:latin typeface="Söhne"/>
+              </a:rPr>
+              <a:t>Abstraction</a:t>
+            </a:r>
+            <a:r>
+              <a:rPr lang="es-ES" b="0" i="0" dirty="0">
+                <a:solidFill>
+                  <a:srgbClr val="ECECF1"/>
+                </a:solidFill>
+                <a:effectLst/>
+                <a:latin typeface="Söhne"/>
+              </a:rPr>
+              <a:t>.</a:t>
+            </a:r>
+          </a:p>
+          <a:p>
+            <a:r>
+              <a:rPr lang="es-ES" b="0" i="0" dirty="0" err="1">
+                <a:solidFill>
+                  <a:srgbClr val="ECECF1"/>
+                </a:solidFill>
+                <a:effectLst/>
+                <a:latin typeface="Söhne"/>
+              </a:rPr>
+              <a:t>Association</a:t>
+            </a:r>
+            <a:r>
+              <a:rPr lang="es-ES" b="0" i="0" dirty="0">
+                <a:solidFill>
+                  <a:srgbClr val="ECECF1"/>
+                </a:solidFill>
+                <a:effectLst/>
+                <a:latin typeface="Söhne"/>
+              </a:rPr>
+              <a:t> and </a:t>
+            </a:r>
+            <a:r>
+              <a:rPr lang="es-ES" b="0" i="0" dirty="0" err="1">
+                <a:solidFill>
+                  <a:srgbClr val="ECECF1"/>
+                </a:solidFill>
+                <a:effectLst/>
+                <a:latin typeface="Söhne"/>
+              </a:rPr>
+              <a:t>Composition</a:t>
+            </a:r>
+            <a:endParaRPr lang="es-ES" dirty="0"/>
           </a:p>
         </p:txBody>
       </p:sp>
+      <p:pic>
+        <p:nvPicPr>
+          <p:cNvPr id="4" name="Imagen 3" descr="Diagrama&#10;&#10;Descripción generada automáticamente">
+            <a:extLst>
+              <a:ext uri="{FF2B5EF4-FFF2-40B4-BE49-F238E27FC236}">
+                <a16:creationId xmlns:a16="http://schemas.microsoft.com/office/drawing/2014/main" id="{B7D4AB8A-B916-31BA-A892-898A650E5345}"/>
+              </a:ext>
+            </a:extLst>
+          </p:cNvPr>
+          <p:cNvPicPr>
+            <a:picLocks noChangeAspect="1"/>
+          </p:cNvPicPr>
+          <p:nvPr/>
+        </p:nvPicPr>
+        <p:blipFill rotWithShape="1">
+          <a:blip r:embed="rId2"/>
+          <a:srcRect r="8409" b="13116"/>
+          <a:stretch/>
+        </p:blipFill>
+        <p:spPr>
+          <a:xfrm>
+            <a:off x="6782352" y="2055629"/>
+            <a:ext cx="3361773" cy="2876902"/>
+          </a:xfrm>
+          <a:prstGeom prst="rect">
+            <a:avLst/>
+          </a:prstGeom>
+        </p:spPr>
+      </p:pic>
     </p:spTree>
     <p:extLst>
       <p:ext uri="{BB962C8B-B14F-4D97-AF65-F5344CB8AC3E}">
-        <p14:creationId xmlns:p14="http://schemas.microsoft.com/office/powerpoint/2010/main" val="2771062716"/>
+        <p14:creationId xmlns:p14="http://schemas.microsoft.com/office/powerpoint/2010/main" val="3939488540"/>
       </p:ext>
     </p:extLst>
   </p:cSld>
@@ -13548,11 +14344,470 @@
           <a:lstStyle/>
           <a:p>
             <a:r>
-              <a:rPr lang="es-ES" b="1" dirty="0" smtClean="0"/>
+              <a:rPr lang="es-ES" b="1" dirty="0" err="1"/>
+              <a:t>Memory</a:t>
+            </a:r>
+            <a:r>
+              <a:rPr lang="es-ES" b="1" dirty="0"/>
+              <a:t> </a:t>
+            </a:r>
+            <a:r>
+              <a:rPr lang="es-ES" b="1" dirty="0" err="1"/>
+              <a:t>management</a:t>
+            </a:r>
+            <a:r>
+              <a:rPr lang="es-ES" b="1" dirty="0"/>
+              <a:t> and </a:t>
+            </a:r>
+            <a:r>
+              <a:rPr lang="es-ES" b="1" dirty="0" err="1"/>
+              <a:t>garbaje</a:t>
+            </a:r>
+            <a:r>
+              <a:rPr lang="es-ES" b="1" dirty="0"/>
+              <a:t> </a:t>
+            </a:r>
+            <a:r>
+              <a:rPr lang="es-ES" b="1" dirty="0" err="1"/>
+              <a:t>collection</a:t>
+            </a:r>
+            <a:endParaRPr lang="es-ES" b="1" dirty="0"/>
+          </a:p>
+        </p:txBody>
+      </p:sp>
+      <p:sp>
+        <p:nvSpPr>
+          <p:cNvPr id="3" name="Marcador de contenido 2"/>
+          <p:cNvSpPr>
+            <a:spLocks noGrp="1"/>
+          </p:cNvSpPr>
+          <p:nvPr>
+            <p:ph idx="1"/>
+          </p:nvPr>
+        </p:nvSpPr>
+        <p:spPr/>
+        <p:txBody>
+          <a:bodyPr/>
+          <a:lstStyle/>
+          <a:p>
+            <a:r>
+              <a:rPr lang="en-US" b="1" dirty="0"/>
+              <a:t>Automatic Memory Management:</a:t>
+            </a:r>
+            <a:r>
+              <a:rPr lang="en-US" dirty="0"/>
+              <a:t> Java uses a garbage collector to automatically manage memory.</a:t>
+            </a:r>
+            <a:endParaRPr lang="es-ES" dirty="0"/>
+          </a:p>
+          <a:p>
+            <a:endParaRPr lang="es-ES" dirty="0"/>
+          </a:p>
+        </p:txBody>
+      </p:sp>
+      <p:pic>
+        <p:nvPicPr>
+          <p:cNvPr id="4" name="Imagen 3"/>
+          <p:cNvPicPr>
+            <a:picLocks noChangeAspect="1"/>
+          </p:cNvPicPr>
+          <p:nvPr/>
+        </p:nvPicPr>
+        <p:blipFill>
+          <a:blip r:embed="rId2"/>
+          <a:stretch>
+            <a:fillRect/>
+          </a:stretch>
+        </p:blipFill>
+        <p:spPr>
+          <a:xfrm>
+            <a:off x="1385454" y="2954898"/>
+            <a:ext cx="4655128" cy="4655128"/>
+          </a:xfrm>
+          <a:prstGeom prst="rect">
+            <a:avLst/>
+          </a:prstGeom>
+        </p:spPr>
+      </p:pic>
+    </p:spTree>
+    <p:extLst>
+      <p:ext uri="{BB962C8B-B14F-4D97-AF65-F5344CB8AC3E}">
+        <p14:creationId xmlns:p14="http://schemas.microsoft.com/office/powerpoint/2010/main" val="528157625"/>
+      </p:ext>
+    </p:extLst>
+  </p:cSld>
+  <p:clrMapOvr>
+    <a:masterClrMapping/>
+  </p:clrMapOvr>
+</p:sld>
+</file>
+
+<file path=ppt/slides/slide6.xml><?xml version="1.0" encoding="utf-8"?>
+<p:sld xmlns:a="http://schemas.openxmlformats.org/drawingml/2006/main" xmlns:r="http://schemas.openxmlformats.org/officeDocument/2006/relationships" xmlns:p="http://schemas.openxmlformats.org/presentationml/2006/main">
+  <p:cSld>
+    <p:spTree>
+      <p:nvGrpSpPr>
+        <p:cNvPr id="1" name=""/>
+        <p:cNvGrpSpPr/>
+        <p:nvPr/>
+      </p:nvGrpSpPr>
+      <p:grpSpPr>
+        <a:xfrm>
+          <a:off x="0" y="0"/>
+          <a:ext cx="0" cy="0"/>
+          <a:chOff x="0" y="0"/>
+          <a:chExt cx="0" cy="0"/>
+        </a:xfrm>
+      </p:grpSpPr>
+      <p:sp>
+        <p:nvSpPr>
+          <p:cNvPr id="2" name="Título 1"/>
+          <p:cNvSpPr>
+            <a:spLocks noGrp="1"/>
+          </p:cNvSpPr>
+          <p:nvPr>
+            <p:ph type="title"/>
+          </p:nvPr>
+        </p:nvSpPr>
+        <p:spPr/>
+        <p:txBody>
+          <a:bodyPr/>
+          <a:lstStyle/>
+          <a:p>
+            <a:r>
+              <a:rPr lang="es-ES" b="1" dirty="0" err="1"/>
+              <a:t>Extensive</a:t>
+            </a:r>
+            <a:r>
+              <a:rPr lang="es-ES" b="1" dirty="0"/>
+              <a:t> Standard Library</a:t>
+            </a:r>
+          </a:p>
+        </p:txBody>
+      </p:sp>
+      <p:sp>
+        <p:nvSpPr>
+          <p:cNvPr id="3" name="Marcador de contenido 2"/>
+          <p:cNvSpPr>
+            <a:spLocks noGrp="1"/>
+          </p:cNvSpPr>
+          <p:nvPr>
+            <p:ph idx="1"/>
+          </p:nvPr>
+        </p:nvSpPr>
+        <p:spPr>
+          <a:xfrm>
+            <a:off x="1141412" y="3256250"/>
+            <a:ext cx="9905999" cy="1555895"/>
+          </a:xfrm>
+        </p:spPr>
+        <p:txBody>
+          <a:bodyPr/>
+          <a:lstStyle/>
+          <a:p>
+            <a:pPr lvl="0"/>
+            <a:r>
+              <a:rPr lang="es-ES" dirty="0"/>
+              <a:t>Java comes </a:t>
+            </a:r>
+            <a:r>
+              <a:rPr lang="es-ES" dirty="0" err="1"/>
+              <a:t>with</a:t>
+            </a:r>
+            <a:r>
+              <a:rPr lang="es-ES" dirty="0"/>
+              <a:t> </a:t>
+            </a:r>
+            <a:r>
+              <a:rPr lang="es-ES" dirty="0" err="1"/>
+              <a:t>an</a:t>
+            </a:r>
+            <a:r>
+              <a:rPr lang="es-ES" dirty="0"/>
+              <a:t> </a:t>
+            </a:r>
+            <a:r>
+              <a:rPr lang="es-ES" dirty="0" err="1"/>
+              <a:t>extensive</a:t>
+            </a:r>
+            <a:r>
+              <a:rPr lang="es-ES" dirty="0"/>
+              <a:t> standard </a:t>
+            </a:r>
+            <a:r>
+              <a:rPr lang="es-ES" dirty="0" err="1"/>
+              <a:t>library</a:t>
+            </a:r>
+            <a:r>
+              <a:rPr lang="es-ES" dirty="0"/>
+              <a:t> </a:t>
+            </a:r>
+            <a:r>
+              <a:rPr lang="es-ES" dirty="0" err="1"/>
+              <a:t>that</a:t>
+            </a:r>
+            <a:r>
+              <a:rPr lang="es-ES" dirty="0"/>
+              <a:t> </a:t>
+            </a:r>
+            <a:r>
+              <a:rPr lang="es-ES" dirty="0" err="1"/>
+              <a:t>provides</a:t>
+            </a:r>
+            <a:r>
+              <a:rPr lang="es-ES" dirty="0"/>
+              <a:t> </a:t>
+            </a:r>
+            <a:r>
+              <a:rPr lang="es-ES" dirty="0" err="1"/>
+              <a:t>classes</a:t>
+            </a:r>
+            <a:r>
+              <a:rPr lang="es-ES" dirty="0"/>
+              <a:t> and </a:t>
+            </a:r>
+            <a:r>
+              <a:rPr lang="es-ES" dirty="0" err="1"/>
+              <a:t>methods</a:t>
+            </a:r>
+            <a:r>
+              <a:rPr lang="es-ES" dirty="0"/>
+              <a:t> </a:t>
+            </a:r>
+            <a:r>
+              <a:rPr lang="es-ES" dirty="0" err="1"/>
+              <a:t>for</a:t>
+            </a:r>
+            <a:r>
+              <a:rPr lang="es-ES" dirty="0"/>
+              <a:t> </a:t>
+            </a:r>
+            <a:r>
+              <a:rPr lang="es-ES" dirty="0" err="1"/>
+              <a:t>various</a:t>
+            </a:r>
+            <a:r>
+              <a:rPr lang="es-ES" dirty="0"/>
+              <a:t> </a:t>
+            </a:r>
+            <a:r>
+              <a:rPr lang="es-ES" dirty="0" err="1"/>
+              <a:t>tasks</a:t>
+            </a:r>
+            <a:r>
+              <a:rPr lang="es-ES" dirty="0"/>
+              <a:t>, </a:t>
+            </a:r>
+            <a:r>
+              <a:rPr lang="es-ES" dirty="0" err="1"/>
+              <a:t>from</a:t>
+            </a:r>
+            <a:r>
+              <a:rPr lang="es-ES" dirty="0"/>
+              <a:t> </a:t>
+            </a:r>
+            <a:r>
+              <a:rPr lang="es-ES" dirty="0" err="1"/>
+              <a:t>string</a:t>
+            </a:r>
+            <a:r>
+              <a:rPr lang="es-ES" dirty="0"/>
+              <a:t> </a:t>
+            </a:r>
+            <a:r>
+              <a:rPr lang="es-ES" dirty="0" err="1"/>
+              <a:t>manipulation</a:t>
+            </a:r>
+            <a:r>
+              <a:rPr lang="es-ES" dirty="0"/>
+              <a:t> </a:t>
+            </a:r>
+            <a:r>
+              <a:rPr lang="es-ES" dirty="0" err="1"/>
+              <a:t>to</a:t>
+            </a:r>
+            <a:r>
+              <a:rPr lang="es-ES" dirty="0"/>
+              <a:t> </a:t>
+            </a:r>
+            <a:r>
+              <a:rPr lang="es-ES" dirty="0" err="1"/>
+              <a:t>network</a:t>
+            </a:r>
+            <a:r>
+              <a:rPr lang="es-ES" dirty="0"/>
+              <a:t> </a:t>
+            </a:r>
+            <a:r>
+              <a:rPr lang="es-ES" dirty="0" err="1"/>
+              <a:t>operations</a:t>
+            </a:r>
+            <a:r>
+              <a:rPr lang="es-ES" dirty="0"/>
+              <a:t>.</a:t>
+            </a:r>
+          </a:p>
+          <a:p>
+            <a:endParaRPr lang="es-ES" dirty="0"/>
+          </a:p>
+        </p:txBody>
+      </p:sp>
+      <p:pic>
+        <p:nvPicPr>
+          <p:cNvPr id="5" name="Imagen 4" descr="Imagen digital de un librero&#10;&#10;Descripción generada automáticamente con confianza media">
+            <a:extLst>
+              <a:ext uri="{FF2B5EF4-FFF2-40B4-BE49-F238E27FC236}">
+                <a16:creationId xmlns:a16="http://schemas.microsoft.com/office/drawing/2014/main" id="{FB8DC255-75CB-860B-C69C-26E32A531808}"/>
+              </a:ext>
+            </a:extLst>
+          </p:cNvPr>
+          <p:cNvPicPr>
+            <a:picLocks noChangeAspect="1"/>
+          </p:cNvPicPr>
+          <p:nvPr/>
+        </p:nvPicPr>
+        <p:blipFill rotWithShape="1">
+          <a:blip r:embed="rId2"/>
+          <a:srcRect l="31117" t="4861" r="19550" b="28472"/>
+          <a:stretch/>
+        </p:blipFill>
+        <p:spPr>
+          <a:xfrm>
+            <a:off x="8496300" y="514350"/>
+            <a:ext cx="2157651" cy="1943100"/>
+          </a:xfrm>
+          <a:prstGeom prst="rect">
+            <a:avLst/>
+          </a:prstGeom>
+        </p:spPr>
+      </p:pic>
+    </p:spTree>
+    <p:extLst>
+      <p:ext uri="{BB962C8B-B14F-4D97-AF65-F5344CB8AC3E}">
+        <p14:creationId xmlns:p14="http://schemas.microsoft.com/office/powerpoint/2010/main" val="1712957340"/>
+      </p:ext>
+    </p:extLst>
+  </p:cSld>
+  <p:clrMapOvr>
+    <a:masterClrMapping/>
+  </p:clrMapOvr>
+</p:sld>
+</file>
+
+<file path=ppt/slides/slide7.xml><?xml version="1.0" encoding="utf-8"?>
+<p:sld xmlns:a="http://schemas.openxmlformats.org/drawingml/2006/main" xmlns:r="http://schemas.openxmlformats.org/officeDocument/2006/relationships" xmlns:p="http://schemas.openxmlformats.org/presentationml/2006/main">
+  <p:cSld>
+    <p:spTree>
+      <p:nvGrpSpPr>
+        <p:cNvPr id="1" name=""/>
+        <p:cNvGrpSpPr/>
+        <p:nvPr/>
+      </p:nvGrpSpPr>
+      <p:grpSpPr>
+        <a:xfrm>
+          <a:off x="0" y="0"/>
+          <a:ext cx="0" cy="0"/>
+          <a:chOff x="0" y="0"/>
+          <a:chExt cx="0" cy="0"/>
+        </a:xfrm>
+      </p:grpSpPr>
+      <p:sp>
+        <p:nvSpPr>
+          <p:cNvPr id="2" name="Título 1"/>
+          <p:cNvSpPr>
+            <a:spLocks noGrp="1"/>
+          </p:cNvSpPr>
+          <p:nvPr>
+            <p:ph type="title"/>
+          </p:nvPr>
+        </p:nvSpPr>
+        <p:spPr/>
+        <p:txBody>
+          <a:bodyPr/>
+          <a:lstStyle/>
+          <a:p>
+            <a:r>
+              <a:rPr lang="es-ES" b="1" dirty="0"/>
+              <a:t>JAVA EE and se </a:t>
+            </a:r>
+            <a:r>
+              <a:rPr lang="es-ES" b="1" dirty="0" err="1"/>
+              <a:t>platform</a:t>
+            </a:r>
+            <a:endParaRPr lang="es-ES" b="1" dirty="0"/>
+          </a:p>
+        </p:txBody>
+      </p:sp>
+      <p:sp>
+        <p:nvSpPr>
+          <p:cNvPr id="3" name="Marcador de contenido 2"/>
+          <p:cNvSpPr>
+            <a:spLocks noGrp="1"/>
+          </p:cNvSpPr>
+          <p:nvPr>
+            <p:ph idx="1"/>
+          </p:nvPr>
+        </p:nvSpPr>
+        <p:spPr/>
+        <p:txBody>
+          <a:bodyPr/>
+          <a:lstStyle/>
+          <a:p>
+            <a:endParaRPr lang="es-ES"/>
+          </a:p>
+        </p:txBody>
+      </p:sp>
+    </p:spTree>
+    <p:extLst>
+      <p:ext uri="{BB962C8B-B14F-4D97-AF65-F5344CB8AC3E}">
+        <p14:creationId xmlns:p14="http://schemas.microsoft.com/office/powerpoint/2010/main" val="2771062716"/>
+      </p:ext>
+    </p:extLst>
+  </p:cSld>
+  <p:clrMapOvr>
+    <a:masterClrMapping/>
+  </p:clrMapOvr>
+</p:sld>
+</file>
+
+<file path=ppt/slides/slide8.xml><?xml version="1.0" encoding="utf-8"?>
+<p:sld xmlns:a="http://schemas.openxmlformats.org/drawingml/2006/main" xmlns:r="http://schemas.openxmlformats.org/officeDocument/2006/relationships" xmlns:p="http://schemas.openxmlformats.org/presentationml/2006/main">
+  <p:cSld>
+    <p:spTree>
+      <p:nvGrpSpPr>
+        <p:cNvPr id="1" name=""/>
+        <p:cNvGrpSpPr/>
+        <p:nvPr/>
+      </p:nvGrpSpPr>
+      <p:grpSpPr>
+        <a:xfrm>
+          <a:off x="0" y="0"/>
+          <a:ext cx="0" cy="0"/>
+          <a:chOff x="0" y="0"/>
+          <a:chExt cx="0" cy="0"/>
+        </a:xfrm>
+      </p:grpSpPr>
+      <p:sp>
+        <p:nvSpPr>
+          <p:cNvPr id="2" name="Título 1"/>
+          <p:cNvSpPr>
+            <a:spLocks noGrp="1"/>
+          </p:cNvSpPr>
+          <p:nvPr>
+            <p:ph type="title"/>
+          </p:nvPr>
+        </p:nvSpPr>
+        <p:spPr/>
+        <p:txBody>
+          <a:bodyPr/>
+          <a:lstStyle/>
+          <a:p>
+            <a:r>
+              <a:rPr lang="es-ES" b="1" dirty="0"/>
               <a:t>Java </a:t>
             </a:r>
             <a:r>
-              <a:rPr lang="es-ES" b="1" dirty="0" err="1" smtClean="0"/>
+              <a:rPr lang="es-ES" b="1" dirty="0" err="1"/>
               <a:t>curiosities</a:t>
             </a:r>
             <a:endParaRPr lang="es-ES" b="1" dirty="0"/>
@@ -13589,13 +14844,135 @@
               <a:rPr lang="en-US" dirty="0"/>
               <a:t> Java got its name from coffee. </a:t>
             </a:r>
-            <a:endParaRPr lang="en-US" dirty="0" smtClean="0"/>
+          </a:p>
+          <a:p>
+            <a:endParaRPr lang="en-US" dirty="0"/>
+          </a:p>
+          <a:p>
+            <a:r>
+              <a:rPr lang="es-ES" sz="2400" dirty="0" err="1">
+                <a:solidFill>
+                  <a:srgbClr val="FFFFFF"/>
+                </a:solidFill>
+              </a:rPr>
+              <a:t>It</a:t>
+            </a:r>
+            <a:r>
+              <a:rPr lang="es-ES" sz="2400" dirty="0">
+                <a:solidFill>
+                  <a:srgbClr val="FFFFFF"/>
+                </a:solidFill>
+              </a:rPr>
+              <a:t> </a:t>
+            </a:r>
+            <a:r>
+              <a:rPr lang="es-ES" sz="2400" dirty="0" err="1">
+                <a:solidFill>
+                  <a:srgbClr val="FFFFFF"/>
+                </a:solidFill>
+              </a:rPr>
+              <a:t>was</a:t>
+            </a:r>
+            <a:r>
+              <a:rPr lang="es-ES" sz="2400" dirty="0">
+                <a:solidFill>
+                  <a:srgbClr val="FFFFFF"/>
+                </a:solidFill>
+              </a:rPr>
+              <a:t> </a:t>
+            </a:r>
+            <a:r>
+              <a:rPr lang="es-ES" sz="2400" dirty="0" err="1">
+                <a:solidFill>
+                  <a:srgbClr val="FFFFFF"/>
+                </a:solidFill>
+              </a:rPr>
+              <a:t>designed</a:t>
+            </a:r>
+            <a:r>
+              <a:rPr lang="es-ES" sz="2400" dirty="0">
+                <a:solidFill>
+                  <a:srgbClr val="FFFFFF"/>
+                </a:solidFill>
+              </a:rPr>
+              <a:t> </a:t>
+            </a:r>
+            <a:r>
+              <a:rPr lang="es-ES" sz="2400" dirty="0" err="1">
+                <a:solidFill>
+                  <a:srgbClr val="FFFFFF"/>
+                </a:solidFill>
+              </a:rPr>
+              <a:t>to</a:t>
+            </a:r>
+            <a:r>
+              <a:rPr lang="es-ES" sz="2400" dirty="0">
+                <a:solidFill>
+                  <a:srgbClr val="FFFFFF"/>
+                </a:solidFill>
+              </a:rPr>
+              <a:t> </a:t>
+            </a:r>
+            <a:r>
+              <a:rPr lang="es-ES" sz="2400" dirty="0" err="1">
+                <a:solidFill>
+                  <a:srgbClr val="FFFFFF"/>
+                </a:solidFill>
+              </a:rPr>
+              <a:t>programm</a:t>
+            </a:r>
+            <a:r>
+              <a:rPr lang="es-ES" sz="2400" dirty="0">
+                <a:solidFill>
+                  <a:srgbClr val="FFFFFF"/>
+                </a:solidFill>
+              </a:rPr>
+              <a:t> </a:t>
+            </a:r>
+            <a:r>
+              <a:rPr lang="es-ES" sz="2400" dirty="0" err="1">
+                <a:solidFill>
+                  <a:srgbClr val="FFFFFF"/>
+                </a:solidFill>
+              </a:rPr>
+              <a:t>smart</a:t>
+            </a:r>
+            <a:r>
+              <a:rPr lang="es-ES" sz="2400" dirty="0">
+                <a:solidFill>
+                  <a:srgbClr val="FFFFFF"/>
+                </a:solidFill>
+              </a:rPr>
+              <a:t> </a:t>
+            </a:r>
+            <a:r>
+              <a:rPr lang="es-ES" sz="2400" dirty="0" err="1">
+                <a:solidFill>
+                  <a:srgbClr val="FFFFFF"/>
+                </a:solidFill>
+              </a:rPr>
+              <a:t>TVs</a:t>
+            </a:r>
+            <a:endParaRPr lang="es-ES" sz="2400" dirty="0">
+              <a:solidFill>
+                <a:srgbClr val="FFFFFF"/>
+              </a:solidFill>
+            </a:endParaRPr>
+          </a:p>
+          <a:p>
+            <a:endParaRPr lang="en-US" dirty="0"/>
           </a:p>
         </p:txBody>
       </p:sp>
       <p:pic>
         <p:nvPicPr>
-          <p:cNvPr id="5" name="Imagen 4"/>
+          <p:cNvPr id="4" name="Imagen 3">
+            <a:extLst>
+              <a:ext uri="{FF2B5EF4-FFF2-40B4-BE49-F238E27FC236}">
+                <a16:creationId xmlns:a16="http://schemas.microsoft.com/office/drawing/2014/main" id="{1EDE7C66-DD77-CF46-9BD3-E2B600D645ED}"/>
+              </a:ext>
+            </a:extLst>
+          </p:cNvPr>
           <p:cNvPicPr>
             <a:picLocks noChangeAspect="1"/>
           </p:cNvPicPr>
@@ -13609,8 +14986,8 @@
         </p:blipFill>
         <p:spPr>
           <a:xfrm>
-            <a:off x="7210580" y="1767899"/>
-            <a:ext cx="4390293" cy="2169321"/>
+            <a:off x="8134350" y="1466913"/>
+            <a:ext cx="2517179" cy="3277766"/>
           </a:xfrm>
           <a:prstGeom prst="rect">
             <a:avLst/>

</xml_diff>

<commit_message>
añadiendo aspectos clave y sintaxis
</commit_message>
<xml_diff>
--- a/Java_English - Alberto.pptx
+++ b/Java_English - Alberto.pptx
@@ -5,24 +5,23 @@
     <p:sldMasterId id="2147483648" r:id="rId1"/>
   </p:sldMasterIdLst>
   <p:notesMasterIdLst>
-    <p:notesMasterId r:id="rId14"/>
+    <p:notesMasterId r:id="rId13"/>
   </p:notesMasterIdLst>
   <p:handoutMasterIdLst>
-    <p:handoutMasterId r:id="rId15"/>
+    <p:handoutMasterId r:id="rId14"/>
   </p:handoutMasterIdLst>
   <p:sldIdLst>
     <p:sldId id="256" r:id="rId2"/>
     <p:sldId id="257" r:id="rId3"/>
-    <p:sldId id="266" r:id="rId4"/>
-    <p:sldId id="267" r:id="rId5"/>
-    <p:sldId id="264" r:id="rId6"/>
-    <p:sldId id="262" r:id="rId7"/>
-    <p:sldId id="265" r:id="rId8"/>
-    <p:sldId id="260" r:id="rId9"/>
-    <p:sldId id="268" r:id="rId10"/>
-    <p:sldId id="269" r:id="rId11"/>
-    <p:sldId id="258" r:id="rId12"/>
-    <p:sldId id="259" r:id="rId13"/>
+    <p:sldId id="270" r:id="rId4"/>
+    <p:sldId id="271" r:id="rId5"/>
+    <p:sldId id="266" r:id="rId6"/>
+    <p:sldId id="267" r:id="rId7"/>
+    <p:sldId id="264" r:id="rId8"/>
+    <p:sldId id="268" r:id="rId9"/>
+    <p:sldId id="269" r:id="rId10"/>
+    <p:sldId id="258" r:id="rId11"/>
+    <p:sldId id="259" r:id="rId12"/>
   </p:sldIdLst>
   <p:sldSz cx="12192000" cy="6858000"/>
   <p:notesSz cx="6858000" cy="9144000"/>
@@ -141,7 +140,7 @@
 </file>
 
 <file path=ppt/charts/chart1.xml><?xml version="1.0" encoding="utf-8"?>
-<c:chartSpace xmlns:c="http://schemas.openxmlformats.org/drawingml/2006/chart" xmlns:a="http://schemas.openxmlformats.org/drawingml/2006/main" xmlns:r="http://schemas.openxmlformats.org/officeDocument/2006/relationships" xmlns:c16r2="http://schemas.microsoft.com/office/drawing/2015/06/chart">
+<c:chartSpace xmlns:c="http://schemas.openxmlformats.org/drawingml/2006/chart" xmlns:a="http://schemas.openxmlformats.org/drawingml/2006/main" xmlns:r="http://schemas.openxmlformats.org/officeDocument/2006/relationships">
   <c:date1904 val="0"/>
   <c:lang val="es-ES"/>
   <c:roundedCorners val="0"/>
@@ -254,8 +253,9 @@
             <c:showPercent val="0"/>
             <c:showBubbleSize val="0"/>
             <c:showLeaderLines val="0"/>
-            <c:extLst>
+            <c:extLst xmlns:c16r2="http://schemas.microsoft.com/office/drawing/2015/06/chart">
               <c:ext xmlns:c15="http://schemas.microsoft.com/office/drawing/2012/chart" uri="{CE6537A1-D6FC-4f65-9D91-7224C49458BB}">
+                <c15:layout/>
                 <c15:showLeaderLines val="1"/>
                 <c15:leaderLines>
                   <c:spPr>
@@ -296,7 +296,7 @@
               </c:numCache>
             </c:numRef>
           </c:val>
-          <c:extLst>
+          <c:extLst xmlns:c16r2="http://schemas.microsoft.com/office/drawing/2015/06/chart">
             <c:ext xmlns:c16="http://schemas.microsoft.com/office/drawing/2014/chart" uri="{C3380CC4-5D6E-409C-BE32-E72D297353CC}">
               <c16:uniqueId val="{00000000-B7F8-46C4-953B-0E10AB423355}"/>
             </c:ext>
@@ -385,8 +385,9 @@
             <c:showPercent val="0"/>
             <c:showBubbleSize val="0"/>
             <c:showLeaderLines val="0"/>
-            <c:extLst>
+            <c:extLst xmlns:c16r2="http://schemas.microsoft.com/office/drawing/2015/06/chart">
               <c:ext xmlns:c15="http://schemas.microsoft.com/office/drawing/2012/chart" uri="{CE6537A1-D6FC-4f65-9D91-7224C49458BB}">
+                <c15:layout/>
                 <c15:showLeaderLines val="1"/>
                 <c15:leaderLines>
                   <c:spPr>
@@ -427,7 +428,7 @@
               </c:numCache>
             </c:numRef>
           </c:val>
-          <c:extLst>
+          <c:extLst xmlns:c16r2="http://schemas.microsoft.com/office/drawing/2015/06/chart">
             <c:ext xmlns:c16="http://schemas.microsoft.com/office/drawing/2014/chart" uri="{C3380CC4-5D6E-409C-BE32-E72D297353CC}">
               <c16:uniqueId val="{00000001-B7F8-46C4-953B-0E10AB423355}"/>
             </c:ext>
@@ -516,8 +517,9 @@
             <c:showPercent val="0"/>
             <c:showBubbleSize val="0"/>
             <c:showLeaderLines val="0"/>
-            <c:extLst>
+            <c:extLst xmlns:c16r2="http://schemas.microsoft.com/office/drawing/2015/06/chart">
               <c:ext xmlns:c15="http://schemas.microsoft.com/office/drawing/2012/chart" uri="{CE6537A1-D6FC-4f65-9D91-7224C49458BB}">
+                <c15:layout/>
                 <c15:showLeaderLines val="1"/>
                 <c15:leaderLines>
                   <c:spPr>
@@ -558,7 +560,7 @@
               </c:numCache>
             </c:numRef>
           </c:val>
-          <c:extLst>
+          <c:extLst xmlns:c16r2="http://schemas.microsoft.com/office/drawing/2015/06/chart">
             <c:ext xmlns:c16="http://schemas.microsoft.com/office/drawing/2014/chart" uri="{C3380CC4-5D6E-409C-BE32-E72D297353CC}">
               <c16:uniqueId val="{00000002-B7F8-46C4-953B-0E10AB423355}"/>
             </c:ext>
@@ -649,8 +651,9 @@
             <c:showPercent val="0"/>
             <c:showBubbleSize val="0"/>
             <c:showLeaderLines val="0"/>
-            <c:extLst>
+            <c:extLst xmlns:c16r2="http://schemas.microsoft.com/office/drawing/2015/06/chart">
               <c:ext xmlns:c15="http://schemas.microsoft.com/office/drawing/2012/chart" uri="{CE6537A1-D6FC-4f65-9D91-7224C49458BB}">
+                <c15:layout/>
                 <c15:showLeaderLines val="1"/>
                 <c15:leaderLines>
                   <c:spPr>
@@ -691,7 +694,7 @@
               </c:numCache>
             </c:numRef>
           </c:val>
-          <c:extLst>
+          <c:extLst xmlns:c16r2="http://schemas.microsoft.com/office/drawing/2015/06/chart">
             <c:ext xmlns:c16="http://schemas.microsoft.com/office/drawing/2014/chart" uri="{C3380CC4-5D6E-409C-BE32-E72D297353CC}">
               <c16:uniqueId val="{00000003-B7F8-46C4-953B-0E10AB423355}"/>
             </c:ext>
@@ -782,8 +785,9 @@
             <c:showPercent val="0"/>
             <c:showBubbleSize val="0"/>
             <c:showLeaderLines val="0"/>
-            <c:extLst>
+            <c:extLst xmlns:c16r2="http://schemas.microsoft.com/office/drawing/2015/06/chart">
               <c:ext xmlns:c15="http://schemas.microsoft.com/office/drawing/2012/chart" uri="{CE6537A1-D6FC-4f65-9D91-7224C49458BB}">
+                <c15:layout/>
                 <c15:showLeaderLines val="1"/>
                 <c15:leaderLines>
                   <c:spPr>
@@ -824,7 +828,7 @@
               </c:numCache>
             </c:numRef>
           </c:val>
-          <c:extLst>
+          <c:extLst xmlns:c16r2="http://schemas.microsoft.com/office/drawing/2015/06/chart">
             <c:ext xmlns:c16="http://schemas.microsoft.com/office/drawing/2014/chart" uri="{C3380CC4-5D6E-409C-BE32-E72D297353CC}">
               <c16:uniqueId val="{00000004-B7F8-46C4-953B-0E10AB423355}"/>
             </c:ext>
@@ -915,8 +919,9 @@
             <c:showPercent val="0"/>
             <c:showBubbleSize val="0"/>
             <c:showLeaderLines val="0"/>
-            <c:extLst>
+            <c:extLst xmlns:c16r2="http://schemas.microsoft.com/office/drawing/2015/06/chart">
               <c:ext xmlns:c15="http://schemas.microsoft.com/office/drawing/2012/chart" uri="{CE6537A1-D6FC-4f65-9D91-7224C49458BB}">
+                <c15:layout/>
                 <c15:showLeaderLines val="1"/>
                 <c15:leaderLines>
                   <c:spPr>
@@ -957,7 +962,7 @@
               </c:numCache>
             </c:numRef>
           </c:val>
-          <c:extLst>
+          <c:extLst xmlns:c16r2="http://schemas.microsoft.com/office/drawing/2015/06/chart">
             <c:ext xmlns:c16="http://schemas.microsoft.com/office/drawing/2014/chart" uri="{C3380CC4-5D6E-409C-BE32-E72D297353CC}">
               <c16:uniqueId val="{00000005-B7F8-46C4-953B-0E10AB423355}"/>
             </c:ext>
@@ -1050,8 +1055,9 @@
             <c:showPercent val="0"/>
             <c:showBubbleSize val="0"/>
             <c:showLeaderLines val="0"/>
-            <c:extLst>
+            <c:extLst xmlns:c16r2="http://schemas.microsoft.com/office/drawing/2015/06/chart">
               <c:ext xmlns:c15="http://schemas.microsoft.com/office/drawing/2012/chart" uri="{CE6537A1-D6FC-4f65-9D91-7224C49458BB}">
+                <c15:layout/>
                 <c15:showLeaderLines val="1"/>
                 <c15:leaderLines>
                   <c:spPr>
@@ -1092,7 +1098,7 @@
               </c:numCache>
             </c:numRef>
           </c:val>
-          <c:extLst>
+          <c:extLst xmlns:c16r2="http://schemas.microsoft.com/office/drawing/2015/06/chart">
             <c:ext xmlns:c16="http://schemas.microsoft.com/office/drawing/2014/chart" uri="{C3380CC4-5D6E-409C-BE32-E72D297353CC}">
               <c16:uniqueId val="{00000006-B7F8-46C4-953B-0E10AB423355}"/>
             </c:ext>
@@ -1185,8 +1191,9 @@
             <c:showPercent val="0"/>
             <c:showBubbleSize val="0"/>
             <c:showLeaderLines val="0"/>
-            <c:extLst>
+            <c:extLst xmlns:c16r2="http://schemas.microsoft.com/office/drawing/2015/06/chart">
               <c:ext xmlns:c15="http://schemas.microsoft.com/office/drawing/2012/chart" uri="{CE6537A1-D6FC-4f65-9D91-7224C49458BB}">
+                <c15:layout/>
                 <c15:showLeaderLines val="1"/>
                 <c15:leaderLines>
                   <c:spPr>
@@ -1227,7 +1234,7 @@
               </c:numCache>
             </c:numRef>
           </c:val>
-          <c:extLst>
+          <c:extLst xmlns:c16r2="http://schemas.microsoft.com/office/drawing/2015/06/chart">
             <c:ext xmlns:c16="http://schemas.microsoft.com/office/drawing/2014/chart" uri="{C3380CC4-5D6E-409C-BE32-E72D297353CC}">
               <c16:uniqueId val="{00000007-B7F8-46C4-953B-0E10AB423355}"/>
             </c:ext>
@@ -1320,8 +1327,9 @@
             <c:showPercent val="0"/>
             <c:showBubbleSize val="0"/>
             <c:showLeaderLines val="0"/>
-            <c:extLst>
+            <c:extLst xmlns:c16r2="http://schemas.microsoft.com/office/drawing/2015/06/chart">
               <c:ext xmlns:c15="http://schemas.microsoft.com/office/drawing/2012/chart" uri="{CE6537A1-D6FC-4f65-9D91-7224C49458BB}">
+                <c15:layout/>
                 <c15:showLeaderLines val="1"/>
                 <c15:leaderLines>
                   <c:spPr>
@@ -1362,7 +1370,7 @@
               </c:numCache>
             </c:numRef>
           </c:val>
-          <c:extLst>
+          <c:extLst xmlns:c16r2="http://schemas.microsoft.com/office/drawing/2015/06/chart">
             <c:ext xmlns:c16="http://schemas.microsoft.com/office/drawing/2014/chart" uri="{C3380CC4-5D6E-409C-BE32-E72D297353CC}">
               <c16:uniqueId val="{00000008-B7F8-46C4-953B-0E10AB423355}"/>
             </c:ext>
@@ -1453,8 +1461,9 @@
             <c:showPercent val="0"/>
             <c:showBubbleSize val="0"/>
             <c:showLeaderLines val="0"/>
-            <c:extLst>
+            <c:extLst xmlns:c16r2="http://schemas.microsoft.com/office/drawing/2015/06/chart">
               <c:ext xmlns:c15="http://schemas.microsoft.com/office/drawing/2012/chart" uri="{CE6537A1-D6FC-4f65-9D91-7224C49458BB}">
+                <c15:layout/>
                 <c15:showLeaderLines val="1"/>
                 <c15:leaderLines>
                   <c:spPr>
@@ -1495,7 +1504,7 @@
               </c:numCache>
             </c:numRef>
           </c:val>
-          <c:extLst>
+          <c:extLst xmlns:c16r2="http://schemas.microsoft.com/office/drawing/2015/06/chart">
             <c:ext xmlns:c16="http://schemas.microsoft.com/office/drawing/2014/chart" uri="{C3380CC4-5D6E-409C-BE32-E72D297353CC}">
               <c16:uniqueId val="{00000009-B7F8-46C4-953B-0E10AB423355}"/>
             </c:ext>
@@ -1512,11 +1521,11 @@
         </c:dLbls>
         <c:gapWidth val="100"/>
         <c:overlap val="-24"/>
-        <c:axId val="114181792"/>
-        <c:axId val="114198848"/>
+        <c:axId val="150888320"/>
+        <c:axId val="150891040"/>
       </c:barChart>
       <c:catAx>
-        <c:axId val="114181792"/>
+        <c:axId val="150888320"/>
         <c:scaling>
           <c:orientation val="minMax"/>
         </c:scaling>
@@ -1558,7 +1567,7 @@
             <a:endParaRPr lang="es-ES"/>
           </a:p>
         </c:txPr>
-        <c:crossAx val="114198848"/>
+        <c:crossAx val="150891040"/>
         <c:crosses val="autoZero"/>
         <c:auto val="1"/>
         <c:lblAlgn val="ctr"/>
@@ -1566,7 +1575,7 @@
         <c:noMultiLvlLbl val="0"/>
       </c:catAx>
       <c:valAx>
-        <c:axId val="114198848"/>
+        <c:axId val="150891040"/>
         <c:scaling>
           <c:orientation val="minMax"/>
         </c:scaling>
@@ -1616,7 +1625,7 @@
             <a:endParaRPr lang="es-ES"/>
           </a:p>
         </c:txPr>
-        <c:crossAx val="114181792"/>
+        <c:crossAx val="150888320"/>
         <c:crosses val="autoZero"/>
         <c:crossBetween val="between"/>
       </c:valAx>
@@ -1630,6 +1639,7 @@
     </c:plotArea>
     <c:legend>
       <c:legendPos val="b"/>
+      <c:layout/>
       <c:overlay val="0"/>
       <c:spPr>
         <a:noFill/>
@@ -2264,7 +2274,7 @@
           <p:cNvPr id="2" name="Marcador de encabezado 1">
             <a:extLst>
               <a:ext uri="{FF2B5EF4-FFF2-40B4-BE49-F238E27FC236}">
-                <a16:creationId xmlns:a16="http://schemas.microsoft.com/office/drawing/2014/main" id="{6A13C77B-70EC-427E-91BC-F24E456C4485}"/>
+                <a16:creationId xmlns:a16="http://schemas.microsoft.com/office/drawing/2014/main" xmlns="" id="{6A13C77B-70EC-427E-91BC-F24E456C4485}"/>
               </a:ext>
             </a:extLst>
           </p:cNvPr>
@@ -2301,7 +2311,7 @@
           <p:cNvPr id="3" name="Marcador de fecha 2">
             <a:extLst>
               <a:ext uri="{FF2B5EF4-FFF2-40B4-BE49-F238E27FC236}">
-                <a16:creationId xmlns:a16="http://schemas.microsoft.com/office/drawing/2014/main" id="{ECF03710-4D21-4187-AF6A-CD406EC8A5DC}"/>
+                <a16:creationId xmlns:a16="http://schemas.microsoft.com/office/drawing/2014/main" xmlns="" id="{ECF03710-4D21-4187-AF6A-CD406EC8A5DC}"/>
               </a:ext>
             </a:extLst>
           </p:cNvPr>
@@ -2342,7 +2352,7 @@
           <p:cNvPr id="4" name="Marcador de pie de página 3">
             <a:extLst>
               <a:ext uri="{FF2B5EF4-FFF2-40B4-BE49-F238E27FC236}">
-                <a16:creationId xmlns:a16="http://schemas.microsoft.com/office/drawing/2014/main" id="{812E1D92-BF6C-48F2-B7D3-811E8193907E}"/>
+                <a16:creationId xmlns:a16="http://schemas.microsoft.com/office/drawing/2014/main" xmlns="" id="{812E1D92-BF6C-48F2-B7D3-811E8193907E}"/>
               </a:ext>
             </a:extLst>
           </p:cNvPr>
@@ -2379,7 +2389,7 @@
           <p:cNvPr id="5" name="Marcador de número de diapositiva 4">
             <a:extLst>
               <a:ext uri="{FF2B5EF4-FFF2-40B4-BE49-F238E27FC236}">
-                <a16:creationId xmlns:a16="http://schemas.microsoft.com/office/drawing/2014/main" id="{E663B743-1197-4765-A3A6-7FD28E7E0383}"/>
+                <a16:creationId xmlns:a16="http://schemas.microsoft.com/office/drawing/2014/main" xmlns="" id="{E663B743-1197-4765-A3A6-7FD28E7E0383}"/>
               </a:ext>
             </a:extLst>
           </p:cNvPr>
@@ -2911,7 +2921,7 @@
           <a:noFill/>
           <a:extLst>
             <a:ext uri="{909E8E84-426E-40dd-AFC4-6F175D3DCCD1}">
-              <a14:hiddenFill xmlns:a14="http://schemas.microsoft.com/office/drawing/2010/main" xmlns="">
+              <a14:hiddenFill xmlns="" xmlns:a14="http://schemas.microsoft.com/office/drawing/2010/main">
                 <a:solidFill>
                   <a:srgbClr val="FFFFFF"/>
                 </a:solidFill>
@@ -2971,7 +2981,7 @@
             </a:ln>
             <a:extLst>
               <a:ext uri="{91240B29-F687-4f45-9708-019B960494DF}">
-                <a14:hiddenLine xmlns:a14="http://schemas.microsoft.com/office/drawing/2010/main" xmlns="" w="9525">
+                <a14:hiddenLine xmlns="" xmlns:a14="http://schemas.microsoft.com/office/drawing/2010/main" w="9525">
                   <a:solidFill>
                     <a:srgbClr val="000000"/>
                   </a:solidFill>
@@ -3061,7 +3071,7 @@
             </a:ln>
             <a:extLst>
               <a:ext uri="{91240B29-F687-4f45-9708-019B960494DF}">
-                <a14:hiddenLine xmlns:a14="http://schemas.microsoft.com/office/drawing/2010/main" xmlns="" w="9525">
+                <a14:hiddenLine xmlns="" xmlns:a14="http://schemas.microsoft.com/office/drawing/2010/main" w="9525">
                   <a:solidFill>
                     <a:srgbClr val="000000"/>
                   </a:solidFill>
@@ -3151,7 +3161,7 @@
             </a:ln>
             <a:extLst>
               <a:ext uri="{91240B29-F687-4f45-9708-019B960494DF}">
-                <a14:hiddenLine xmlns:a14="http://schemas.microsoft.com/office/drawing/2010/main" xmlns="" w="9525">
+                <a14:hiddenLine xmlns="" xmlns:a14="http://schemas.microsoft.com/office/drawing/2010/main" w="9525">
                   <a:solidFill>
                     <a:srgbClr val="000000"/>
                   </a:solidFill>
@@ -3185,7 +3195,7 @@
             </a:ln>
             <a:extLst>
               <a:ext uri="{91240B29-F687-4f45-9708-019B960494DF}">
-                <a14:hiddenLine xmlns:a14="http://schemas.microsoft.com/office/drawing/2010/main" xmlns="" w="9525">
+                <a14:hiddenLine xmlns="" xmlns:a14="http://schemas.microsoft.com/office/drawing/2010/main" w="9525">
                   <a:solidFill>
                     <a:srgbClr val="000000"/>
                   </a:solidFill>
@@ -3275,7 +3285,7 @@
             </a:ln>
             <a:extLst>
               <a:ext uri="{91240B29-F687-4f45-9708-019B960494DF}">
-                <a14:hiddenLine xmlns:a14="http://schemas.microsoft.com/office/drawing/2010/main" xmlns="" w="9525">
+                <a14:hiddenLine xmlns="" xmlns:a14="http://schemas.microsoft.com/office/drawing/2010/main" w="9525">
                   <a:solidFill>
                     <a:srgbClr val="000000"/>
                   </a:solidFill>
@@ -3337,7 +3347,7 @@
             </a:ln>
             <a:extLst>
               <a:ext uri="{91240B29-F687-4f45-9708-019B960494DF}">
-                <a14:hiddenLine xmlns:a14="http://schemas.microsoft.com/office/drawing/2010/main" xmlns="" w="9525">
+                <a14:hiddenLine xmlns="" xmlns:a14="http://schemas.microsoft.com/office/drawing/2010/main" w="9525">
                   <a:solidFill>
                     <a:srgbClr val="000000"/>
                   </a:solidFill>
@@ -3399,7 +3409,7 @@
             </a:ln>
             <a:extLst>
               <a:ext uri="{91240B29-F687-4f45-9708-019B960494DF}">
-                <a14:hiddenLine xmlns:a14="http://schemas.microsoft.com/office/drawing/2010/main" xmlns="" w="9525">
+                <a14:hiddenLine xmlns="" xmlns:a14="http://schemas.microsoft.com/office/drawing/2010/main" w="9525">
                   <a:solidFill>
                     <a:srgbClr val="000000"/>
                   </a:solidFill>
@@ -3489,7 +3499,7 @@
             </a:ln>
             <a:extLst>
               <a:ext uri="{91240B29-F687-4f45-9708-019B960494DF}">
-                <a14:hiddenLine xmlns:a14="http://schemas.microsoft.com/office/drawing/2010/main" xmlns="" w="9525">
+                <a14:hiddenLine xmlns="" xmlns:a14="http://schemas.microsoft.com/office/drawing/2010/main" w="9525">
                   <a:solidFill>
                     <a:srgbClr val="000000"/>
                   </a:solidFill>
@@ -3551,7 +3561,7 @@
             </a:ln>
             <a:extLst>
               <a:ext uri="{91240B29-F687-4f45-9708-019B960494DF}">
-                <a14:hiddenLine xmlns:a14="http://schemas.microsoft.com/office/drawing/2010/main" xmlns="" w="9525">
+                <a14:hiddenLine xmlns="" xmlns:a14="http://schemas.microsoft.com/office/drawing/2010/main" w="9525">
                   <a:solidFill>
                     <a:srgbClr val="000000"/>
                   </a:solidFill>
@@ -3613,7 +3623,7 @@
             </a:ln>
             <a:extLst>
               <a:ext uri="{91240B29-F687-4f45-9708-019B960494DF}">
-                <a14:hiddenLine xmlns:a14="http://schemas.microsoft.com/office/drawing/2010/main" xmlns="" w="9525">
+                <a14:hiddenLine xmlns="" xmlns:a14="http://schemas.microsoft.com/office/drawing/2010/main" w="9525">
                   <a:solidFill>
                     <a:srgbClr val="000000"/>
                   </a:solidFill>
@@ -3703,7 +3713,7 @@
             </a:ln>
             <a:extLst>
               <a:ext uri="{91240B29-F687-4f45-9708-019B960494DF}">
-                <a14:hiddenLine xmlns:a14="http://schemas.microsoft.com/office/drawing/2010/main" xmlns="" w="9525">
+                <a14:hiddenLine xmlns="" xmlns:a14="http://schemas.microsoft.com/office/drawing/2010/main" w="9525">
                   <a:solidFill>
                     <a:srgbClr val="000000"/>
                   </a:solidFill>
@@ -3793,7 +3803,7 @@
             </a:ln>
             <a:extLst>
               <a:ext uri="{91240B29-F687-4f45-9708-019B960494DF}">
-                <a14:hiddenLine xmlns:a14="http://schemas.microsoft.com/office/drawing/2010/main" xmlns="" w="9525">
+                <a14:hiddenLine xmlns="" xmlns:a14="http://schemas.microsoft.com/office/drawing/2010/main" w="9525">
                   <a:solidFill>
                     <a:srgbClr val="000000"/>
                   </a:solidFill>
@@ -3855,7 +3865,7 @@
             </a:ln>
             <a:extLst>
               <a:ext uri="{91240B29-F687-4f45-9708-019B960494DF}">
-                <a14:hiddenLine xmlns:a14="http://schemas.microsoft.com/office/drawing/2010/main" xmlns="" w="9525">
+                <a14:hiddenLine xmlns="" xmlns:a14="http://schemas.microsoft.com/office/drawing/2010/main" w="9525">
                   <a:solidFill>
                     <a:srgbClr val="000000"/>
                   </a:solidFill>
@@ -3965,7 +3975,7 @@
             </a:ln>
             <a:extLst>
               <a:ext uri="{91240B29-F687-4f45-9708-019B960494DF}">
-                <a14:hiddenLine xmlns:a14="http://schemas.microsoft.com/office/drawing/2010/main" xmlns="" w="9525">
+                <a14:hiddenLine xmlns="" xmlns:a14="http://schemas.microsoft.com/office/drawing/2010/main" w="9525">
                   <a:solidFill>
                     <a:srgbClr val="000000"/>
                   </a:solidFill>
@@ -4027,7 +4037,7 @@
             </a:ln>
             <a:extLst>
               <a:ext uri="{91240B29-F687-4f45-9708-019B960494DF}">
-                <a14:hiddenLine xmlns:a14="http://schemas.microsoft.com/office/drawing/2010/main" xmlns="" w="9525">
+                <a14:hiddenLine xmlns="" xmlns:a14="http://schemas.microsoft.com/office/drawing/2010/main" w="9525">
                   <a:solidFill>
                     <a:srgbClr val="000000"/>
                   </a:solidFill>
@@ -4117,7 +4127,7 @@
             </a:ln>
             <a:extLst>
               <a:ext uri="{91240B29-F687-4f45-9708-019B960494DF}">
-                <a14:hiddenLine xmlns:a14="http://schemas.microsoft.com/office/drawing/2010/main" xmlns="" w="9525">
+                <a14:hiddenLine xmlns="" xmlns:a14="http://schemas.microsoft.com/office/drawing/2010/main" w="9525">
                   <a:solidFill>
                     <a:srgbClr val="000000"/>
                   </a:solidFill>
@@ -4207,7 +4217,7 @@
             </a:ln>
             <a:extLst>
               <a:ext uri="{91240B29-F687-4f45-9708-019B960494DF}">
-                <a14:hiddenLine xmlns:a14="http://schemas.microsoft.com/office/drawing/2010/main" xmlns="" w="9525">
+                <a14:hiddenLine xmlns="" xmlns:a14="http://schemas.microsoft.com/office/drawing/2010/main" w="9525">
                   <a:solidFill>
                     <a:srgbClr val="000000"/>
                   </a:solidFill>
@@ -4269,7 +4279,7 @@
             </a:ln>
             <a:extLst>
               <a:ext uri="{91240B29-F687-4f45-9708-019B960494DF}">
-                <a14:hiddenLine xmlns:a14="http://schemas.microsoft.com/office/drawing/2010/main" xmlns="" w="9525">
+                <a14:hiddenLine xmlns="" xmlns:a14="http://schemas.microsoft.com/office/drawing/2010/main" w="9525">
                   <a:solidFill>
                     <a:srgbClr val="000000"/>
                   </a:solidFill>
@@ -4359,7 +4369,7 @@
             </a:ln>
             <a:extLst>
               <a:ext uri="{91240B29-F687-4f45-9708-019B960494DF}">
-                <a14:hiddenLine xmlns:a14="http://schemas.microsoft.com/office/drawing/2010/main" xmlns="" w="9525">
+                <a14:hiddenLine xmlns="" xmlns:a14="http://schemas.microsoft.com/office/drawing/2010/main" w="9525">
                   <a:solidFill>
                     <a:srgbClr val="000000"/>
                   </a:solidFill>
@@ -4449,7 +4459,7 @@
             </a:ln>
             <a:extLst>
               <a:ext uri="{91240B29-F687-4f45-9708-019B960494DF}">
-                <a14:hiddenLine xmlns:a14="http://schemas.microsoft.com/office/drawing/2010/main" xmlns="" w="9525">
+                <a14:hiddenLine xmlns="" xmlns:a14="http://schemas.microsoft.com/office/drawing/2010/main" w="9525">
                   <a:solidFill>
                     <a:srgbClr val="000000"/>
                   </a:solidFill>
@@ -4505,7 +4515,7 @@
             </a:ln>
             <a:extLst>
               <a:ext uri="{91240B29-F687-4f45-9708-019B960494DF}">
-                <a14:hiddenLine xmlns:a14="http://schemas.microsoft.com/office/drawing/2010/main" xmlns="" w="9525">
+                <a14:hiddenLine xmlns="" xmlns:a14="http://schemas.microsoft.com/office/drawing/2010/main" w="9525">
                   <a:solidFill>
                     <a:srgbClr val="000000"/>
                   </a:solidFill>
@@ -4595,7 +4605,7 @@
             </a:ln>
             <a:extLst>
               <a:ext uri="{91240B29-F687-4f45-9708-019B960494DF}">
-                <a14:hiddenLine xmlns:a14="http://schemas.microsoft.com/office/drawing/2010/main" xmlns="" w="9525">
+                <a14:hiddenLine xmlns="" xmlns:a14="http://schemas.microsoft.com/office/drawing/2010/main" w="9525">
                   <a:solidFill>
                     <a:srgbClr val="000000"/>
                   </a:solidFill>
@@ -4651,7 +4661,7 @@
             </a:ln>
             <a:extLst>
               <a:ext uri="{91240B29-F687-4f45-9708-019B960494DF}">
-                <a14:hiddenLine xmlns:a14="http://schemas.microsoft.com/office/drawing/2010/main" xmlns="" w="9525">
+                <a14:hiddenLine xmlns="" xmlns:a14="http://schemas.microsoft.com/office/drawing/2010/main" w="9525">
                   <a:solidFill>
                     <a:srgbClr val="000000"/>
                   </a:solidFill>
@@ -4741,7 +4751,7 @@
             </a:ln>
             <a:extLst>
               <a:ext uri="{91240B29-F687-4f45-9708-019B960494DF}">
-                <a14:hiddenLine xmlns:a14="http://schemas.microsoft.com/office/drawing/2010/main" xmlns="" w="9525">
+                <a14:hiddenLine xmlns="" xmlns:a14="http://schemas.microsoft.com/office/drawing/2010/main" w="9525">
                   <a:solidFill>
                     <a:srgbClr val="000000"/>
                   </a:solidFill>
@@ -4809,7 +4819,7 @@
             </a:ln>
             <a:extLst>
               <a:ext uri="{91240B29-F687-4f45-9708-019B960494DF}">
-                <a14:hiddenLine xmlns:a14="http://schemas.microsoft.com/office/drawing/2010/main" xmlns="" w="9525">
+                <a14:hiddenLine xmlns="" xmlns:a14="http://schemas.microsoft.com/office/drawing/2010/main" w="9525">
                   <a:solidFill>
                     <a:srgbClr val="000000"/>
                   </a:solidFill>
@@ -4899,7 +4909,7 @@
             </a:ln>
             <a:extLst>
               <a:ext uri="{91240B29-F687-4f45-9708-019B960494DF}">
-                <a14:hiddenLine xmlns:a14="http://schemas.microsoft.com/office/drawing/2010/main" xmlns="" w="9525">
+                <a14:hiddenLine xmlns="" xmlns:a14="http://schemas.microsoft.com/office/drawing/2010/main" w="9525">
                   <a:solidFill>
                     <a:srgbClr val="000000"/>
                   </a:solidFill>
@@ -4967,7 +4977,7 @@
             </a:ln>
             <a:extLst>
               <a:ext uri="{91240B29-F687-4f45-9708-019B960494DF}">
-                <a14:hiddenLine xmlns:a14="http://schemas.microsoft.com/office/drawing/2010/main" xmlns="" w="9525">
+                <a14:hiddenLine xmlns="" xmlns:a14="http://schemas.microsoft.com/office/drawing/2010/main" w="9525">
                   <a:solidFill>
                     <a:srgbClr val="000000"/>
                   </a:solidFill>
@@ -5057,7 +5067,7 @@
             </a:ln>
             <a:extLst>
               <a:ext uri="{91240B29-F687-4f45-9708-019B960494DF}">
-                <a14:hiddenLine xmlns:a14="http://schemas.microsoft.com/office/drawing/2010/main" xmlns="" w="9525">
+                <a14:hiddenLine xmlns="" xmlns:a14="http://schemas.microsoft.com/office/drawing/2010/main" w="9525">
                   <a:solidFill>
                     <a:srgbClr val="000000"/>
                   </a:solidFill>
@@ -5091,7 +5101,7 @@
             </a:ln>
             <a:extLst>
               <a:ext uri="{91240B29-F687-4f45-9708-019B960494DF}">
-                <a14:hiddenLine xmlns:a14="http://schemas.microsoft.com/office/drawing/2010/main" xmlns="" w="9525">
+                <a14:hiddenLine xmlns="" xmlns:a14="http://schemas.microsoft.com/office/drawing/2010/main" w="9525">
                   <a:solidFill>
                     <a:srgbClr val="000000"/>
                   </a:solidFill>
@@ -5181,7 +5191,7 @@
             </a:ln>
             <a:extLst>
               <a:ext uri="{91240B29-F687-4f45-9708-019B960494DF}">
-                <a14:hiddenLine xmlns:a14="http://schemas.microsoft.com/office/drawing/2010/main" xmlns="" w="9525">
+                <a14:hiddenLine xmlns="" xmlns:a14="http://schemas.microsoft.com/office/drawing/2010/main" w="9525">
                   <a:solidFill>
                     <a:srgbClr val="000000"/>
                   </a:solidFill>
@@ -5243,7 +5253,7 @@
             </a:ln>
             <a:extLst>
               <a:ext uri="{91240B29-F687-4f45-9708-019B960494DF}">
-                <a14:hiddenLine xmlns:a14="http://schemas.microsoft.com/office/drawing/2010/main" xmlns="" w="9525">
+                <a14:hiddenLine xmlns="" xmlns:a14="http://schemas.microsoft.com/office/drawing/2010/main" w="9525">
                   <a:solidFill>
                     <a:srgbClr val="000000"/>
                   </a:solidFill>
@@ -5305,7 +5315,7 @@
             </a:ln>
             <a:extLst>
               <a:ext uri="{91240B29-F687-4f45-9708-019B960494DF}">
-                <a14:hiddenLine xmlns:a14="http://schemas.microsoft.com/office/drawing/2010/main" xmlns="" w="9525">
+                <a14:hiddenLine xmlns="" xmlns:a14="http://schemas.microsoft.com/office/drawing/2010/main" w="9525">
                   <a:solidFill>
                     <a:srgbClr val="000000"/>
                   </a:solidFill>
@@ -5395,7 +5405,7 @@
             </a:ln>
             <a:extLst>
               <a:ext uri="{91240B29-F687-4f45-9708-019B960494DF}">
-                <a14:hiddenLine xmlns:a14="http://schemas.microsoft.com/office/drawing/2010/main" xmlns="" w="9525">
+                <a14:hiddenLine xmlns="" xmlns:a14="http://schemas.microsoft.com/office/drawing/2010/main" w="9525">
                   <a:solidFill>
                     <a:srgbClr val="000000"/>
                   </a:solidFill>
@@ -5463,7 +5473,7 @@
             </a:ln>
             <a:extLst>
               <a:ext uri="{91240B29-F687-4f45-9708-019B960494DF}">
-                <a14:hiddenLine xmlns:a14="http://schemas.microsoft.com/office/drawing/2010/main" xmlns="" w="9525">
+                <a14:hiddenLine xmlns="" xmlns:a14="http://schemas.microsoft.com/office/drawing/2010/main" w="9525">
                   <a:solidFill>
                     <a:srgbClr val="000000"/>
                   </a:solidFill>
@@ -5525,7 +5535,7 @@
             </a:ln>
             <a:extLst>
               <a:ext uri="{91240B29-F687-4f45-9708-019B960494DF}">
-                <a14:hiddenLine xmlns:a14="http://schemas.microsoft.com/office/drawing/2010/main" xmlns="" w="9525">
+                <a14:hiddenLine xmlns="" xmlns:a14="http://schemas.microsoft.com/office/drawing/2010/main" w="9525">
                   <a:solidFill>
                     <a:srgbClr val="000000"/>
                   </a:solidFill>
@@ -5615,7 +5625,7 @@
             </a:ln>
             <a:extLst>
               <a:ext uri="{91240B29-F687-4f45-9708-019B960494DF}">
-                <a14:hiddenLine xmlns:a14="http://schemas.microsoft.com/office/drawing/2010/main" xmlns="" w="9525">
+                <a14:hiddenLine xmlns="" xmlns:a14="http://schemas.microsoft.com/office/drawing/2010/main" w="9525">
                   <a:solidFill>
                     <a:srgbClr val="000000"/>
                   </a:solidFill>
@@ -5677,7 +5687,7 @@
             </a:ln>
             <a:extLst>
               <a:ext uri="{91240B29-F687-4f45-9708-019B960494DF}">
-                <a14:hiddenLine xmlns:a14="http://schemas.microsoft.com/office/drawing/2010/main" xmlns="" w="9525">
+                <a14:hiddenLine xmlns="" xmlns:a14="http://schemas.microsoft.com/office/drawing/2010/main" w="9525">
                   <a:solidFill>
                     <a:srgbClr val="000000"/>
                   </a:solidFill>
@@ -5767,7 +5777,7 @@
             </a:ln>
             <a:extLst>
               <a:ext uri="{91240B29-F687-4f45-9708-019B960494DF}">
-                <a14:hiddenLine xmlns:a14="http://schemas.microsoft.com/office/drawing/2010/main" xmlns="" w="9525">
+                <a14:hiddenLine xmlns="" xmlns:a14="http://schemas.microsoft.com/office/drawing/2010/main" w="9525">
                   <a:solidFill>
                     <a:srgbClr val="000000"/>
                   </a:solidFill>
@@ -5829,7 +5839,7 @@
             </a:ln>
             <a:extLst>
               <a:ext uri="{91240B29-F687-4f45-9708-019B960494DF}">
-                <a14:hiddenLine xmlns:a14="http://schemas.microsoft.com/office/drawing/2010/main" xmlns="" w="9525">
+                <a14:hiddenLine xmlns="" xmlns:a14="http://schemas.microsoft.com/office/drawing/2010/main" w="9525">
                   <a:solidFill>
                     <a:srgbClr val="000000"/>
                   </a:solidFill>
@@ -5919,7 +5929,7 @@
             </a:ln>
             <a:extLst>
               <a:ext uri="{91240B29-F687-4f45-9708-019B960494DF}">
-                <a14:hiddenLine xmlns:a14="http://schemas.microsoft.com/office/drawing/2010/main" xmlns="" w="9525">
+                <a14:hiddenLine xmlns="" xmlns:a14="http://schemas.microsoft.com/office/drawing/2010/main" w="9525">
                   <a:solidFill>
                     <a:srgbClr val="000000"/>
                   </a:solidFill>
@@ -5953,7 +5963,7 @@
             </a:ln>
             <a:extLst>
               <a:ext uri="{91240B29-F687-4f45-9708-019B960494DF}">
-                <a14:hiddenLine xmlns:a14="http://schemas.microsoft.com/office/drawing/2010/main" xmlns="" w="9525">
+                <a14:hiddenLine xmlns="" xmlns:a14="http://schemas.microsoft.com/office/drawing/2010/main" w="9525">
                   <a:solidFill>
                     <a:srgbClr val="000000"/>
                   </a:solidFill>
@@ -6018,7 +6028,7 @@
             </a:ln>
             <a:extLst>
               <a:ext uri="{91240B29-F687-4f45-9708-019B960494DF}">
-                <a14:hiddenLine xmlns:a14="http://schemas.microsoft.com/office/drawing/2010/main" xmlns="" w="9525">
+                <a14:hiddenLine xmlns="" xmlns:a14="http://schemas.microsoft.com/office/drawing/2010/main" w="9525">
                   <a:solidFill>
                     <a:srgbClr val="000000"/>
                   </a:solidFill>
@@ -6108,7 +6118,7 @@
             </a:ln>
             <a:extLst>
               <a:ext uri="{91240B29-F687-4f45-9708-019B960494DF}">
-                <a14:hiddenLine xmlns:a14="http://schemas.microsoft.com/office/drawing/2010/main" xmlns="" w="9525">
+                <a14:hiddenLine xmlns="" xmlns:a14="http://schemas.microsoft.com/office/drawing/2010/main" w="9525">
                   <a:solidFill>
                     <a:srgbClr val="000000"/>
                   </a:solidFill>
@@ -6170,7 +6180,7 @@
             </a:ln>
             <a:extLst>
               <a:ext uri="{91240B29-F687-4f45-9708-019B960494DF}">
-                <a14:hiddenLine xmlns:a14="http://schemas.microsoft.com/office/drawing/2010/main" xmlns="" w="9525">
+                <a14:hiddenLine xmlns="" xmlns:a14="http://schemas.microsoft.com/office/drawing/2010/main" w="9525">
                   <a:solidFill>
                     <a:srgbClr val="000000"/>
                   </a:solidFill>
@@ -6260,7 +6270,7 @@
             </a:ln>
             <a:extLst>
               <a:ext uri="{91240B29-F687-4f45-9708-019B960494DF}">
-                <a14:hiddenLine xmlns:a14="http://schemas.microsoft.com/office/drawing/2010/main" xmlns="" w="9525">
+                <a14:hiddenLine xmlns="" xmlns:a14="http://schemas.microsoft.com/office/drawing/2010/main" w="9525">
                   <a:solidFill>
                     <a:srgbClr val="000000"/>
                   </a:solidFill>
@@ -6350,7 +6360,7 @@
             </a:ln>
             <a:extLst>
               <a:ext uri="{91240B29-F687-4f45-9708-019B960494DF}">
-                <a14:hiddenLine xmlns:a14="http://schemas.microsoft.com/office/drawing/2010/main" xmlns="" w="9525">
+                <a14:hiddenLine xmlns="" xmlns:a14="http://schemas.microsoft.com/office/drawing/2010/main" w="9525">
                   <a:solidFill>
                     <a:srgbClr val="000000"/>
                   </a:solidFill>
@@ -6415,7 +6425,7 @@
             </a:ln>
             <a:extLst>
               <a:ext uri="{91240B29-F687-4f45-9708-019B960494DF}">
-                <a14:hiddenLine xmlns:a14="http://schemas.microsoft.com/office/drawing/2010/main" xmlns="" w="9525">
+                <a14:hiddenLine xmlns="" xmlns:a14="http://schemas.microsoft.com/office/drawing/2010/main" w="9525">
                   <a:solidFill>
                     <a:srgbClr val="000000"/>
                   </a:solidFill>
@@ -6477,7 +6487,7 @@
             </a:ln>
             <a:extLst>
               <a:ext uri="{91240B29-F687-4f45-9708-019B960494DF}">
-                <a14:hiddenLine xmlns:a14="http://schemas.microsoft.com/office/drawing/2010/main" xmlns="" w="9525">
+                <a14:hiddenLine xmlns="" xmlns:a14="http://schemas.microsoft.com/office/drawing/2010/main" w="9525">
                   <a:solidFill>
                     <a:srgbClr val="000000"/>
                   </a:solidFill>
@@ -6567,7 +6577,7 @@
             </a:ln>
             <a:extLst>
               <a:ext uri="{91240B29-F687-4f45-9708-019B960494DF}">
-                <a14:hiddenLine xmlns:a14="http://schemas.microsoft.com/office/drawing/2010/main" xmlns="" w="9525">
+                <a14:hiddenLine xmlns="" xmlns:a14="http://schemas.microsoft.com/office/drawing/2010/main" w="9525">
                   <a:solidFill>
                     <a:srgbClr val="000000"/>
                   </a:solidFill>
@@ -6657,7 +6667,7 @@
             </a:ln>
             <a:extLst>
               <a:ext uri="{91240B29-F687-4f45-9708-019B960494DF}">
-                <a14:hiddenLine xmlns:a14="http://schemas.microsoft.com/office/drawing/2010/main" xmlns="" w="9525">
+                <a14:hiddenLine xmlns="" xmlns:a14="http://schemas.microsoft.com/office/drawing/2010/main" w="9525">
                   <a:solidFill>
                     <a:srgbClr val="000000"/>
                   </a:solidFill>
@@ -6719,7 +6729,7 @@
             </a:ln>
             <a:extLst>
               <a:ext uri="{91240B29-F687-4f45-9708-019B960494DF}">
-                <a14:hiddenLine xmlns:a14="http://schemas.microsoft.com/office/drawing/2010/main" xmlns="" w="9525">
+                <a14:hiddenLine xmlns="" xmlns:a14="http://schemas.microsoft.com/office/drawing/2010/main" w="9525">
                   <a:solidFill>
                     <a:srgbClr val="000000"/>
                   </a:solidFill>
@@ -6839,7 +6849,7 @@
             </a:ln>
             <a:extLst>
               <a:ext uri="{91240B29-F687-4f45-9708-019B960494DF}">
-                <a14:hiddenLine xmlns:a14="http://schemas.microsoft.com/office/drawing/2010/main" xmlns="" w="9525">
+                <a14:hiddenLine xmlns="" xmlns:a14="http://schemas.microsoft.com/office/drawing/2010/main" w="9525">
                   <a:solidFill>
                     <a:srgbClr val="000000"/>
                   </a:solidFill>
@@ -6907,7 +6917,7 @@
             </a:ln>
             <a:extLst>
               <a:ext uri="{91240B29-F687-4f45-9708-019B960494DF}">
-                <a14:hiddenLine xmlns:a14="http://schemas.microsoft.com/office/drawing/2010/main" xmlns="" w="9525">
+                <a14:hiddenLine xmlns="" xmlns:a14="http://schemas.microsoft.com/office/drawing/2010/main" w="9525">
                   <a:solidFill>
                     <a:srgbClr val="000000"/>
                   </a:solidFill>
@@ -6997,7 +7007,7 @@
             </a:ln>
             <a:extLst>
               <a:ext uri="{91240B29-F687-4f45-9708-019B960494DF}">
-                <a14:hiddenLine xmlns:a14="http://schemas.microsoft.com/office/drawing/2010/main" xmlns="" w="9525">
+                <a14:hiddenLine xmlns="" xmlns:a14="http://schemas.microsoft.com/office/drawing/2010/main" w="9525">
                   <a:solidFill>
                     <a:srgbClr val="000000"/>
                   </a:solidFill>
@@ -11758,7 +11768,7 @@
           <a:noFill/>
           <a:extLst>
             <a:ext uri="{909E8E84-426E-40dd-AFC4-6F175D3DCCD1}">
-              <a14:hiddenFill xmlns:a14="http://schemas.microsoft.com/office/drawing/2010/main" xmlns="">
+              <a14:hiddenFill xmlns="" xmlns:a14="http://schemas.microsoft.com/office/drawing/2010/main">
                 <a:solidFill>
                   <a:srgbClr val="FFFFFF"/>
                 </a:solidFill>
@@ -11832,7 +11842,7 @@
               </a:ln>
               <a:extLst>
                 <a:ext uri="{91240B29-F687-4f45-9708-019B960494DF}">
-                  <a14:hiddenLine xmlns:a14="http://schemas.microsoft.com/office/drawing/2010/main" xmlns="" w="9525">
+                  <a14:hiddenLine xmlns="" xmlns:a14="http://schemas.microsoft.com/office/drawing/2010/main" w="9525">
                     <a:solidFill>
                       <a:srgbClr val="000000"/>
                     </a:solidFill>
@@ -11922,7 +11932,7 @@
               </a:ln>
               <a:extLst>
                 <a:ext uri="{91240B29-F687-4f45-9708-019B960494DF}">
-                  <a14:hiddenLine xmlns:a14="http://schemas.microsoft.com/office/drawing/2010/main" xmlns="" w="9525">
+                  <a14:hiddenLine xmlns="" xmlns:a14="http://schemas.microsoft.com/office/drawing/2010/main" w="9525">
                     <a:solidFill>
                       <a:srgbClr val="000000"/>
                     </a:solidFill>
@@ -12012,7 +12022,7 @@
               </a:ln>
               <a:extLst>
                 <a:ext uri="{91240B29-F687-4f45-9708-019B960494DF}">
-                  <a14:hiddenLine xmlns:a14="http://schemas.microsoft.com/office/drawing/2010/main" xmlns="" w="9525">
+                  <a14:hiddenLine xmlns="" xmlns:a14="http://schemas.microsoft.com/office/drawing/2010/main" w="9525">
                     <a:solidFill>
                       <a:srgbClr val="000000"/>
                     </a:solidFill>
@@ -12074,7 +12084,7 @@
               </a:ln>
               <a:extLst>
                 <a:ext uri="{91240B29-F687-4f45-9708-019B960494DF}">
-                  <a14:hiddenLine xmlns:a14="http://schemas.microsoft.com/office/drawing/2010/main" xmlns="" w="9525">
+                  <a14:hiddenLine xmlns="" xmlns:a14="http://schemas.microsoft.com/office/drawing/2010/main" w="9525">
                     <a:solidFill>
                       <a:srgbClr val="000000"/>
                     </a:solidFill>
@@ -12164,7 +12174,7 @@
               </a:ln>
               <a:extLst>
                 <a:ext uri="{91240B29-F687-4f45-9708-019B960494DF}">
-                  <a14:hiddenLine xmlns:a14="http://schemas.microsoft.com/office/drawing/2010/main" xmlns="" w="9525">
+                  <a14:hiddenLine xmlns="" xmlns:a14="http://schemas.microsoft.com/office/drawing/2010/main" w="9525">
                     <a:solidFill>
                       <a:srgbClr val="000000"/>
                     </a:solidFill>
@@ -12226,7 +12236,7 @@
               </a:ln>
               <a:extLst>
                 <a:ext uri="{91240B29-F687-4f45-9708-019B960494DF}">
-                  <a14:hiddenLine xmlns:a14="http://schemas.microsoft.com/office/drawing/2010/main" xmlns="" w="9525">
+                  <a14:hiddenLine xmlns="" xmlns:a14="http://schemas.microsoft.com/office/drawing/2010/main" w="9525">
                     <a:solidFill>
                       <a:srgbClr val="000000"/>
                     </a:solidFill>
@@ -12288,7 +12298,7 @@
               </a:ln>
               <a:extLst>
                 <a:ext uri="{91240B29-F687-4f45-9708-019B960494DF}">
-                  <a14:hiddenLine xmlns:a14="http://schemas.microsoft.com/office/drawing/2010/main" xmlns="" w="9525">
+                  <a14:hiddenLine xmlns="" xmlns:a14="http://schemas.microsoft.com/office/drawing/2010/main" w="9525">
                     <a:solidFill>
                       <a:srgbClr val="000000"/>
                     </a:solidFill>
@@ -12378,7 +12388,7 @@
               </a:ln>
               <a:extLst>
                 <a:ext uri="{91240B29-F687-4f45-9708-019B960494DF}">
-                  <a14:hiddenLine xmlns:a14="http://schemas.microsoft.com/office/drawing/2010/main" xmlns="" w="9525">
+                  <a14:hiddenLine xmlns="" xmlns:a14="http://schemas.microsoft.com/office/drawing/2010/main" w="9525">
                     <a:solidFill>
                       <a:srgbClr val="000000"/>
                     </a:solidFill>
@@ -12468,7 +12478,7 @@
               </a:ln>
               <a:extLst>
                 <a:ext uri="{91240B29-F687-4f45-9708-019B960494DF}">
-                  <a14:hiddenLine xmlns:a14="http://schemas.microsoft.com/office/drawing/2010/main" xmlns="" w="9525">
+                  <a14:hiddenLine xmlns="" xmlns:a14="http://schemas.microsoft.com/office/drawing/2010/main" w="9525">
                     <a:solidFill>
                       <a:srgbClr val="000000"/>
                     </a:solidFill>
@@ -12530,7 +12540,7 @@
               </a:ln>
               <a:extLst>
                 <a:ext uri="{91240B29-F687-4f45-9708-019B960494DF}">
-                  <a14:hiddenLine xmlns:a14="http://schemas.microsoft.com/office/drawing/2010/main" xmlns="" w="9525">
+                  <a14:hiddenLine xmlns="" xmlns:a14="http://schemas.microsoft.com/office/drawing/2010/main" w="9525">
                     <a:solidFill>
                       <a:srgbClr val="000000"/>
                     </a:solidFill>
@@ -12640,7 +12650,7 @@
               </a:ln>
               <a:extLst>
                 <a:ext uri="{91240B29-F687-4f45-9708-019B960494DF}">
-                  <a14:hiddenLine xmlns:a14="http://schemas.microsoft.com/office/drawing/2010/main" xmlns="" w="9525">
+                  <a14:hiddenLine xmlns="" xmlns:a14="http://schemas.microsoft.com/office/drawing/2010/main" w="9525">
                     <a:solidFill>
                       <a:srgbClr val="000000"/>
                     </a:solidFill>
@@ -12724,7 +12734,7 @@
               </a:ln>
               <a:extLst>
                 <a:ext uri="{91240B29-F687-4f45-9708-019B960494DF}">
-                  <a14:hiddenLine xmlns:a14="http://schemas.microsoft.com/office/drawing/2010/main" xmlns="" w="9525">
+                  <a14:hiddenLine xmlns="" xmlns:a14="http://schemas.microsoft.com/office/drawing/2010/main" w="9525">
                     <a:solidFill>
                       <a:srgbClr val="000000"/>
                     </a:solidFill>
@@ -12786,7 +12796,7 @@
               </a:ln>
               <a:extLst>
                 <a:ext uri="{91240B29-F687-4f45-9708-019B960494DF}">
-                  <a14:hiddenLine xmlns:a14="http://schemas.microsoft.com/office/drawing/2010/main" xmlns="" w="9525">
+                  <a14:hiddenLine xmlns="" xmlns:a14="http://schemas.microsoft.com/office/drawing/2010/main" w="9525">
                     <a:solidFill>
                       <a:srgbClr val="000000"/>
                     </a:solidFill>
@@ -12848,7 +12858,7 @@
               </a:ln>
               <a:extLst>
                 <a:ext uri="{91240B29-F687-4f45-9708-019B960494DF}">
-                  <a14:hiddenLine xmlns:a14="http://schemas.microsoft.com/office/drawing/2010/main" xmlns="" w="9525">
+                  <a14:hiddenLine xmlns="" xmlns:a14="http://schemas.microsoft.com/office/drawing/2010/main" w="9525">
                     <a:solidFill>
                       <a:srgbClr val="000000"/>
                     </a:solidFill>
@@ -12938,7 +12948,7 @@
               </a:ln>
               <a:extLst>
                 <a:ext uri="{91240B29-F687-4f45-9708-019B960494DF}">
-                  <a14:hiddenLine xmlns:a14="http://schemas.microsoft.com/office/drawing/2010/main" xmlns="" w="9525">
+                  <a14:hiddenLine xmlns="" xmlns:a14="http://schemas.microsoft.com/office/drawing/2010/main" w="9525">
                     <a:solidFill>
                       <a:srgbClr val="000000"/>
                     </a:solidFill>
@@ -12972,7 +12982,7 @@
               </a:ln>
               <a:extLst>
                 <a:ext uri="{91240B29-F687-4f45-9708-019B960494DF}">
-                  <a14:hiddenLine xmlns:a14="http://schemas.microsoft.com/office/drawing/2010/main" xmlns="" w="9525">
+                  <a14:hiddenLine xmlns="" xmlns:a14="http://schemas.microsoft.com/office/drawing/2010/main" w="9525">
                     <a:solidFill>
                       <a:srgbClr val="000000"/>
                     </a:solidFill>
@@ -13037,7 +13047,7 @@
               </a:ln>
               <a:extLst>
                 <a:ext uri="{91240B29-F687-4f45-9708-019B960494DF}">
-                  <a14:hiddenLine xmlns:a14="http://schemas.microsoft.com/office/drawing/2010/main" xmlns="" w="9525">
+                  <a14:hiddenLine xmlns="" xmlns:a14="http://schemas.microsoft.com/office/drawing/2010/main" w="9525">
                     <a:solidFill>
                       <a:srgbClr val="000000"/>
                     </a:solidFill>
@@ -13127,7 +13137,7 @@
               </a:ln>
               <a:extLst>
                 <a:ext uri="{91240B29-F687-4f45-9708-019B960494DF}">
-                  <a14:hiddenLine xmlns:a14="http://schemas.microsoft.com/office/drawing/2010/main" xmlns="" w="9525">
+                  <a14:hiddenLine xmlns="" xmlns:a14="http://schemas.microsoft.com/office/drawing/2010/main" w="9525">
                     <a:solidFill>
                       <a:srgbClr val="000000"/>
                     </a:solidFill>
@@ -13189,7 +13199,7 @@
               </a:ln>
               <a:extLst>
                 <a:ext uri="{91240B29-F687-4f45-9708-019B960494DF}">
-                  <a14:hiddenLine xmlns:a14="http://schemas.microsoft.com/office/drawing/2010/main" xmlns="" w="9525">
+                  <a14:hiddenLine xmlns="" xmlns:a14="http://schemas.microsoft.com/office/drawing/2010/main" w="9525">
                     <a:solidFill>
                       <a:srgbClr val="000000"/>
                     </a:solidFill>
@@ -13279,7 +13289,7 @@
               </a:ln>
               <a:extLst>
                 <a:ext uri="{91240B29-F687-4f45-9708-019B960494DF}">
-                  <a14:hiddenLine xmlns:a14="http://schemas.microsoft.com/office/drawing/2010/main" xmlns="" w="9525">
+                  <a14:hiddenLine xmlns="" xmlns:a14="http://schemas.microsoft.com/office/drawing/2010/main" w="9525">
                     <a:solidFill>
                       <a:srgbClr val="000000"/>
                     </a:solidFill>
@@ -13344,7 +13354,7 @@
               </a:ln>
               <a:extLst>
                 <a:ext uri="{91240B29-F687-4f45-9708-019B960494DF}">
-                  <a14:hiddenLine xmlns:a14="http://schemas.microsoft.com/office/drawing/2010/main" xmlns="" w="9525">
+                  <a14:hiddenLine xmlns="" xmlns:a14="http://schemas.microsoft.com/office/drawing/2010/main" w="9525">
                     <a:solidFill>
                       <a:srgbClr val="000000"/>
                     </a:solidFill>
@@ -13406,7 +13416,7 @@
               </a:ln>
               <a:extLst>
                 <a:ext uri="{91240B29-F687-4f45-9708-019B960494DF}">
-                  <a14:hiddenLine xmlns:a14="http://schemas.microsoft.com/office/drawing/2010/main" xmlns="" w="9525">
+                  <a14:hiddenLine xmlns="" xmlns:a14="http://schemas.microsoft.com/office/drawing/2010/main" w="9525">
                     <a:solidFill>
                       <a:srgbClr val="000000"/>
                     </a:solidFill>
@@ -13496,7 +13506,7 @@
               </a:ln>
               <a:extLst>
                 <a:ext uri="{91240B29-F687-4f45-9708-019B960494DF}">
-                  <a14:hiddenLine xmlns:a14="http://schemas.microsoft.com/office/drawing/2010/main" xmlns="" w="9525">
+                  <a14:hiddenLine xmlns="" xmlns:a14="http://schemas.microsoft.com/office/drawing/2010/main" w="9525">
                     <a:solidFill>
                       <a:srgbClr val="000000"/>
                     </a:solidFill>
@@ -13586,7 +13596,7 @@
               </a:ln>
               <a:extLst>
                 <a:ext uri="{91240B29-F687-4f45-9708-019B960494DF}">
-                  <a14:hiddenLine xmlns:a14="http://schemas.microsoft.com/office/drawing/2010/main" xmlns="" w="9525">
+                  <a14:hiddenLine xmlns="" xmlns:a14="http://schemas.microsoft.com/office/drawing/2010/main" w="9525">
                     <a:solidFill>
                       <a:srgbClr val="000000"/>
                     </a:solidFill>
@@ -13651,7 +13661,7 @@
               </a:ln>
               <a:extLst>
                 <a:ext uri="{91240B29-F687-4f45-9708-019B960494DF}">
-                  <a14:hiddenLine xmlns:a14="http://schemas.microsoft.com/office/drawing/2010/main" xmlns="" w="9525">
+                  <a14:hiddenLine xmlns="" xmlns:a14="http://schemas.microsoft.com/office/drawing/2010/main" w="9525">
                     <a:solidFill>
                       <a:srgbClr val="000000"/>
                     </a:solidFill>
@@ -13771,7 +13781,7 @@
               </a:ln>
               <a:extLst>
                 <a:ext uri="{91240B29-F687-4f45-9708-019B960494DF}">
-                  <a14:hiddenLine xmlns:a14="http://schemas.microsoft.com/office/drawing/2010/main" xmlns="" w="9525">
+                  <a14:hiddenLine xmlns="" xmlns:a14="http://schemas.microsoft.com/office/drawing/2010/main" w="9525">
                     <a:solidFill>
                       <a:srgbClr val="000000"/>
                     </a:solidFill>
@@ -13869,7 +13879,7 @@
               </a:ln>
               <a:extLst>
                 <a:ext uri="{91240B29-F687-4f45-9708-019B960494DF}">
-                  <a14:hiddenLine xmlns:a14="http://schemas.microsoft.com/office/drawing/2010/main" xmlns="" w="9525">
+                  <a14:hiddenLine xmlns="" xmlns:a14="http://schemas.microsoft.com/office/drawing/2010/main" w="9525">
                     <a:solidFill>
                       <a:srgbClr val="000000"/>
                     </a:solidFill>
@@ -13984,7 +13994,7 @@
               </a:ln>
               <a:extLst>
                 <a:ext uri="{91240B29-F687-4f45-9708-019B960494DF}">
-                  <a14:hiddenLine xmlns:a14="http://schemas.microsoft.com/office/drawing/2010/main" xmlns="" w="9525">
+                  <a14:hiddenLine xmlns="" xmlns:a14="http://schemas.microsoft.com/office/drawing/2010/main" w="9525">
                     <a:solidFill>
                       <a:srgbClr val="000000"/>
                     </a:solidFill>
@@ -14074,7 +14084,7 @@
               </a:ln>
               <a:extLst>
                 <a:ext uri="{91240B29-F687-4f45-9708-019B960494DF}">
-                  <a14:hiddenLine xmlns:a14="http://schemas.microsoft.com/office/drawing/2010/main" xmlns="" w="9525">
+                  <a14:hiddenLine xmlns="" xmlns:a14="http://schemas.microsoft.com/office/drawing/2010/main" w="9525">
                     <a:solidFill>
                       <a:srgbClr val="000000"/>
                     </a:solidFill>
@@ -14139,7 +14149,7 @@
               </a:ln>
               <a:extLst>
                 <a:ext uri="{91240B29-F687-4f45-9708-019B960494DF}">
-                  <a14:hiddenLine xmlns:a14="http://schemas.microsoft.com/office/drawing/2010/main" xmlns="" w="9525">
+                  <a14:hiddenLine xmlns="" xmlns:a14="http://schemas.microsoft.com/office/drawing/2010/main" w="9525">
                     <a:solidFill>
                       <a:srgbClr val="000000"/>
                     </a:solidFill>
@@ -14229,7 +14239,7 @@
               </a:ln>
               <a:extLst>
                 <a:ext uri="{91240B29-F687-4f45-9708-019B960494DF}">
-                  <a14:hiddenLine xmlns:a14="http://schemas.microsoft.com/office/drawing/2010/main" xmlns="" w="9525">
+                  <a14:hiddenLine xmlns="" xmlns:a14="http://schemas.microsoft.com/office/drawing/2010/main" w="9525">
                     <a:solidFill>
                       <a:srgbClr val="000000"/>
                     </a:solidFill>
@@ -14297,7 +14307,7 @@
               </a:ln>
               <a:extLst>
                 <a:ext uri="{91240B29-F687-4f45-9708-019B960494DF}">
-                  <a14:hiddenLine xmlns:a14="http://schemas.microsoft.com/office/drawing/2010/main" xmlns="" w="9525">
+                  <a14:hiddenLine xmlns="" xmlns:a14="http://schemas.microsoft.com/office/drawing/2010/main" w="9525">
                     <a:solidFill>
                       <a:srgbClr val="000000"/>
                     </a:solidFill>
@@ -14387,7 +14397,7 @@
               </a:ln>
               <a:extLst>
                 <a:ext uri="{91240B29-F687-4f45-9708-019B960494DF}">
-                  <a14:hiddenLine xmlns:a14="http://schemas.microsoft.com/office/drawing/2010/main" xmlns="" w="9525">
+                  <a14:hiddenLine xmlns="" xmlns:a14="http://schemas.microsoft.com/office/drawing/2010/main" w="9525">
                     <a:solidFill>
                       <a:srgbClr val="000000"/>
                     </a:solidFill>
@@ -14455,7 +14465,7 @@
               </a:ln>
               <a:extLst>
                 <a:ext uri="{91240B29-F687-4f45-9708-019B960494DF}">
-                  <a14:hiddenLine xmlns:a14="http://schemas.microsoft.com/office/drawing/2010/main" xmlns="" w="9525">
+                  <a14:hiddenLine xmlns="" xmlns:a14="http://schemas.microsoft.com/office/drawing/2010/main" w="9525">
                     <a:solidFill>
                       <a:srgbClr val="000000"/>
                     </a:solidFill>
@@ -14545,7 +14555,7 @@
               </a:ln>
               <a:extLst>
                 <a:ext uri="{91240B29-F687-4f45-9708-019B960494DF}">
-                  <a14:hiddenLine xmlns:a14="http://schemas.microsoft.com/office/drawing/2010/main" xmlns="" w="9525">
+                  <a14:hiddenLine xmlns="" xmlns:a14="http://schemas.microsoft.com/office/drawing/2010/main" w="9525">
                     <a:solidFill>
                       <a:srgbClr val="000000"/>
                     </a:solidFill>
@@ -14579,7 +14589,7 @@
               </a:ln>
               <a:extLst>
                 <a:ext uri="{91240B29-F687-4f45-9708-019B960494DF}">
-                  <a14:hiddenLine xmlns:a14="http://schemas.microsoft.com/office/drawing/2010/main" xmlns="" w="9525">
+                  <a14:hiddenLine xmlns="" xmlns:a14="http://schemas.microsoft.com/office/drawing/2010/main" w="9525">
                     <a:solidFill>
                       <a:srgbClr val="000000"/>
                     </a:solidFill>
@@ -15195,7 +15205,7 @@
           <p:cNvPr id="6" name="Imagen 5" descr="Logotipo&#10;&#10;Descripción generada automáticamente">
             <a:extLst>
               <a:ext uri="{FF2B5EF4-FFF2-40B4-BE49-F238E27FC236}">
-                <a16:creationId xmlns:a16="http://schemas.microsoft.com/office/drawing/2014/main" id="{ABDC1BA5-0B7A-9592-E602-9E12BFB62DB4}"/>
+                <a16:creationId xmlns:a16="http://schemas.microsoft.com/office/drawing/2014/main" xmlns="" id="{ABDC1BA5-0B7A-9592-E602-9E12BFB62DB4}"/>
               </a:ext>
             </a:extLst>
           </p:cNvPr>
@@ -15233,496 +15243,6 @@
 </file>
 
 <file path=ppt/slides/slide10.xml><?xml version="1.0" encoding="utf-8"?>
-<p:sld xmlns:a="http://schemas.openxmlformats.org/drawingml/2006/main" xmlns:r="http://schemas.openxmlformats.org/officeDocument/2006/relationships" xmlns:p="http://schemas.openxmlformats.org/presentationml/2006/main">
-  <p:cSld>
-    <p:spTree>
-      <p:nvGrpSpPr>
-        <p:cNvPr id="1" name=""/>
-        <p:cNvGrpSpPr/>
-        <p:nvPr/>
-      </p:nvGrpSpPr>
-      <p:grpSpPr>
-        <a:xfrm>
-          <a:off x="0" y="0"/>
-          <a:ext cx="0" cy="0"/>
-          <a:chOff x="0" y="0"/>
-          <a:chExt cx="0" cy="0"/>
-        </a:xfrm>
-      </p:grpSpPr>
-      <p:sp>
-        <p:nvSpPr>
-          <p:cNvPr id="10" name="Rectángulo redondeado 9"/>
-          <p:cNvSpPr/>
-          <p:nvPr/>
-        </p:nvSpPr>
-        <p:spPr>
-          <a:xfrm>
-            <a:off x="2598420" y="3852176"/>
-            <a:ext cx="5467350" cy="1924050"/>
-          </a:xfrm>
-          <a:prstGeom prst="roundRect">
-            <a:avLst>
-              <a:gd name="adj" fmla="val 4291"/>
-            </a:avLst>
-          </a:prstGeom>
-          <a:solidFill>
-            <a:srgbClr val="FEFEFE"/>
-          </a:solidFill>
-          <a:ln>
-            <a:noFill/>
-          </a:ln>
-        </p:spPr>
-        <p:style>
-          <a:lnRef idx="2">
-            <a:schemeClr val="accent1">
-              <a:shade val="50000"/>
-            </a:schemeClr>
-          </a:lnRef>
-          <a:fillRef idx="1">
-            <a:schemeClr val="accent1"/>
-          </a:fillRef>
-          <a:effectRef idx="0">
-            <a:schemeClr val="accent1"/>
-          </a:effectRef>
-          <a:fontRef idx="minor">
-            <a:schemeClr val="lt1"/>
-          </a:fontRef>
-        </p:style>
-        <p:txBody>
-          <a:bodyPr rtlCol="0" anchor="ctr"/>
-          <a:lstStyle/>
-          <a:p>
-            <a:pPr algn="ctr"/>
-            <a:endParaRPr lang="es-ES"/>
-          </a:p>
-        </p:txBody>
-      </p:sp>
-      <p:sp>
-        <p:nvSpPr>
-          <p:cNvPr id="8" name="Rectángulo redondeado 7"/>
-          <p:cNvSpPr/>
-          <p:nvPr/>
-        </p:nvSpPr>
-        <p:spPr>
-          <a:xfrm>
-            <a:off x="2299340" y="369496"/>
-            <a:ext cx="5206360" cy="437878"/>
-          </a:xfrm>
-          <a:prstGeom prst="roundRect">
-            <a:avLst>
-              <a:gd name="adj" fmla="val 10141"/>
-            </a:avLst>
-          </a:prstGeom>
-          <a:solidFill>
-            <a:schemeClr val="bg1">
-              <a:lumMod val="75000"/>
-              <a:lumOff val="25000"/>
-            </a:schemeClr>
-          </a:solidFill>
-          <a:ln>
-            <a:noFill/>
-          </a:ln>
-        </p:spPr>
-        <p:style>
-          <a:lnRef idx="2">
-            <a:schemeClr val="accent1">
-              <a:shade val="50000"/>
-            </a:schemeClr>
-          </a:lnRef>
-          <a:fillRef idx="1">
-            <a:schemeClr val="accent1"/>
-          </a:fillRef>
-          <a:effectRef idx="0">
-            <a:schemeClr val="accent1"/>
-          </a:effectRef>
-          <a:fontRef idx="minor">
-            <a:schemeClr val="lt1"/>
-          </a:fontRef>
-        </p:style>
-        <p:txBody>
-          <a:bodyPr rtlCol="0" anchor="ctr"/>
-          <a:lstStyle/>
-          <a:p>
-            <a:pPr algn="ctr"/>
-            <a:endParaRPr lang="es-ES"/>
-          </a:p>
-        </p:txBody>
-      </p:sp>
-      <p:sp>
-        <p:nvSpPr>
-          <p:cNvPr id="4" name="CuadroTexto 3"/>
-          <p:cNvSpPr txBox="1"/>
-          <p:nvPr/>
-        </p:nvSpPr>
-        <p:spPr>
-          <a:xfrm>
-            <a:off x="2299340" y="388380"/>
-            <a:ext cx="5206360" cy="400110"/>
-          </a:xfrm>
-          <a:prstGeom prst="rect">
-            <a:avLst/>
-          </a:prstGeom>
-          <a:noFill/>
-        </p:spPr>
-        <p:txBody>
-          <a:bodyPr wrap="square" rtlCol="0">
-            <a:spAutoFit/>
-          </a:bodyPr>
-          <a:lstStyle/>
-          <a:p>
-            <a:r>
-              <a:rPr lang="es-ES" sz="2000" b="1" dirty="0" err="1"/>
-              <a:t>Develop</a:t>
-            </a:r>
-            <a:r>
-              <a:rPr lang="es-ES" sz="2000" b="1" dirty="0"/>
-              <a:t> </a:t>
-            </a:r>
-            <a:r>
-              <a:rPr lang="es-ES" sz="2000" b="1" dirty="0" err="1"/>
-              <a:t>applications</a:t>
-            </a:r>
-            <a:r>
-              <a:rPr lang="es-ES" sz="2000" b="1" dirty="0"/>
-              <a:t> more </a:t>
-            </a:r>
-            <a:r>
-              <a:rPr lang="es-ES" sz="2000" b="1" dirty="0" err="1"/>
-              <a:t>robust</a:t>
-            </a:r>
-            <a:r>
-              <a:rPr lang="es-ES" sz="2000" b="1" dirty="0"/>
-              <a:t> and </a:t>
-            </a:r>
-            <a:r>
-              <a:rPr lang="es-ES" sz="2000" b="1" dirty="0" err="1"/>
-              <a:t>scalable</a:t>
-            </a:r>
-            <a:endParaRPr lang="es-ES" sz="2000" b="1" dirty="0"/>
-          </a:p>
-        </p:txBody>
-      </p:sp>
-      <p:sp>
-        <p:nvSpPr>
-          <p:cNvPr id="5" name="CuadroTexto 4"/>
-          <p:cNvSpPr txBox="1"/>
-          <p:nvPr/>
-        </p:nvSpPr>
-        <p:spPr>
-          <a:xfrm>
-            <a:off x="2192655" y="1120470"/>
-            <a:ext cx="6278880" cy="923330"/>
-          </a:xfrm>
-          <a:prstGeom prst="rect">
-            <a:avLst/>
-          </a:prstGeom>
-          <a:noFill/>
-        </p:spPr>
-        <p:txBody>
-          <a:bodyPr wrap="square" rtlCol="0">
-            <a:spAutoFit/>
-          </a:bodyPr>
-          <a:lstStyle/>
-          <a:p>
-            <a:r>
-              <a:rPr lang="es-ES" b="1" dirty="0" err="1"/>
-              <a:t>Robust</a:t>
-            </a:r>
-            <a:r>
-              <a:rPr lang="es-ES" b="1" dirty="0"/>
-              <a:t>: </a:t>
-            </a:r>
-            <a:r>
-              <a:rPr lang="es-ES" dirty="0" err="1"/>
-              <a:t>Because</a:t>
-            </a:r>
-            <a:r>
-              <a:rPr lang="es-ES" dirty="0"/>
-              <a:t> </a:t>
-            </a:r>
-            <a:r>
-              <a:rPr lang="es-ES" b="1" dirty="0"/>
-              <a:t>Java</a:t>
-            </a:r>
-            <a:r>
-              <a:rPr lang="es-ES" dirty="0"/>
-              <a:t> </a:t>
-            </a:r>
-            <a:r>
-              <a:rPr lang="es-ES" b="1" dirty="0" err="1"/>
-              <a:t>memory</a:t>
-            </a:r>
-            <a:r>
-              <a:rPr lang="es-ES" dirty="0"/>
-              <a:t> </a:t>
-            </a:r>
-            <a:r>
-              <a:rPr lang="es-ES" b="1" dirty="0" err="1"/>
-              <a:t>management</a:t>
-            </a:r>
-            <a:r>
-              <a:rPr lang="es-ES" dirty="0"/>
-              <a:t> </a:t>
-            </a:r>
-            <a:r>
-              <a:rPr lang="es-ES" dirty="0" err="1"/>
-              <a:t>is</a:t>
-            </a:r>
-            <a:r>
-              <a:rPr lang="es-ES" dirty="0"/>
-              <a:t> </a:t>
-            </a:r>
-            <a:r>
-              <a:rPr lang="es-ES" dirty="0" err="1"/>
-              <a:t>very</a:t>
-            </a:r>
-            <a:r>
-              <a:rPr lang="es-ES" dirty="0"/>
-              <a:t> </a:t>
-            </a:r>
-            <a:r>
-              <a:rPr lang="es-ES" dirty="0" err="1"/>
-              <a:t>good</a:t>
-            </a:r>
-            <a:r>
-              <a:rPr lang="es-ES" dirty="0"/>
-              <a:t>, he </a:t>
-            </a:r>
-            <a:r>
-              <a:rPr lang="es-ES" dirty="0" err="1"/>
-              <a:t>know</a:t>
-            </a:r>
-            <a:r>
-              <a:rPr lang="es-ES" dirty="0"/>
-              <a:t> </a:t>
-            </a:r>
-            <a:r>
-              <a:rPr lang="es-ES" dirty="0" err="1"/>
-              <a:t>when</a:t>
-            </a:r>
-            <a:r>
-              <a:rPr lang="es-ES" dirty="0"/>
-              <a:t> to free </a:t>
-            </a:r>
-            <a:r>
-              <a:rPr lang="es-ES" dirty="0" err="1"/>
-              <a:t>memory</a:t>
-            </a:r>
-            <a:r>
-              <a:rPr lang="es-ES" dirty="0"/>
-              <a:t> and he do </a:t>
-            </a:r>
-            <a:r>
-              <a:rPr lang="es-ES" b="1" dirty="0" err="1"/>
-              <a:t>automatically</a:t>
-            </a:r>
-            <a:r>
-              <a:rPr lang="es-ES" dirty="0"/>
-              <a:t>, </a:t>
-            </a:r>
-            <a:r>
-              <a:rPr lang="es-ES" dirty="0" err="1"/>
-              <a:t>this</a:t>
-            </a:r>
-            <a:r>
-              <a:rPr lang="es-ES" dirty="0"/>
-              <a:t> </a:t>
-            </a:r>
-            <a:r>
-              <a:rPr lang="es-ES" dirty="0" err="1"/>
-              <a:t>makes</a:t>
-            </a:r>
-            <a:r>
-              <a:rPr lang="es-ES" dirty="0"/>
-              <a:t> Java </a:t>
-            </a:r>
-            <a:r>
-              <a:rPr lang="es-ES" dirty="0" err="1"/>
-              <a:t>very</a:t>
-            </a:r>
-            <a:r>
-              <a:rPr lang="es-ES" dirty="0"/>
-              <a:t> </a:t>
-            </a:r>
-            <a:r>
-              <a:rPr lang="es-ES" dirty="0" err="1"/>
-              <a:t>efficient</a:t>
-            </a:r>
-            <a:r>
-              <a:rPr lang="es-ES" dirty="0"/>
-              <a:t>.</a:t>
-            </a:r>
-          </a:p>
-        </p:txBody>
-      </p:sp>
-      <p:sp>
-        <p:nvSpPr>
-          <p:cNvPr id="6" name="CuadroTexto 5"/>
-          <p:cNvSpPr txBox="1"/>
-          <p:nvPr/>
-        </p:nvSpPr>
-        <p:spPr>
-          <a:xfrm>
-            <a:off x="2192655" y="2757269"/>
-            <a:ext cx="5113020" cy="646331"/>
-          </a:xfrm>
-          <a:prstGeom prst="rect">
-            <a:avLst/>
-          </a:prstGeom>
-          <a:noFill/>
-        </p:spPr>
-        <p:txBody>
-          <a:bodyPr wrap="square" rtlCol="0">
-            <a:spAutoFit/>
-          </a:bodyPr>
-          <a:lstStyle/>
-          <a:p>
-            <a:r>
-              <a:rPr lang="es-ES" b="1" dirty="0" err="1"/>
-              <a:t>Scalable</a:t>
-            </a:r>
-            <a:r>
-              <a:rPr lang="es-ES" b="1" dirty="0"/>
-              <a:t>: </a:t>
-            </a:r>
-            <a:r>
-              <a:rPr lang="es-ES" dirty="0"/>
-              <a:t>Java can control </a:t>
-            </a:r>
-            <a:r>
-              <a:rPr lang="es-ES" dirty="0" err="1"/>
-              <a:t>big</a:t>
-            </a:r>
-            <a:r>
-              <a:rPr lang="es-ES" dirty="0"/>
-              <a:t> </a:t>
-            </a:r>
-            <a:r>
-              <a:rPr lang="es-ES" dirty="0" err="1"/>
-              <a:t>aplications</a:t>
-            </a:r>
-            <a:r>
-              <a:rPr lang="es-ES" dirty="0"/>
-              <a:t> </a:t>
-            </a:r>
-            <a:r>
-              <a:rPr lang="es-ES" dirty="0" err="1"/>
-              <a:t>easily</a:t>
-            </a:r>
-            <a:r>
-              <a:rPr lang="es-ES" dirty="0"/>
-              <a:t>, </a:t>
-            </a:r>
-            <a:r>
-              <a:rPr lang="es-ES" dirty="0" err="1"/>
-              <a:t>is</a:t>
-            </a:r>
-            <a:r>
-              <a:rPr lang="es-ES" dirty="0"/>
-              <a:t> </a:t>
-            </a:r>
-            <a:r>
-              <a:rPr lang="es-ES" dirty="0" err="1"/>
-              <a:t>for</a:t>
-            </a:r>
-            <a:r>
-              <a:rPr lang="es-ES" dirty="0"/>
-              <a:t> </a:t>
-            </a:r>
-            <a:r>
-              <a:rPr lang="es-ES" dirty="0" err="1"/>
-              <a:t>it</a:t>
-            </a:r>
-            <a:r>
-              <a:rPr lang="es-ES" dirty="0"/>
-              <a:t> Java </a:t>
-            </a:r>
-            <a:r>
-              <a:rPr lang="es-ES" dirty="0" err="1"/>
-              <a:t>is</a:t>
-            </a:r>
-            <a:r>
-              <a:rPr lang="es-ES" dirty="0"/>
-              <a:t> </a:t>
-            </a:r>
-            <a:r>
-              <a:rPr lang="es-ES" dirty="0" err="1"/>
-              <a:t>used</a:t>
-            </a:r>
-            <a:r>
-              <a:rPr lang="es-ES" dirty="0"/>
-              <a:t> to </a:t>
-            </a:r>
-            <a:r>
-              <a:rPr lang="es-ES" dirty="0" err="1"/>
-              <a:t>big</a:t>
-            </a:r>
-            <a:r>
-              <a:rPr lang="es-ES" dirty="0"/>
-              <a:t> </a:t>
-            </a:r>
-            <a:r>
-              <a:rPr lang="es-ES" dirty="0" err="1"/>
-              <a:t>companies</a:t>
-            </a:r>
-            <a:r>
-              <a:rPr lang="es-ES" dirty="0"/>
-              <a:t> in </a:t>
-            </a:r>
-            <a:r>
-              <a:rPr lang="es-ES" dirty="0" err="1"/>
-              <a:t>her</a:t>
-            </a:r>
-            <a:r>
-              <a:rPr lang="es-ES" dirty="0"/>
-              <a:t> </a:t>
-            </a:r>
-            <a:r>
-              <a:rPr lang="es-ES" dirty="0" err="1"/>
-              <a:t>aplications</a:t>
-            </a:r>
-            <a:endParaRPr lang="es-ES" dirty="0"/>
-          </a:p>
-        </p:txBody>
-      </p:sp>
-      <p:pic>
-        <p:nvPicPr>
-          <p:cNvPr id="9" name="Imagen 8"/>
-          <p:cNvPicPr>
-            <a:picLocks noChangeAspect="1"/>
-          </p:cNvPicPr>
-          <p:nvPr/>
-        </p:nvPicPr>
-        <p:blipFill>
-          <a:blip r:embed="rId2"/>
-          <a:stretch>
-            <a:fillRect/>
-          </a:stretch>
-        </p:blipFill>
-        <p:spPr>
-          <a:xfrm>
-            <a:off x="2759305" y="4037600"/>
-            <a:ext cx="5145579" cy="1699930"/>
-          </a:xfrm>
-          <a:prstGeom prst="rect">
-            <a:avLst/>
-          </a:prstGeom>
-        </p:spPr>
-      </p:pic>
-    </p:spTree>
-    <p:extLst>
-      <p:ext uri="{BB962C8B-B14F-4D97-AF65-F5344CB8AC3E}">
-        <p14:creationId xmlns:p14="http://schemas.microsoft.com/office/powerpoint/2010/main" val="1586887626"/>
-      </p:ext>
-    </p:extLst>
-  </p:cSld>
-  <p:clrMapOvr>
-    <a:masterClrMapping/>
-  </p:clrMapOvr>
-</p:sld>
-</file>
-
-<file path=ppt/slides/slide11.xml><?xml version="1.0" encoding="utf-8"?>
 <p:sld xmlns:a="http://schemas.openxmlformats.org/drawingml/2006/main" xmlns:r="http://schemas.openxmlformats.org/officeDocument/2006/relationships" xmlns:p="http://schemas.openxmlformats.org/presentationml/2006/main">
   <p:cSld>
     <p:spTree>
@@ -16549,7 +16069,7 @@
 </p:sld>
 </file>
 
-<file path=ppt/slides/slide12.xml><?xml version="1.0" encoding="utf-8"?>
+<file path=ppt/slides/slide11.xml><?xml version="1.0" encoding="utf-8"?>
 <p:sld xmlns:a="http://schemas.openxmlformats.org/drawingml/2006/main" xmlns:r="http://schemas.openxmlformats.org/officeDocument/2006/relationships" xmlns:p="http://schemas.openxmlformats.org/presentationml/2006/main">
   <p:cSld>
     <p:spTree>
@@ -16588,6 +16108,10 @@
           </a:bodyPr>
           <a:lstStyle/>
           <a:p>
+            <a:r>
+              <a:rPr lang="es-ES" dirty="0"/>
+              <a:t/>
+            </a:r>
             <a:br>
               <a:rPr lang="es-ES" dirty="0"/>
             </a:br>
@@ -16600,6 +16124,10 @@
             <a:endParaRPr lang="es-ES" dirty="0"/>
           </a:p>
           <a:p>
+            <a:r>
+              <a:rPr lang="en-US" dirty="0"/>
+              <a:t/>
+            </a:r>
             <a:br>
               <a:rPr lang="en-US" dirty="0"/>
             </a:br>
@@ -16752,7 +16280,7 @@
           <p:cNvPr id="2" name="Título 1">
             <a:extLst>
               <a:ext uri="{FF2B5EF4-FFF2-40B4-BE49-F238E27FC236}">
-                <a16:creationId xmlns:a16="http://schemas.microsoft.com/office/drawing/2014/main" id="{15D7F636-FF34-D8C8-CE64-B73F810ADA11}"/>
+                <a16:creationId xmlns:a16="http://schemas.microsoft.com/office/drawing/2014/main" xmlns="" id="{15D7F636-FF34-D8C8-CE64-B73F810ADA11}"/>
               </a:ext>
             </a:extLst>
           </p:cNvPr>
@@ -16797,7 +16325,7 @@
           <p:cNvPr id="3" name="Marcador de contenido 2">
             <a:extLst>
               <a:ext uri="{FF2B5EF4-FFF2-40B4-BE49-F238E27FC236}">
-                <a16:creationId xmlns:a16="http://schemas.microsoft.com/office/drawing/2014/main" id="{DF3ED317-2E7B-F525-4FDA-C4CBD9486AD9}"/>
+                <a16:creationId xmlns:a16="http://schemas.microsoft.com/office/drawing/2014/main" xmlns="" id="{DF3ED317-2E7B-F525-4FDA-C4CBD9486AD9}"/>
               </a:ext>
             </a:extLst>
           </p:cNvPr>
@@ -17438,7 +16966,7 @@
           <p:cNvPr id="5" name="Imagen 4" descr="Imagen que contiene Esquemático&#10;&#10;Descripción generada automáticamente">
             <a:extLst>
               <a:ext uri="{FF2B5EF4-FFF2-40B4-BE49-F238E27FC236}">
-                <a16:creationId xmlns:a16="http://schemas.microsoft.com/office/drawing/2014/main" id="{B6B1AB78-CEF4-0ED6-FCFF-61F7CE432F4F}"/>
+                <a16:creationId xmlns:a16="http://schemas.microsoft.com/office/drawing/2014/main" xmlns="" id="{B6B1AB78-CEF4-0ED6-FCFF-61F7CE432F4F}"/>
               </a:ext>
             </a:extLst>
           </p:cNvPr>
@@ -17502,20 +17030,24 @@
             <p:ph type="title"/>
           </p:nvPr>
         </p:nvSpPr>
-        <p:spPr>
-          <a:xfrm>
-            <a:off x="1053490" y="451464"/>
-            <a:ext cx="9905998" cy="999267"/>
-          </a:xfrm>
-        </p:spPr>
+        <p:spPr/>
         <p:txBody>
           <a:bodyPr/>
           <a:lstStyle/>
           <a:p>
             <a:r>
+              <a:rPr lang="es-ES" b="1" dirty="0" smtClean="0"/>
+              <a:t>Key </a:t>
+            </a:r>
+            <a:r>
+              <a:rPr lang="es-ES" b="1" dirty="0" err="1"/>
+              <a:t>Features</a:t>
+            </a:r>
+            <a:r>
               <a:rPr lang="es-ES" b="1" dirty="0"/>
-              <a:t>OJBECT ORIENTATION IN JAVA</a:t>
-            </a:r>
+              <a:t> of Java</a:t>
+            </a:r>
+            <a:endParaRPr lang="es-ES" b="1" dirty="0"/>
           </a:p>
         </p:txBody>
       </p:sp>
@@ -17531,137 +17063,84 @@
         </p:nvSpPr>
         <p:spPr>
           <a:xfrm>
-            <a:off x="861645" y="1688122"/>
-            <a:ext cx="7966565" cy="4457701"/>
+            <a:off x="1141412" y="1870795"/>
+            <a:ext cx="9905999" cy="2627313"/>
           </a:xfrm>
         </p:spPr>
         <p:txBody>
-          <a:bodyPr>
-            <a:normAutofit/>
-          </a:bodyPr>
+          <a:bodyPr/>
           <a:lstStyle/>
           <a:p>
             <a:r>
+              <a:rPr lang="en-US" b="1" dirty="0"/>
+              <a:t>Portability:</a:t>
+            </a:r>
+            <a:r>
               <a:rPr lang="en-US" dirty="0"/>
-              <a:t>Java is an </a:t>
+              <a:t> Runs on any platform with the Java Virtual Machine (JVM). </a:t>
+            </a:r>
+            <a:endParaRPr lang="en-US" dirty="0" smtClean="0"/>
+          </a:p>
+          <a:p>
+            <a:r>
+              <a:rPr lang="en-US" b="1" dirty="0" smtClean="0"/>
+              <a:t>Object-Oriented</a:t>
             </a:r>
             <a:r>
               <a:rPr lang="en-US" b="1" dirty="0"/>
-              <a:t>object-oriented programming language</a:t>
+              <a:t>:</a:t>
             </a:r>
             <a:r>
               <a:rPr lang="en-US" dirty="0"/>
-              <a:t>.</a:t>
-            </a:r>
-          </a:p>
-          <a:p>
-            <a:pPr algn="l">
-              <a:buFont typeface="Arial" panose="020B0604020202020204" pitchFamily="34" charset="0"/>
-              <a:buChar char="•"/>
-            </a:pPr>
-            <a:r>
-              <a:rPr lang="en-US" b="0" i="0" dirty="0">
-                <a:solidFill>
-                  <a:srgbClr val="ECECF1"/>
-                </a:solidFill>
-                <a:effectLst/>
-                <a:latin typeface="Söhne"/>
-              </a:rPr>
-              <a:t>Based on the concept of "objects" encapsulating data and behavior</a:t>
-            </a:r>
-          </a:p>
-          <a:p>
-            <a:pPr algn="l">
-              <a:buFont typeface="Arial" panose="020B0604020202020204" pitchFamily="34" charset="0"/>
-              <a:buChar char="•"/>
-            </a:pPr>
-            <a:r>
-              <a:rPr lang="en-US" b="0" i="0" dirty="0">
-                <a:solidFill>
-                  <a:srgbClr val="ECECF1"/>
-                </a:solidFill>
-                <a:effectLst/>
-                <a:latin typeface="Söhne"/>
-              </a:rPr>
-              <a:t>Java is a widely used, object-oriented programming language</a:t>
-            </a:r>
-          </a:p>
-          <a:p>
-            <a:pPr algn="l">
-              <a:buFont typeface="Arial" panose="020B0604020202020204" pitchFamily="34" charset="0"/>
-              <a:buChar char="•"/>
-            </a:pPr>
-            <a:r>
-              <a:rPr lang="en-US" b="0" i="0" dirty="0">
-                <a:solidFill>
-                  <a:srgbClr val="ECECF1"/>
-                </a:solidFill>
-                <a:effectLst/>
-                <a:latin typeface="Söhne"/>
-              </a:rPr>
-              <a:t>Key Aspects:</a:t>
-            </a:r>
-          </a:p>
-          <a:p>
-            <a:pPr marL="742950" lvl="1" indent="-285750" algn="l">
-              <a:buFont typeface="Arial" panose="020B0604020202020204" pitchFamily="34" charset="0"/>
-              <a:buChar char="•"/>
-            </a:pPr>
-            <a:r>
-              <a:rPr lang="en-US" b="0" i="0" dirty="0">
-                <a:solidFill>
-                  <a:srgbClr val="ECECF1"/>
-                </a:solidFill>
-                <a:effectLst/>
-                <a:latin typeface="Söhne"/>
-              </a:rPr>
-              <a:t>Everything in Java is considered an object</a:t>
-            </a:r>
-          </a:p>
-          <a:p>
-            <a:pPr marL="742950" lvl="1" indent="-285750" algn="l">
-              <a:buFont typeface="Arial" panose="020B0604020202020204" pitchFamily="34" charset="0"/>
-              <a:buChar char="•"/>
-            </a:pPr>
-            <a:r>
-              <a:rPr lang="en-US" b="0" i="0" dirty="0">
-                <a:solidFill>
-                  <a:srgbClr val="ECECF1"/>
-                </a:solidFill>
-                <a:effectLst/>
-                <a:latin typeface="Söhne"/>
-              </a:rPr>
-              <a:t>Objects are instances of classes, serving as blueprints</a:t>
-            </a:r>
-          </a:p>
-          <a:p>
-            <a:pPr marL="742950" lvl="1" indent="-285750" algn="l">
-              <a:buFont typeface="Arial" panose="020B0604020202020204" pitchFamily="34" charset="0"/>
-              <a:buChar char="•"/>
-            </a:pPr>
-            <a:r>
-              <a:rPr lang="en-US" b="0" i="0" dirty="0">
-                <a:solidFill>
-                  <a:srgbClr val="ECECF1"/>
-                </a:solidFill>
-                <a:effectLst/>
-                <a:latin typeface="Söhne"/>
-              </a:rPr>
-              <a:t>Classes define properties (attributes) and behaviors (methods)</a:t>
-            </a:r>
-          </a:p>
-          <a:p>
-            <a:endParaRPr lang="en-US" dirty="0"/>
-          </a:p>
-          <a:p>
+              <a:t> Based on objects and allows the creation of classes and objects. </a:t>
+            </a:r>
+            <a:endParaRPr lang="en-US" dirty="0" smtClean="0"/>
+          </a:p>
+          <a:p>
+            <a:r>
+              <a:rPr lang="en-US" b="1" dirty="0" smtClean="0"/>
+              <a:t>Security</a:t>
+            </a:r>
+            <a:r>
+              <a:rPr lang="en-US" b="1" dirty="0"/>
+              <a:t>:</a:t>
+            </a:r>
+            <a:r>
+              <a:rPr lang="en-US" dirty="0"/>
+              <a:t> Secure environment with its memory management system and security policies.</a:t>
+            </a:r>
             <a:endParaRPr lang="es-ES" dirty="0"/>
           </a:p>
         </p:txBody>
       </p:sp>
+      <p:pic>
+        <p:nvPicPr>
+          <p:cNvPr id="4" name="Imagen 3"/>
+          <p:cNvPicPr>
+            <a:picLocks noChangeAspect="1"/>
+          </p:cNvPicPr>
+          <p:nvPr/>
+        </p:nvPicPr>
+        <p:blipFill>
+          <a:blip r:embed="rId2"/>
+          <a:stretch>
+            <a:fillRect/>
+          </a:stretch>
+        </p:blipFill>
+        <p:spPr>
+          <a:xfrm>
+            <a:off x="1415349" y="4553524"/>
+            <a:ext cx="8721018" cy="2021641"/>
+          </a:xfrm>
+          <a:prstGeom prst="rect">
+            <a:avLst/>
+          </a:prstGeom>
+        </p:spPr>
+      </p:pic>
     </p:spTree>
     <p:extLst>
       <p:ext uri="{BB962C8B-B14F-4D97-AF65-F5344CB8AC3E}">
-        <p14:creationId xmlns:p14="http://schemas.microsoft.com/office/powerpoint/2010/main" val="3037264697"/>
+        <p14:creationId xmlns:p14="http://schemas.microsoft.com/office/powerpoint/2010/main" val="2727339987"/>
       </p:ext>
     </p:extLst>
   </p:cSld>
@@ -17690,10 +17169,1279 @@
       </p:grpSpPr>
       <p:sp>
         <p:nvSpPr>
+          <p:cNvPr id="2" name="Título 1"/>
+          <p:cNvSpPr>
+            <a:spLocks noGrp="1"/>
+          </p:cNvSpPr>
+          <p:nvPr>
+            <p:ph type="title"/>
+          </p:nvPr>
+        </p:nvSpPr>
+        <p:spPr>
+          <a:xfrm>
+            <a:off x="1141413" y="322957"/>
+            <a:ext cx="9905998" cy="1478570"/>
+          </a:xfrm>
+        </p:spPr>
+        <p:txBody>
+          <a:bodyPr/>
+          <a:lstStyle/>
+          <a:p>
+            <a:r>
+              <a:rPr lang="es-ES" b="1" dirty="0"/>
+              <a:t>Basic Java </a:t>
+            </a:r>
+            <a:r>
+              <a:rPr lang="es-ES" b="1" dirty="0" err="1"/>
+              <a:t>Syntax</a:t>
+            </a:r>
+            <a:endParaRPr lang="es-ES" b="1" dirty="0"/>
+          </a:p>
+        </p:txBody>
+      </p:sp>
+      <p:sp>
+        <p:nvSpPr>
+          <p:cNvPr id="4" name="Rectangle 1"/>
+          <p:cNvSpPr>
+            <a:spLocks noGrp="1" noChangeArrowheads="1"/>
+          </p:cNvSpPr>
+          <p:nvPr>
+            <p:ph idx="1"/>
+          </p:nvPr>
+        </p:nvSpPr>
+        <p:spPr bwMode="auto">
+          <a:xfrm>
+            <a:off x="1141411" y="1136724"/>
+            <a:ext cx="7937933" cy="5711822"/>
+          </a:xfrm>
+          <a:prstGeom prst="rect">
+            <a:avLst/>
+          </a:prstGeom>
+          <a:noFill/>
+          <a:ln>
+            <a:noFill/>
+          </a:ln>
+          <a:effectLst/>
+          <a:extLst>
+            <a:ext uri="{909E8E84-426E-40DD-AFC4-6F175D3DCCD1}">
+              <a14:hiddenFill xmlns:a14="http://schemas.microsoft.com/office/drawing/2010/main">
+                <a:solidFill>
+                  <a:schemeClr val="accent1"/>
+                </a:solidFill>
+              </a14:hiddenFill>
+            </a:ext>
+            <a:ext uri="{91240B29-F687-4F45-9708-019B960494DF}">
+              <a14:hiddenLine xmlns:a14="http://schemas.microsoft.com/office/drawing/2010/main" w="9525">
+                <a:solidFill>
+                  <a:schemeClr val="tx1"/>
+                </a:solidFill>
+                <a:miter lim="800000"/>
+                <a:headEnd/>
+                <a:tailEnd/>
+              </a14:hiddenLine>
+            </a:ext>
+            <a:ext uri="{AF507438-7753-43E0-B8FC-AC1667EBCBE1}">
+              <a14:hiddenEffects xmlns:a14="http://schemas.microsoft.com/office/drawing/2010/main">
+                <a:effectLst>
+                  <a:outerShdw dist="35921" dir="2700000" algn="ctr" rotWithShape="0">
+                    <a:schemeClr val="bg2"/>
+                  </a:outerShdw>
+                </a:effectLst>
+              </a14:hiddenEffects>
+            </a:ext>
+          </a:extLst>
+        </p:spPr>
+        <p:txBody>
+          <a:bodyPr vert="horz" wrap="square" lIns="0" tIns="198375" rIns="0" bIns="198375" numCol="1" anchor="ctr" anchorCtr="0" compatLnSpc="1">
+            <a:prstTxWarp prst="textNoShape">
+              <a:avLst/>
+            </a:prstTxWarp>
+            <a:spAutoFit/>
+          </a:bodyPr>
+          <a:lstStyle/>
+          <a:p>
+            <a:pPr marL="0" marR="0" lvl="0" indent="0" algn="l" defTabSz="914400" rtl="0" eaLnBrk="0" fontAlgn="base" latinLnBrk="0" hangingPunct="0">
+              <a:lnSpc>
+                <a:spcPct val="100000"/>
+              </a:lnSpc>
+              <a:spcBef>
+                <a:spcPct val="0"/>
+              </a:spcBef>
+              <a:spcAft>
+                <a:spcPct val="0"/>
+              </a:spcAft>
+              <a:buClrTx/>
+              <a:buSzTx/>
+              <a:buFontTx/>
+              <a:buNone/>
+              <a:tabLst/>
+            </a:pPr>
+            <a:endParaRPr kumimoji="0" lang="es-ES" b="0" i="0" u="none" strike="noStrike" cap="none" normalizeH="0" baseline="0" dirty="0" smtClean="0">
+              <a:ln>
+                <a:noFill/>
+              </a:ln>
+              <a:solidFill>
+                <a:schemeClr val="tx1"/>
+              </a:solidFill>
+              <a:effectLst/>
+            </a:endParaRPr>
+          </a:p>
+          <a:p>
+            <a:pPr marL="0" marR="0" lvl="0" indent="0" algn="l" defTabSz="914400" rtl="0" eaLnBrk="0" fontAlgn="base" latinLnBrk="0" hangingPunct="0">
+              <a:lnSpc>
+                <a:spcPct val="100000"/>
+              </a:lnSpc>
+              <a:spcBef>
+                <a:spcPct val="0"/>
+              </a:spcBef>
+              <a:spcAft>
+                <a:spcPct val="0"/>
+              </a:spcAft>
+              <a:buClrTx/>
+              <a:buSzTx/>
+              <a:buFontTx/>
+              <a:buAutoNum type="arabicPeriod"/>
+              <a:tabLst/>
+            </a:pPr>
+            <a:r>
+              <a:rPr kumimoji="0" lang="es-ES" b="1" i="0" u="none" strike="noStrike" cap="none" normalizeH="0" baseline="0" dirty="0" err="1" smtClean="0">
+                <a:ln>
+                  <a:noFill/>
+                </a:ln>
+                <a:solidFill>
+                  <a:schemeClr val="tx1"/>
+                </a:solidFill>
+                <a:effectLst/>
+              </a:rPr>
+              <a:t>Declarations</a:t>
+            </a:r>
+            <a:r>
+              <a:rPr kumimoji="0" lang="es-ES" b="1" i="0" u="none" strike="noStrike" cap="none" normalizeH="0" baseline="0" dirty="0" smtClean="0">
+                <a:ln>
+                  <a:noFill/>
+                </a:ln>
+                <a:solidFill>
+                  <a:schemeClr val="tx1"/>
+                </a:solidFill>
+                <a:effectLst/>
+              </a:rPr>
+              <a:t> and </a:t>
+            </a:r>
+            <a:r>
+              <a:rPr kumimoji="0" lang="es-ES" b="1" i="0" u="none" strike="noStrike" cap="none" normalizeH="0" baseline="0" dirty="0" err="1" smtClean="0">
+                <a:ln>
+                  <a:noFill/>
+                </a:ln>
+                <a:solidFill>
+                  <a:schemeClr val="tx1"/>
+                </a:solidFill>
+                <a:effectLst/>
+              </a:rPr>
+              <a:t>Assignments</a:t>
+            </a:r>
+            <a:r>
+              <a:rPr kumimoji="0" lang="es-ES" b="1" i="0" u="none" strike="noStrike" cap="none" normalizeH="0" baseline="0" dirty="0" smtClean="0">
+                <a:ln>
+                  <a:noFill/>
+                </a:ln>
+                <a:solidFill>
+                  <a:schemeClr val="tx1"/>
+                </a:solidFill>
+                <a:effectLst/>
+              </a:rPr>
+              <a:t>:</a:t>
+            </a:r>
+            <a:endParaRPr kumimoji="0" lang="es-ES" b="0" i="0" u="none" strike="noStrike" cap="none" normalizeH="0" baseline="0" dirty="0" smtClean="0">
+              <a:ln>
+                <a:noFill/>
+              </a:ln>
+              <a:solidFill>
+                <a:schemeClr val="tx1"/>
+              </a:solidFill>
+              <a:effectLst/>
+            </a:endParaRPr>
+          </a:p>
+          <a:p>
+            <a:pPr marL="457200" marR="0" lvl="1" indent="0" algn="l" defTabSz="914400" rtl="0" eaLnBrk="0" fontAlgn="base" latinLnBrk="0" hangingPunct="0">
+              <a:lnSpc>
+                <a:spcPct val="100000"/>
+              </a:lnSpc>
+              <a:spcBef>
+                <a:spcPct val="0"/>
+              </a:spcBef>
+              <a:spcAft>
+                <a:spcPct val="0"/>
+              </a:spcAft>
+              <a:buClrTx/>
+              <a:buSzTx/>
+              <a:buFontTx/>
+              <a:buChar char="•"/>
+              <a:tabLst/>
+            </a:pPr>
+            <a:r>
+              <a:rPr kumimoji="0" lang="es-ES" sz="2400" b="0" i="0" u="none" strike="noStrike" cap="none" normalizeH="0" baseline="0" dirty="0" smtClean="0">
+                <a:ln>
+                  <a:noFill/>
+                </a:ln>
+                <a:solidFill>
+                  <a:schemeClr val="tx1"/>
+                </a:solidFill>
+                <a:effectLst/>
+              </a:rPr>
+              <a:t>Variable </a:t>
+            </a:r>
+            <a:r>
+              <a:rPr kumimoji="0" lang="es-ES" sz="2400" b="0" i="0" u="none" strike="noStrike" cap="none" normalizeH="0" baseline="0" dirty="0" err="1" smtClean="0">
+                <a:ln>
+                  <a:noFill/>
+                </a:ln>
+                <a:solidFill>
+                  <a:schemeClr val="tx1"/>
+                </a:solidFill>
+                <a:effectLst/>
+              </a:rPr>
+              <a:t>Declaration</a:t>
+            </a:r>
+            <a:r>
+              <a:rPr kumimoji="0" lang="es-ES" sz="2400" b="0" i="0" u="none" strike="noStrike" cap="none" normalizeH="0" baseline="0" dirty="0" smtClean="0">
+                <a:ln>
+                  <a:noFill/>
+                </a:ln>
+                <a:solidFill>
+                  <a:schemeClr val="tx1"/>
+                </a:solidFill>
+                <a:effectLst/>
+              </a:rPr>
+              <a:t>: </a:t>
+            </a:r>
+            <a:r>
+              <a:rPr kumimoji="0" lang="es-ES" sz="2400" b="1" i="0" u="none" strike="noStrike" cap="none" normalizeH="0" baseline="0" dirty="0" err="1" smtClean="0">
+                <a:ln>
+                  <a:noFill/>
+                </a:ln>
+                <a:solidFill>
+                  <a:schemeClr val="tx1"/>
+                </a:solidFill>
+                <a:effectLst/>
+              </a:rPr>
+              <a:t>int</a:t>
+            </a:r>
+            <a:r>
+              <a:rPr kumimoji="0" lang="es-ES" sz="2400" b="1" i="0" u="none" strike="noStrike" cap="none" normalizeH="0" baseline="0" dirty="0" smtClean="0">
+                <a:ln>
+                  <a:noFill/>
+                </a:ln>
+                <a:solidFill>
+                  <a:schemeClr val="tx1"/>
+                </a:solidFill>
+                <a:effectLst/>
+              </a:rPr>
+              <a:t> x;</a:t>
+            </a:r>
+            <a:endParaRPr kumimoji="0" lang="es-ES" sz="2400" b="0" i="0" u="none" strike="noStrike" cap="none" normalizeH="0" baseline="0" dirty="0" smtClean="0">
+              <a:ln>
+                <a:noFill/>
+              </a:ln>
+              <a:solidFill>
+                <a:schemeClr val="tx1"/>
+              </a:solidFill>
+              <a:effectLst/>
+            </a:endParaRPr>
+          </a:p>
+          <a:p>
+            <a:pPr marL="457200" marR="0" lvl="1" indent="0" algn="l" defTabSz="914400" rtl="0" eaLnBrk="0" fontAlgn="base" latinLnBrk="0" hangingPunct="0">
+              <a:lnSpc>
+                <a:spcPct val="100000"/>
+              </a:lnSpc>
+              <a:spcBef>
+                <a:spcPct val="0"/>
+              </a:spcBef>
+              <a:spcAft>
+                <a:spcPct val="0"/>
+              </a:spcAft>
+              <a:buClrTx/>
+              <a:buSzTx/>
+              <a:buFontTx/>
+              <a:buChar char="•"/>
+              <a:tabLst/>
+            </a:pPr>
+            <a:r>
+              <a:rPr kumimoji="0" lang="es-ES" sz="2400" b="0" i="0" u="none" strike="noStrike" cap="none" normalizeH="0" baseline="0" dirty="0" smtClean="0">
+                <a:ln>
+                  <a:noFill/>
+                </a:ln>
+                <a:solidFill>
+                  <a:schemeClr val="tx1"/>
+                </a:solidFill>
+                <a:effectLst/>
+              </a:rPr>
+              <a:t>Variable </a:t>
+            </a:r>
+            <a:r>
+              <a:rPr kumimoji="0" lang="es-ES" sz="2400" b="0" i="0" u="none" strike="noStrike" cap="none" normalizeH="0" baseline="0" dirty="0" err="1" smtClean="0">
+                <a:ln>
+                  <a:noFill/>
+                </a:ln>
+                <a:solidFill>
+                  <a:schemeClr val="tx1"/>
+                </a:solidFill>
+                <a:effectLst/>
+              </a:rPr>
+              <a:t>Initialization</a:t>
+            </a:r>
+            <a:r>
+              <a:rPr kumimoji="0" lang="es-ES" sz="2400" b="0" i="0" u="none" strike="noStrike" cap="none" normalizeH="0" baseline="0" dirty="0" smtClean="0">
+                <a:ln>
+                  <a:noFill/>
+                </a:ln>
+                <a:solidFill>
+                  <a:schemeClr val="tx1"/>
+                </a:solidFill>
+                <a:effectLst/>
+              </a:rPr>
+              <a:t>: </a:t>
+            </a:r>
+            <a:r>
+              <a:rPr kumimoji="0" lang="es-ES" sz="2400" b="1" i="0" u="none" strike="noStrike" cap="none" normalizeH="0" baseline="0" dirty="0" err="1" smtClean="0">
+                <a:ln>
+                  <a:noFill/>
+                </a:ln>
+                <a:solidFill>
+                  <a:schemeClr val="tx1"/>
+                </a:solidFill>
+                <a:effectLst/>
+              </a:rPr>
+              <a:t>int</a:t>
+            </a:r>
+            <a:r>
+              <a:rPr kumimoji="0" lang="es-ES" sz="2400" b="1" i="0" u="none" strike="noStrike" cap="none" normalizeH="0" baseline="0" dirty="0" smtClean="0">
+                <a:ln>
+                  <a:noFill/>
+                </a:ln>
+                <a:solidFill>
+                  <a:schemeClr val="tx1"/>
+                </a:solidFill>
+                <a:effectLst/>
+              </a:rPr>
+              <a:t> y = 10;</a:t>
+            </a:r>
+            <a:endParaRPr kumimoji="0" lang="es-ES" sz="2400" b="0" i="0" u="none" strike="noStrike" cap="none" normalizeH="0" baseline="0" dirty="0" smtClean="0">
+              <a:ln>
+                <a:noFill/>
+              </a:ln>
+              <a:solidFill>
+                <a:schemeClr val="tx1"/>
+              </a:solidFill>
+              <a:effectLst/>
+            </a:endParaRPr>
+          </a:p>
+          <a:p>
+            <a:pPr marL="0" marR="0" lvl="0" indent="0" algn="l" defTabSz="914400" rtl="0" eaLnBrk="0" fontAlgn="base" latinLnBrk="0" hangingPunct="0">
+              <a:lnSpc>
+                <a:spcPct val="100000"/>
+              </a:lnSpc>
+              <a:spcBef>
+                <a:spcPct val="0"/>
+              </a:spcBef>
+              <a:spcAft>
+                <a:spcPct val="0"/>
+              </a:spcAft>
+              <a:buClrTx/>
+              <a:buSzTx/>
+              <a:buFontTx/>
+              <a:buAutoNum type="arabicPeriod" startAt="2"/>
+              <a:tabLst/>
+            </a:pPr>
+            <a:r>
+              <a:rPr kumimoji="0" lang="es-ES" b="1" i="0" u="none" strike="noStrike" cap="none" normalizeH="0" baseline="0" dirty="0" smtClean="0">
+                <a:ln>
+                  <a:noFill/>
+                </a:ln>
+                <a:solidFill>
+                  <a:schemeClr val="tx1"/>
+                </a:solidFill>
+                <a:effectLst/>
+              </a:rPr>
+              <a:t>Data </a:t>
+            </a:r>
+            <a:r>
+              <a:rPr kumimoji="0" lang="es-ES" b="1" i="0" u="none" strike="noStrike" cap="none" normalizeH="0" baseline="0" dirty="0" err="1" smtClean="0">
+                <a:ln>
+                  <a:noFill/>
+                </a:ln>
+                <a:solidFill>
+                  <a:schemeClr val="tx1"/>
+                </a:solidFill>
+                <a:effectLst/>
+              </a:rPr>
+              <a:t>Types</a:t>
+            </a:r>
+            <a:r>
+              <a:rPr kumimoji="0" lang="es-ES" b="1" i="0" u="none" strike="noStrike" cap="none" normalizeH="0" baseline="0" dirty="0" smtClean="0">
+                <a:ln>
+                  <a:noFill/>
+                </a:ln>
+                <a:solidFill>
+                  <a:schemeClr val="tx1"/>
+                </a:solidFill>
+                <a:effectLst/>
+              </a:rPr>
+              <a:t>:</a:t>
+            </a:r>
+            <a:endParaRPr kumimoji="0" lang="es-ES" b="0" i="0" u="none" strike="noStrike" cap="none" normalizeH="0" baseline="0" dirty="0" smtClean="0">
+              <a:ln>
+                <a:noFill/>
+              </a:ln>
+              <a:solidFill>
+                <a:schemeClr val="tx1"/>
+              </a:solidFill>
+              <a:effectLst/>
+            </a:endParaRPr>
+          </a:p>
+          <a:p>
+            <a:pPr marL="457200" marR="0" lvl="1" indent="0" algn="l" defTabSz="914400" rtl="0" eaLnBrk="0" fontAlgn="base" latinLnBrk="0" hangingPunct="0">
+              <a:lnSpc>
+                <a:spcPct val="100000"/>
+              </a:lnSpc>
+              <a:spcBef>
+                <a:spcPct val="0"/>
+              </a:spcBef>
+              <a:spcAft>
+                <a:spcPct val="0"/>
+              </a:spcAft>
+              <a:buClrTx/>
+              <a:buSzTx/>
+              <a:buFontTx/>
+              <a:buChar char="•"/>
+              <a:tabLst/>
+            </a:pPr>
+            <a:r>
+              <a:rPr lang="es-ES" sz="2400" dirty="0" err="1" smtClean="0"/>
+              <a:t>Numbers</a:t>
+            </a:r>
+            <a:r>
+              <a:rPr lang="es-ES" sz="2400" dirty="0" smtClean="0"/>
+              <a:t>: </a:t>
+            </a:r>
+            <a:r>
+              <a:rPr kumimoji="0" lang="es-ES" sz="2400" b="1" i="0" u="none" strike="noStrike" cap="none" normalizeH="0" baseline="0" dirty="0" err="1" smtClean="0">
+                <a:ln>
+                  <a:noFill/>
+                </a:ln>
+                <a:solidFill>
+                  <a:schemeClr val="tx1"/>
+                </a:solidFill>
+                <a:effectLst/>
+              </a:rPr>
+              <a:t>int</a:t>
+            </a:r>
+            <a:r>
+              <a:rPr kumimoji="0" lang="es-ES" sz="2400" b="1" i="0" u="none" strike="noStrike" cap="none" normalizeH="0" baseline="0" dirty="0" smtClean="0">
+                <a:ln>
+                  <a:noFill/>
+                </a:ln>
+                <a:solidFill>
+                  <a:schemeClr val="tx1"/>
+                </a:solidFill>
+                <a:effectLst/>
+              </a:rPr>
+              <a:t>,</a:t>
+            </a:r>
+            <a:r>
+              <a:rPr kumimoji="0" lang="es-ES" sz="2400" b="0" i="0" u="none" strike="noStrike" cap="none" normalizeH="0" baseline="0" dirty="0" smtClean="0">
+                <a:ln>
+                  <a:noFill/>
+                </a:ln>
+                <a:solidFill>
+                  <a:schemeClr val="tx1"/>
+                </a:solidFill>
+                <a:effectLst/>
+              </a:rPr>
+              <a:t> </a:t>
+            </a:r>
+            <a:r>
+              <a:rPr kumimoji="0" lang="es-ES" sz="2400" b="1" i="0" u="none" strike="noStrike" cap="none" normalizeH="0" baseline="0" dirty="0" err="1" smtClean="0">
+                <a:ln>
+                  <a:noFill/>
+                </a:ln>
+                <a:solidFill>
+                  <a:schemeClr val="tx1"/>
+                </a:solidFill>
+                <a:effectLst/>
+              </a:rPr>
+              <a:t>float</a:t>
+            </a:r>
+            <a:r>
+              <a:rPr lang="es-ES" sz="2400" dirty="0"/>
+              <a:t> </a:t>
+            </a:r>
+            <a:r>
+              <a:rPr lang="es-ES" sz="2400" dirty="0" smtClean="0"/>
+              <a:t>and</a:t>
+            </a:r>
+            <a:r>
+              <a:rPr kumimoji="0" lang="es-ES" sz="2400" b="0" i="0" u="none" strike="noStrike" cap="none" normalizeH="0" baseline="0" dirty="0" smtClean="0">
+                <a:ln>
+                  <a:noFill/>
+                </a:ln>
+                <a:solidFill>
+                  <a:schemeClr val="tx1"/>
+                </a:solidFill>
+                <a:effectLst/>
+              </a:rPr>
+              <a:t> </a:t>
+            </a:r>
+            <a:r>
+              <a:rPr kumimoji="0" lang="es-ES" sz="2400" b="1" i="0" u="none" strike="noStrike" cap="none" normalizeH="0" baseline="0" dirty="0" err="1" smtClean="0">
+                <a:ln>
+                  <a:noFill/>
+                </a:ln>
+                <a:solidFill>
+                  <a:schemeClr val="tx1"/>
+                </a:solidFill>
+                <a:effectLst/>
+              </a:rPr>
+              <a:t>double</a:t>
+            </a:r>
+            <a:endParaRPr kumimoji="0" lang="es-ES" sz="2400" b="0" i="0" u="none" strike="noStrike" cap="none" normalizeH="0" baseline="0" dirty="0" smtClean="0">
+              <a:ln>
+                <a:noFill/>
+              </a:ln>
+              <a:solidFill>
+                <a:schemeClr val="tx1"/>
+              </a:solidFill>
+              <a:effectLst/>
+            </a:endParaRPr>
+          </a:p>
+          <a:p>
+            <a:pPr marL="457200" marR="0" lvl="1" indent="0" algn="l" defTabSz="914400" rtl="0" eaLnBrk="0" fontAlgn="base" latinLnBrk="0" hangingPunct="0">
+              <a:lnSpc>
+                <a:spcPct val="100000"/>
+              </a:lnSpc>
+              <a:spcBef>
+                <a:spcPct val="0"/>
+              </a:spcBef>
+              <a:spcAft>
+                <a:spcPct val="0"/>
+              </a:spcAft>
+              <a:buClrTx/>
+              <a:buSzTx/>
+              <a:buFontTx/>
+              <a:buChar char="•"/>
+              <a:tabLst/>
+            </a:pPr>
+            <a:r>
+              <a:rPr kumimoji="0" lang="es-ES" sz="2400" b="0" i="0" u="none" strike="noStrike" cap="none" normalizeH="0" baseline="0" dirty="0" err="1" smtClean="0">
+                <a:ln>
+                  <a:noFill/>
+                </a:ln>
+                <a:solidFill>
+                  <a:schemeClr val="tx1"/>
+                </a:solidFill>
+                <a:effectLst/>
+              </a:rPr>
+              <a:t>Boolean</a:t>
+            </a:r>
+            <a:r>
+              <a:rPr kumimoji="0" lang="es-ES" sz="2400" b="0" i="0" u="none" strike="noStrike" cap="none" normalizeH="0" baseline="0" dirty="0" smtClean="0">
+                <a:ln>
+                  <a:noFill/>
+                </a:ln>
+                <a:solidFill>
+                  <a:schemeClr val="tx1"/>
+                </a:solidFill>
+                <a:effectLst/>
+              </a:rPr>
+              <a:t>: </a:t>
+            </a:r>
+            <a:r>
+              <a:rPr kumimoji="0" lang="es-ES" sz="2400" b="1" i="0" u="none" strike="noStrike" cap="none" normalizeH="0" baseline="0" dirty="0" err="1" smtClean="0">
+                <a:ln>
+                  <a:noFill/>
+                </a:ln>
+                <a:solidFill>
+                  <a:schemeClr val="tx1"/>
+                </a:solidFill>
+                <a:effectLst/>
+              </a:rPr>
+              <a:t>boolean</a:t>
+            </a:r>
+            <a:endParaRPr kumimoji="0" lang="es-ES" sz="2400" b="0" i="0" u="none" strike="noStrike" cap="none" normalizeH="0" baseline="0" dirty="0" smtClean="0">
+              <a:ln>
+                <a:noFill/>
+              </a:ln>
+              <a:solidFill>
+                <a:schemeClr val="tx1"/>
+              </a:solidFill>
+              <a:effectLst/>
+            </a:endParaRPr>
+          </a:p>
+          <a:p>
+            <a:pPr marL="457200" marR="0" lvl="1" indent="0" algn="l" defTabSz="914400" rtl="0" eaLnBrk="0" fontAlgn="base" latinLnBrk="0" hangingPunct="0">
+              <a:lnSpc>
+                <a:spcPct val="100000"/>
+              </a:lnSpc>
+              <a:spcBef>
+                <a:spcPct val="0"/>
+              </a:spcBef>
+              <a:spcAft>
+                <a:spcPct val="0"/>
+              </a:spcAft>
+              <a:buClrTx/>
+              <a:buSzTx/>
+              <a:buFontTx/>
+              <a:buChar char="•"/>
+              <a:tabLst/>
+            </a:pPr>
+            <a:r>
+              <a:rPr kumimoji="0" lang="es-ES" sz="2400" b="0" i="0" u="none" strike="noStrike" cap="none" normalizeH="0" baseline="0" dirty="0" err="1" smtClean="0">
+                <a:ln>
+                  <a:noFill/>
+                </a:ln>
+                <a:solidFill>
+                  <a:schemeClr val="tx1"/>
+                </a:solidFill>
+                <a:effectLst/>
+              </a:rPr>
+              <a:t>Character</a:t>
+            </a:r>
+            <a:r>
+              <a:rPr kumimoji="0" lang="es-ES" sz="2400" b="0" i="0" u="none" strike="noStrike" cap="none" normalizeH="0" baseline="0" dirty="0" smtClean="0">
+                <a:ln>
+                  <a:noFill/>
+                </a:ln>
+                <a:solidFill>
+                  <a:schemeClr val="tx1"/>
+                </a:solidFill>
+                <a:effectLst/>
+              </a:rPr>
+              <a:t>: </a:t>
+            </a:r>
+            <a:r>
+              <a:rPr kumimoji="0" lang="es-ES" sz="2400" b="1" i="0" u="none" strike="noStrike" cap="none" normalizeH="0" baseline="0" dirty="0" err="1" smtClean="0">
+                <a:ln>
+                  <a:noFill/>
+                </a:ln>
+                <a:solidFill>
+                  <a:schemeClr val="tx1"/>
+                </a:solidFill>
+                <a:effectLst/>
+              </a:rPr>
+              <a:t>char</a:t>
+            </a:r>
+            <a:endParaRPr kumimoji="0" lang="es-ES" sz="2400" b="0" i="0" u="none" strike="noStrike" cap="none" normalizeH="0" baseline="0" dirty="0" smtClean="0">
+              <a:ln>
+                <a:noFill/>
+              </a:ln>
+              <a:solidFill>
+                <a:schemeClr val="tx1"/>
+              </a:solidFill>
+              <a:effectLst/>
+            </a:endParaRPr>
+          </a:p>
+          <a:p>
+            <a:pPr marL="457200" marR="0" lvl="1" indent="0" algn="l" defTabSz="914400" rtl="0" eaLnBrk="0" fontAlgn="base" latinLnBrk="0" hangingPunct="0">
+              <a:lnSpc>
+                <a:spcPct val="100000"/>
+              </a:lnSpc>
+              <a:spcBef>
+                <a:spcPct val="0"/>
+              </a:spcBef>
+              <a:spcAft>
+                <a:spcPct val="0"/>
+              </a:spcAft>
+              <a:buClrTx/>
+              <a:buSzTx/>
+              <a:buFontTx/>
+              <a:buChar char="•"/>
+              <a:tabLst/>
+            </a:pPr>
+            <a:r>
+              <a:rPr kumimoji="0" lang="es-ES" sz="2400" b="0" i="0" u="none" strike="noStrike" cap="none" normalizeH="0" baseline="0" dirty="0" err="1" smtClean="0">
+                <a:ln>
+                  <a:noFill/>
+                </a:ln>
+                <a:solidFill>
+                  <a:schemeClr val="tx1"/>
+                </a:solidFill>
+                <a:effectLst/>
+              </a:rPr>
+              <a:t>String</a:t>
+            </a:r>
+            <a:r>
+              <a:rPr kumimoji="0" lang="es-ES" sz="2400" b="0" i="0" u="none" strike="noStrike" cap="none" normalizeH="0" baseline="0" dirty="0" smtClean="0">
+                <a:ln>
+                  <a:noFill/>
+                </a:ln>
+                <a:solidFill>
+                  <a:schemeClr val="tx1"/>
+                </a:solidFill>
+                <a:effectLst/>
+              </a:rPr>
+              <a:t>: </a:t>
+            </a:r>
+            <a:r>
+              <a:rPr kumimoji="0" lang="es-ES" sz="2400" b="1" i="0" u="none" strike="noStrike" cap="none" normalizeH="0" baseline="0" dirty="0" err="1" smtClean="0">
+                <a:ln>
+                  <a:noFill/>
+                </a:ln>
+                <a:solidFill>
+                  <a:schemeClr val="tx1"/>
+                </a:solidFill>
+                <a:effectLst/>
+              </a:rPr>
+              <a:t>String</a:t>
+            </a:r>
+            <a:endParaRPr kumimoji="0" lang="es-ES" sz="2400" b="0" i="0" u="none" strike="noStrike" cap="none" normalizeH="0" baseline="0" dirty="0" smtClean="0">
+              <a:ln>
+                <a:noFill/>
+              </a:ln>
+              <a:solidFill>
+                <a:schemeClr val="tx1"/>
+              </a:solidFill>
+              <a:effectLst/>
+            </a:endParaRPr>
+          </a:p>
+          <a:p>
+            <a:pPr marL="0" marR="0" lvl="0" indent="0" algn="l" defTabSz="914400" rtl="0" eaLnBrk="0" fontAlgn="base" latinLnBrk="0" hangingPunct="0">
+              <a:lnSpc>
+                <a:spcPct val="100000"/>
+              </a:lnSpc>
+              <a:spcBef>
+                <a:spcPct val="0"/>
+              </a:spcBef>
+              <a:spcAft>
+                <a:spcPct val="0"/>
+              </a:spcAft>
+              <a:buClrTx/>
+              <a:buSzTx/>
+              <a:buFontTx/>
+              <a:buAutoNum type="arabicPeriod" startAt="3"/>
+              <a:tabLst/>
+            </a:pPr>
+            <a:r>
+              <a:rPr kumimoji="0" lang="es-ES" b="1" i="0" u="none" strike="noStrike" cap="none" normalizeH="0" baseline="0" dirty="0" smtClean="0">
+                <a:ln>
+                  <a:noFill/>
+                </a:ln>
+                <a:solidFill>
+                  <a:schemeClr val="tx1"/>
+                </a:solidFill>
+                <a:effectLst/>
+              </a:rPr>
+              <a:t>Control </a:t>
+            </a:r>
+            <a:r>
+              <a:rPr kumimoji="0" lang="es-ES" b="1" i="0" u="none" strike="noStrike" cap="none" normalizeH="0" baseline="0" dirty="0" err="1" smtClean="0">
+                <a:ln>
+                  <a:noFill/>
+                </a:ln>
+                <a:solidFill>
+                  <a:schemeClr val="tx1"/>
+                </a:solidFill>
+                <a:effectLst/>
+              </a:rPr>
+              <a:t>Flow</a:t>
+            </a:r>
+            <a:r>
+              <a:rPr kumimoji="0" lang="es-ES" b="1" i="0" u="none" strike="noStrike" cap="none" normalizeH="0" baseline="0" dirty="0" smtClean="0">
+                <a:ln>
+                  <a:noFill/>
+                </a:ln>
+                <a:solidFill>
+                  <a:schemeClr val="tx1"/>
+                </a:solidFill>
+                <a:effectLst/>
+              </a:rPr>
+              <a:t> </a:t>
+            </a:r>
+            <a:r>
+              <a:rPr kumimoji="0" lang="es-ES" b="1" i="0" u="none" strike="noStrike" cap="none" normalizeH="0" baseline="0" dirty="0" err="1" smtClean="0">
+                <a:ln>
+                  <a:noFill/>
+                </a:ln>
+                <a:solidFill>
+                  <a:schemeClr val="tx1"/>
+                </a:solidFill>
+                <a:effectLst/>
+              </a:rPr>
+              <a:t>structures</a:t>
+            </a:r>
+            <a:r>
+              <a:rPr kumimoji="0" lang="es-ES" b="1" i="0" u="none" strike="noStrike" cap="none" normalizeH="0" baseline="0" dirty="0" smtClean="0">
+                <a:ln>
+                  <a:noFill/>
+                </a:ln>
+                <a:solidFill>
+                  <a:schemeClr val="tx1"/>
+                </a:solidFill>
+                <a:effectLst/>
+              </a:rPr>
+              <a:t>:</a:t>
+            </a:r>
+            <a:endParaRPr kumimoji="0" lang="es-ES" b="0" i="0" u="none" strike="noStrike" cap="none" normalizeH="0" baseline="0" dirty="0" smtClean="0">
+              <a:ln>
+                <a:noFill/>
+              </a:ln>
+              <a:solidFill>
+                <a:schemeClr val="tx1"/>
+              </a:solidFill>
+              <a:effectLst/>
+            </a:endParaRPr>
+          </a:p>
+          <a:p>
+            <a:pPr marL="457200" marR="0" lvl="1" indent="0" algn="l" defTabSz="914400" rtl="0" eaLnBrk="0" fontAlgn="base" latinLnBrk="0" hangingPunct="0">
+              <a:lnSpc>
+                <a:spcPct val="100000"/>
+              </a:lnSpc>
+              <a:spcBef>
+                <a:spcPct val="0"/>
+              </a:spcBef>
+              <a:spcAft>
+                <a:spcPct val="0"/>
+              </a:spcAft>
+              <a:buClrTx/>
+              <a:buSzTx/>
+              <a:buFontTx/>
+              <a:buChar char="•"/>
+              <a:tabLst/>
+            </a:pPr>
+            <a:r>
+              <a:rPr kumimoji="0" lang="es-ES" sz="2400" b="1" i="0" u="none" strike="noStrike" cap="none" normalizeH="0" baseline="0" dirty="0" err="1" smtClean="0">
+                <a:ln>
+                  <a:noFill/>
+                </a:ln>
+                <a:solidFill>
+                  <a:schemeClr val="tx1"/>
+                </a:solidFill>
+                <a:effectLst/>
+              </a:rPr>
+              <a:t>Conditional</a:t>
+            </a:r>
+            <a:r>
+              <a:rPr kumimoji="0" lang="es-ES" sz="2400" b="1" i="0" u="none" strike="noStrike" cap="none" normalizeH="0" baseline="0" dirty="0" smtClean="0">
+                <a:ln>
+                  <a:noFill/>
+                </a:ln>
+                <a:solidFill>
+                  <a:schemeClr val="tx1"/>
+                </a:solidFill>
+                <a:effectLst/>
+              </a:rPr>
+              <a:t> </a:t>
+            </a:r>
+            <a:r>
+              <a:rPr kumimoji="0" lang="es-ES" sz="2400" b="1" i="0" u="none" strike="noStrike" cap="none" normalizeH="0" baseline="0" dirty="0" err="1" smtClean="0">
+                <a:ln>
+                  <a:noFill/>
+                </a:ln>
+                <a:solidFill>
+                  <a:schemeClr val="tx1"/>
+                </a:solidFill>
+                <a:effectLst/>
+              </a:rPr>
+              <a:t>Statements</a:t>
+            </a:r>
+            <a:r>
+              <a:rPr kumimoji="0" lang="es-ES" sz="2400" b="1" i="0" u="none" strike="noStrike" cap="none" normalizeH="0" baseline="0" dirty="0" smtClean="0">
+                <a:ln>
+                  <a:noFill/>
+                </a:ln>
+                <a:solidFill>
+                  <a:schemeClr val="tx1"/>
+                </a:solidFill>
+                <a:effectLst/>
+              </a:rPr>
+              <a:t>: </a:t>
+            </a:r>
+            <a:r>
+              <a:rPr kumimoji="0" lang="es-ES" sz="2400" b="1" i="0" u="none" strike="noStrike" cap="none" normalizeH="0" baseline="0" dirty="0" err="1" smtClean="0">
+                <a:ln>
+                  <a:noFill/>
+                </a:ln>
+                <a:solidFill>
+                  <a:schemeClr val="tx1"/>
+                </a:solidFill>
+                <a:effectLst/>
+              </a:rPr>
+              <a:t>if</a:t>
+            </a:r>
+            <a:r>
+              <a:rPr kumimoji="0" lang="es-ES" sz="2400" b="1" i="0" u="none" strike="noStrike" cap="none" normalizeH="0" baseline="0" dirty="0" smtClean="0">
+                <a:ln>
+                  <a:noFill/>
+                </a:ln>
+                <a:solidFill>
+                  <a:schemeClr val="tx1"/>
+                </a:solidFill>
+                <a:effectLst/>
+              </a:rPr>
+              <a:t> / </a:t>
+            </a:r>
+            <a:r>
+              <a:rPr kumimoji="0" lang="es-ES" sz="2400" b="1" i="0" u="none" strike="noStrike" cap="none" normalizeH="0" baseline="0" dirty="0" err="1" smtClean="0">
+                <a:ln>
+                  <a:noFill/>
+                </a:ln>
+                <a:solidFill>
+                  <a:schemeClr val="tx1"/>
+                </a:solidFill>
+                <a:effectLst/>
+              </a:rPr>
+              <a:t>else</a:t>
+            </a:r>
+            <a:endParaRPr kumimoji="0" lang="es-ES" sz="2400" b="0" i="0" u="none" strike="noStrike" cap="none" normalizeH="0" baseline="0" dirty="0" smtClean="0">
+              <a:ln>
+                <a:noFill/>
+              </a:ln>
+              <a:solidFill>
+                <a:schemeClr val="tx1"/>
+              </a:solidFill>
+              <a:effectLst/>
+            </a:endParaRPr>
+          </a:p>
+          <a:p>
+            <a:pPr marL="457200" marR="0" lvl="1" indent="0" algn="l" defTabSz="914400" rtl="0" eaLnBrk="0" fontAlgn="base" latinLnBrk="0" hangingPunct="0">
+              <a:lnSpc>
+                <a:spcPct val="100000"/>
+              </a:lnSpc>
+              <a:spcBef>
+                <a:spcPct val="0"/>
+              </a:spcBef>
+              <a:spcAft>
+                <a:spcPct val="0"/>
+              </a:spcAft>
+              <a:buClrTx/>
+              <a:buSzTx/>
+              <a:buFontTx/>
+              <a:buChar char="•"/>
+              <a:tabLst/>
+            </a:pPr>
+            <a:r>
+              <a:rPr kumimoji="0" lang="es-ES" sz="2400" b="1" i="0" u="none" strike="noStrike" cap="none" normalizeH="0" baseline="0" dirty="0" err="1" smtClean="0">
+                <a:ln>
+                  <a:noFill/>
+                </a:ln>
+                <a:solidFill>
+                  <a:schemeClr val="tx1"/>
+                </a:solidFill>
+                <a:effectLst/>
+              </a:rPr>
+              <a:t>Switch</a:t>
+            </a:r>
+            <a:r>
+              <a:rPr kumimoji="0" lang="es-ES" sz="2400" b="1" i="0" u="none" strike="noStrike" cap="none" normalizeH="0" baseline="0" dirty="0" smtClean="0">
+                <a:ln>
+                  <a:noFill/>
+                </a:ln>
+                <a:solidFill>
+                  <a:schemeClr val="tx1"/>
+                </a:solidFill>
+                <a:effectLst/>
+              </a:rPr>
+              <a:t> </a:t>
+            </a:r>
+            <a:r>
+              <a:rPr kumimoji="0" lang="es-ES" sz="2400" b="1" i="0" u="none" strike="noStrike" cap="none" normalizeH="0" baseline="0" dirty="0" err="1" smtClean="0">
+                <a:ln>
+                  <a:noFill/>
+                </a:ln>
+                <a:solidFill>
+                  <a:schemeClr val="tx1"/>
+                </a:solidFill>
+                <a:effectLst/>
+              </a:rPr>
+              <a:t>Statement</a:t>
+            </a:r>
+            <a:endParaRPr kumimoji="0" lang="es-ES" sz="2400" b="1" i="0" u="none" strike="noStrike" cap="none" normalizeH="0" baseline="0" dirty="0" smtClean="0">
+              <a:ln>
+                <a:noFill/>
+              </a:ln>
+              <a:solidFill>
+                <a:schemeClr val="tx1"/>
+              </a:solidFill>
+              <a:effectLst/>
+            </a:endParaRPr>
+          </a:p>
+          <a:p>
+            <a:pPr marL="0" indent="0">
+              <a:buNone/>
+            </a:pPr>
+            <a:r>
+              <a:rPr lang="es-ES" b="1" dirty="0" smtClean="0"/>
+              <a:t>4.Loops: </a:t>
+            </a:r>
+            <a:r>
+              <a:rPr lang="es-ES" b="1" dirty="0" err="1" smtClean="0"/>
+              <a:t>For</a:t>
+            </a:r>
+            <a:r>
+              <a:rPr lang="es-ES" b="1" dirty="0" smtClean="0"/>
+              <a:t>, </a:t>
+            </a:r>
+            <a:r>
+              <a:rPr lang="es-ES" b="1" dirty="0" err="1" smtClean="0"/>
+              <a:t>While</a:t>
+            </a:r>
+            <a:r>
+              <a:rPr lang="es-ES" b="1" dirty="0" smtClean="0"/>
+              <a:t> and Do </a:t>
+            </a:r>
+            <a:r>
+              <a:rPr lang="es-ES" b="1" dirty="0" err="1" smtClean="0"/>
+              <a:t>While</a:t>
+            </a:r>
+            <a:endParaRPr lang="es-ES" b="1" dirty="0"/>
+          </a:p>
+          <a:p>
+            <a:pPr marL="457200" marR="0" lvl="1" indent="0" algn="l" defTabSz="914400" rtl="0" eaLnBrk="0" fontAlgn="base" latinLnBrk="0" hangingPunct="0">
+              <a:lnSpc>
+                <a:spcPct val="100000"/>
+              </a:lnSpc>
+              <a:spcBef>
+                <a:spcPct val="0"/>
+              </a:spcBef>
+              <a:spcAft>
+                <a:spcPct val="0"/>
+              </a:spcAft>
+              <a:buClrTx/>
+              <a:buSzTx/>
+              <a:buFontTx/>
+              <a:buChar char="•"/>
+              <a:tabLst/>
+            </a:pPr>
+            <a:endParaRPr kumimoji="0" lang="es-ES" b="0" i="0" u="none" strike="noStrike" cap="none" normalizeH="0" baseline="0" dirty="0" smtClean="0">
+              <a:ln>
+                <a:noFill/>
+              </a:ln>
+              <a:solidFill>
+                <a:schemeClr val="tx1"/>
+              </a:solidFill>
+              <a:effectLst/>
+            </a:endParaRPr>
+          </a:p>
+        </p:txBody>
+      </p:sp>
+      <p:pic>
+        <p:nvPicPr>
+          <p:cNvPr id="5" name="Imagen 4"/>
+          <p:cNvPicPr>
+            <a:picLocks noChangeAspect="1"/>
+          </p:cNvPicPr>
+          <p:nvPr/>
+        </p:nvPicPr>
+        <p:blipFill>
+          <a:blip r:embed="rId2"/>
+          <a:stretch>
+            <a:fillRect/>
+          </a:stretch>
+        </p:blipFill>
+        <p:spPr>
+          <a:xfrm>
+            <a:off x="5916020" y="1867392"/>
+            <a:ext cx="6178868" cy="3289469"/>
+          </a:xfrm>
+          <a:prstGeom prst="rect">
+            <a:avLst/>
+          </a:prstGeom>
+        </p:spPr>
+      </p:pic>
+    </p:spTree>
+    <p:extLst>
+      <p:ext uri="{BB962C8B-B14F-4D97-AF65-F5344CB8AC3E}">
+        <p14:creationId xmlns:p14="http://schemas.microsoft.com/office/powerpoint/2010/main" val="3248925767"/>
+      </p:ext>
+    </p:extLst>
+  </p:cSld>
+  <p:clrMapOvr>
+    <a:masterClrMapping/>
+  </p:clrMapOvr>
+</p:sld>
+</file>
+
+<file path=ppt/slides/slide5.xml><?xml version="1.0" encoding="utf-8"?>
+<p:sld xmlns:a="http://schemas.openxmlformats.org/drawingml/2006/main" xmlns:r="http://schemas.openxmlformats.org/officeDocument/2006/relationships" xmlns:p="http://schemas.openxmlformats.org/presentationml/2006/main">
+  <p:cSld>
+    <p:spTree>
+      <p:nvGrpSpPr>
+        <p:cNvPr id="1" name=""/>
+        <p:cNvGrpSpPr/>
+        <p:nvPr/>
+      </p:nvGrpSpPr>
+      <p:grpSpPr>
+        <a:xfrm>
+          <a:off x="0" y="0"/>
+          <a:ext cx="0" cy="0"/>
+          <a:chOff x="0" y="0"/>
+          <a:chExt cx="0" cy="0"/>
+        </a:xfrm>
+      </p:grpSpPr>
+      <p:sp>
+        <p:nvSpPr>
+          <p:cNvPr id="2" name="Título 1"/>
+          <p:cNvSpPr>
+            <a:spLocks noGrp="1"/>
+          </p:cNvSpPr>
+          <p:nvPr>
+            <p:ph type="title"/>
+          </p:nvPr>
+        </p:nvSpPr>
+        <p:spPr>
+          <a:xfrm>
+            <a:off x="1053490" y="451464"/>
+            <a:ext cx="9905998" cy="999267"/>
+          </a:xfrm>
+        </p:spPr>
+        <p:txBody>
+          <a:bodyPr/>
+          <a:lstStyle/>
+          <a:p>
+            <a:r>
+              <a:rPr lang="es-ES" b="1" dirty="0"/>
+              <a:t>OJBECT ORIENTATION IN JAVA</a:t>
+            </a:r>
+          </a:p>
+        </p:txBody>
+      </p:sp>
+      <p:sp>
+        <p:nvSpPr>
+          <p:cNvPr id="3" name="Marcador de contenido 2"/>
+          <p:cNvSpPr>
+            <a:spLocks noGrp="1"/>
+          </p:cNvSpPr>
+          <p:nvPr>
+            <p:ph idx="1"/>
+          </p:nvPr>
+        </p:nvSpPr>
+        <p:spPr>
+          <a:xfrm>
+            <a:off x="861645" y="1688122"/>
+            <a:ext cx="8827300" cy="4457701"/>
+          </a:xfrm>
+        </p:spPr>
+        <p:txBody>
+          <a:bodyPr>
+            <a:noAutofit/>
+          </a:bodyPr>
+          <a:lstStyle/>
+          <a:p>
+            <a:r>
+              <a:rPr lang="en-US" dirty="0"/>
+              <a:t>Java is an </a:t>
+            </a:r>
+            <a:r>
+              <a:rPr lang="en-US" b="1" dirty="0"/>
+              <a:t>object-oriented programming language</a:t>
+            </a:r>
+            <a:r>
+              <a:rPr lang="en-US" dirty="0"/>
+              <a:t>.</a:t>
+            </a:r>
+          </a:p>
+          <a:p>
+            <a:pPr algn="l">
+              <a:buFont typeface="Arial" panose="020B0604020202020204" pitchFamily="34" charset="0"/>
+              <a:buChar char="•"/>
+            </a:pPr>
+            <a:r>
+              <a:rPr lang="en-US" dirty="0"/>
+              <a:t>Based on the concept of "objects" encapsulating data and behavior</a:t>
+            </a:r>
+          </a:p>
+          <a:p>
+            <a:pPr algn="l">
+              <a:buFont typeface="Arial" panose="020B0604020202020204" pitchFamily="34" charset="0"/>
+              <a:buChar char="•"/>
+            </a:pPr>
+            <a:r>
+              <a:rPr lang="en-US" dirty="0"/>
+              <a:t>Java is a widely used, object-oriented programming language</a:t>
+            </a:r>
+          </a:p>
+          <a:p>
+            <a:pPr algn="l">
+              <a:buFont typeface="Arial" panose="020B0604020202020204" pitchFamily="34" charset="0"/>
+              <a:buChar char="•"/>
+            </a:pPr>
+            <a:r>
+              <a:rPr lang="en-US" dirty="0"/>
+              <a:t>Key Aspects:</a:t>
+            </a:r>
+          </a:p>
+          <a:p>
+            <a:pPr lvl="1" algn="l">
+              <a:buFont typeface="Courier New" panose="02070309020205020404" pitchFamily="49" charset="0"/>
+              <a:buChar char="o"/>
+            </a:pPr>
+            <a:r>
+              <a:rPr lang="en-US" sz="2400" dirty="0"/>
+              <a:t>Everything in Java is considered an object</a:t>
+            </a:r>
+          </a:p>
+          <a:p>
+            <a:pPr lvl="1" algn="l">
+              <a:buFont typeface="Courier New" panose="02070309020205020404" pitchFamily="49" charset="0"/>
+              <a:buChar char="o"/>
+            </a:pPr>
+            <a:r>
+              <a:rPr lang="en-US" sz="2400" dirty="0"/>
+              <a:t>Objects are instances of classes, serving as blueprints</a:t>
+            </a:r>
+          </a:p>
+          <a:p>
+            <a:pPr lvl="1" algn="l">
+              <a:buFont typeface="Courier New" panose="02070309020205020404" pitchFamily="49" charset="0"/>
+              <a:buChar char="o"/>
+            </a:pPr>
+            <a:r>
+              <a:rPr lang="en-US" sz="2400" dirty="0"/>
+              <a:t>Classes define properties (attributes) and behaviors (methods)</a:t>
+            </a:r>
+          </a:p>
+          <a:p>
+            <a:endParaRPr lang="en-US" dirty="0"/>
+          </a:p>
+          <a:p>
+            <a:endParaRPr lang="es-ES" dirty="0"/>
+          </a:p>
+        </p:txBody>
+      </p:sp>
+    </p:spTree>
+    <p:extLst>
+      <p:ext uri="{BB962C8B-B14F-4D97-AF65-F5344CB8AC3E}">
+        <p14:creationId xmlns:p14="http://schemas.microsoft.com/office/powerpoint/2010/main" val="3037264697"/>
+      </p:ext>
+    </p:extLst>
+  </p:cSld>
+  <p:clrMapOvr>
+    <a:masterClrMapping/>
+  </p:clrMapOvr>
+</p:sld>
+</file>
+
+<file path=ppt/slides/slide6.xml><?xml version="1.0" encoding="utf-8"?>
+<p:sld xmlns:a="http://schemas.openxmlformats.org/drawingml/2006/main" xmlns:r="http://schemas.openxmlformats.org/officeDocument/2006/relationships" xmlns:p="http://schemas.openxmlformats.org/presentationml/2006/main">
+  <p:cSld>
+    <p:spTree>
+      <p:nvGrpSpPr>
+        <p:cNvPr id="1" name=""/>
+        <p:cNvGrpSpPr/>
+        <p:nvPr/>
+      </p:nvGrpSpPr>
+      <p:grpSpPr>
+        <a:xfrm>
+          <a:off x="0" y="0"/>
+          <a:ext cx="0" cy="0"/>
+          <a:chOff x="0" y="0"/>
+          <a:chExt cx="0" cy="0"/>
+        </a:xfrm>
+      </p:grpSpPr>
+      <p:sp>
+        <p:nvSpPr>
           <p:cNvPr id="2" name="Título 1">
             <a:extLst>
               <a:ext uri="{FF2B5EF4-FFF2-40B4-BE49-F238E27FC236}">
-                <a16:creationId xmlns:a16="http://schemas.microsoft.com/office/drawing/2014/main" id="{74BEBA16-9604-EB9B-5CC3-DED19C6FCB0E}"/>
+                <a16:creationId xmlns:a16="http://schemas.microsoft.com/office/drawing/2014/main" xmlns="" id="{74BEBA16-9604-EB9B-5CC3-DED19C6FCB0E}"/>
               </a:ext>
             </a:extLst>
           </p:cNvPr>
@@ -17711,7 +18459,9 @@
           </a:xfrm>
         </p:spPr>
         <p:txBody>
-          <a:bodyPr/>
+          <a:bodyPr>
+            <a:normAutofit fontScale="90000"/>
+          </a:bodyPr>
           <a:lstStyle/>
           <a:p>
             <a:r>
@@ -17733,7 +18483,7 @@
           <p:cNvPr id="3" name="Marcador de contenido 2">
             <a:extLst>
               <a:ext uri="{FF2B5EF4-FFF2-40B4-BE49-F238E27FC236}">
-                <a16:creationId xmlns:a16="http://schemas.microsoft.com/office/drawing/2014/main" id="{849F777A-0F6D-1885-69C4-928F5AFA1CA5}"/>
+                <a16:creationId xmlns:a16="http://schemas.microsoft.com/office/drawing/2014/main" xmlns="" id="{849F777A-0F6D-1885-69C4-928F5AFA1CA5}"/>
               </a:ext>
             </a:extLst>
           </p:cNvPr>
@@ -17755,7 +18505,6 @@
                   <a:srgbClr val="ECECF1"/>
                 </a:solidFill>
                 <a:effectLst/>
-                <a:latin typeface="Söhne"/>
               </a:rPr>
               <a:t>Encapsulation</a:t>
             </a:r>
@@ -17764,7 +18513,6 @@
                 <a:solidFill>
                   <a:srgbClr val="ECECF1"/>
                 </a:solidFill>
-                <a:latin typeface="Söhne"/>
               </a:rPr>
               <a:t>.</a:t>
             </a:r>
@@ -17776,7 +18524,6 @@
                   <a:srgbClr val="ECECF1"/>
                 </a:solidFill>
                 <a:effectLst/>
-                <a:latin typeface="Söhne"/>
               </a:rPr>
               <a:t>Inheritance</a:t>
             </a:r>
@@ -17785,7 +18532,6 @@
                 <a:solidFill>
                   <a:srgbClr val="ECECF1"/>
                 </a:solidFill>
-                <a:latin typeface="Söhne"/>
               </a:rPr>
               <a:t>.</a:t>
             </a:r>
@@ -17797,7 +18543,6 @@
                   <a:srgbClr val="ECECF1"/>
                 </a:solidFill>
                 <a:effectLst/>
-                <a:latin typeface="Söhne"/>
               </a:rPr>
               <a:t>Polymorphism</a:t>
             </a:r>
@@ -17806,7 +18551,6 @@
                 <a:solidFill>
                   <a:srgbClr val="ECECF1"/>
                 </a:solidFill>
-                <a:latin typeface="Söhne"/>
               </a:rPr>
               <a:t>.</a:t>
             </a:r>
@@ -17818,7 +18562,6 @@
                   <a:srgbClr val="ECECF1"/>
                 </a:solidFill>
                 <a:effectLst/>
-                <a:latin typeface="Söhne"/>
               </a:rPr>
               <a:t>Abstraction</a:t>
             </a:r>
@@ -17828,7 +18571,6 @@
                   <a:srgbClr val="ECECF1"/>
                 </a:solidFill>
                 <a:effectLst/>
-                <a:latin typeface="Söhne"/>
               </a:rPr>
               <a:t>.</a:t>
             </a:r>
@@ -17840,7 +18582,6 @@
                   <a:srgbClr val="ECECF1"/>
                 </a:solidFill>
                 <a:effectLst/>
-                <a:latin typeface="Söhne"/>
               </a:rPr>
               <a:t>Association</a:t>
             </a:r>
@@ -17850,7 +18591,6 @@
                   <a:srgbClr val="ECECF1"/>
                 </a:solidFill>
                 <a:effectLst/>
-                <a:latin typeface="Söhne"/>
               </a:rPr>
               <a:t> and </a:t>
             </a:r>
@@ -17860,7 +18600,6 @@
                   <a:srgbClr val="ECECF1"/>
                 </a:solidFill>
                 <a:effectLst/>
-                <a:latin typeface="Söhne"/>
               </a:rPr>
               <a:t>Composition</a:t>
             </a:r>
@@ -17873,7 +18612,7 @@
           <p:cNvPr id="4" name="Imagen 3" descr="Diagrama&#10;&#10;Descripción generada automáticamente">
             <a:extLst>
               <a:ext uri="{FF2B5EF4-FFF2-40B4-BE49-F238E27FC236}">
-                <a16:creationId xmlns:a16="http://schemas.microsoft.com/office/drawing/2014/main" id="{B7D4AB8A-B916-31BA-A892-898A650E5345}"/>
+                <a16:creationId xmlns:a16="http://schemas.microsoft.com/office/drawing/2014/main" xmlns="" id="{B7D4AB8A-B916-31BA-A892-898A650E5345}"/>
               </a:ext>
             </a:extLst>
           </p:cNvPr>
@@ -17910,389 +18649,6 @@
 </p:sld>
 </file>
 
-<file path=ppt/slides/slide5.xml><?xml version="1.0" encoding="utf-8"?>
-<p:sld xmlns:a="http://schemas.openxmlformats.org/drawingml/2006/main" xmlns:r="http://schemas.openxmlformats.org/officeDocument/2006/relationships" xmlns:p="http://schemas.openxmlformats.org/presentationml/2006/main">
-  <p:cSld>
-    <p:spTree>
-      <p:nvGrpSpPr>
-        <p:cNvPr id="1" name=""/>
-        <p:cNvGrpSpPr/>
-        <p:nvPr/>
-      </p:nvGrpSpPr>
-      <p:grpSpPr>
-        <a:xfrm>
-          <a:off x="0" y="0"/>
-          <a:ext cx="0" cy="0"/>
-          <a:chOff x="0" y="0"/>
-          <a:chExt cx="0" cy="0"/>
-        </a:xfrm>
-      </p:grpSpPr>
-      <p:sp>
-        <p:nvSpPr>
-          <p:cNvPr id="2" name="Título 1"/>
-          <p:cNvSpPr>
-            <a:spLocks noGrp="1"/>
-          </p:cNvSpPr>
-          <p:nvPr>
-            <p:ph type="title"/>
-          </p:nvPr>
-        </p:nvSpPr>
-        <p:spPr/>
-        <p:txBody>
-          <a:bodyPr/>
-          <a:lstStyle/>
-          <a:p>
-            <a:r>
-              <a:rPr lang="es-ES" b="1" dirty="0" err="1"/>
-              <a:t>Memory</a:t>
-            </a:r>
-            <a:r>
-              <a:rPr lang="es-ES" b="1" dirty="0"/>
-              <a:t> </a:t>
-            </a:r>
-            <a:r>
-              <a:rPr lang="es-ES" b="1" dirty="0" err="1"/>
-              <a:t>management</a:t>
-            </a:r>
-            <a:r>
-              <a:rPr lang="es-ES" b="1" dirty="0"/>
-              <a:t> and </a:t>
-            </a:r>
-            <a:r>
-              <a:rPr lang="es-ES" b="1" dirty="0" err="1"/>
-              <a:t>garbaje</a:t>
-            </a:r>
-            <a:r>
-              <a:rPr lang="es-ES" b="1" dirty="0"/>
-              <a:t> </a:t>
-            </a:r>
-            <a:r>
-              <a:rPr lang="es-ES" b="1" dirty="0" err="1"/>
-              <a:t>collection</a:t>
-            </a:r>
-            <a:endParaRPr lang="es-ES" b="1" dirty="0"/>
-          </a:p>
-        </p:txBody>
-      </p:sp>
-      <p:sp>
-        <p:nvSpPr>
-          <p:cNvPr id="3" name="Marcador de contenido 2"/>
-          <p:cNvSpPr>
-            <a:spLocks noGrp="1"/>
-          </p:cNvSpPr>
-          <p:nvPr>
-            <p:ph idx="1"/>
-          </p:nvPr>
-        </p:nvSpPr>
-        <p:spPr/>
-        <p:txBody>
-          <a:bodyPr/>
-          <a:lstStyle/>
-          <a:p>
-            <a:r>
-              <a:rPr lang="en-US" b="1" dirty="0"/>
-              <a:t>Automatic Memory Management:</a:t>
-            </a:r>
-            <a:r>
-              <a:rPr lang="en-US" dirty="0"/>
-              <a:t> Java uses a garbage collector to automatically manage memory.</a:t>
-            </a:r>
-            <a:endParaRPr lang="es-ES" dirty="0"/>
-          </a:p>
-          <a:p>
-            <a:endParaRPr lang="es-ES" dirty="0"/>
-          </a:p>
-        </p:txBody>
-      </p:sp>
-      <p:pic>
-        <p:nvPicPr>
-          <p:cNvPr id="4" name="Imagen 3"/>
-          <p:cNvPicPr>
-            <a:picLocks noChangeAspect="1"/>
-          </p:cNvPicPr>
-          <p:nvPr/>
-        </p:nvPicPr>
-        <p:blipFill>
-          <a:blip r:embed="rId2"/>
-          <a:stretch>
-            <a:fillRect/>
-          </a:stretch>
-        </p:blipFill>
-        <p:spPr>
-          <a:xfrm>
-            <a:off x="1385454" y="2954898"/>
-            <a:ext cx="4655128" cy="4655128"/>
-          </a:xfrm>
-          <a:prstGeom prst="rect">
-            <a:avLst/>
-          </a:prstGeom>
-        </p:spPr>
-      </p:pic>
-    </p:spTree>
-    <p:extLst>
-      <p:ext uri="{BB962C8B-B14F-4D97-AF65-F5344CB8AC3E}">
-        <p14:creationId xmlns:p14="http://schemas.microsoft.com/office/powerpoint/2010/main" val="528157625"/>
-      </p:ext>
-    </p:extLst>
-  </p:cSld>
-  <p:clrMapOvr>
-    <a:masterClrMapping/>
-  </p:clrMapOvr>
-</p:sld>
-</file>
-
-<file path=ppt/slides/slide6.xml><?xml version="1.0" encoding="utf-8"?>
-<p:sld xmlns:a="http://schemas.openxmlformats.org/drawingml/2006/main" xmlns:r="http://schemas.openxmlformats.org/officeDocument/2006/relationships" xmlns:p="http://schemas.openxmlformats.org/presentationml/2006/main">
-  <p:cSld>
-    <p:spTree>
-      <p:nvGrpSpPr>
-        <p:cNvPr id="1" name=""/>
-        <p:cNvGrpSpPr/>
-        <p:nvPr/>
-      </p:nvGrpSpPr>
-      <p:grpSpPr>
-        <a:xfrm>
-          <a:off x="0" y="0"/>
-          <a:ext cx="0" cy="0"/>
-          <a:chOff x="0" y="0"/>
-          <a:chExt cx="0" cy="0"/>
-        </a:xfrm>
-      </p:grpSpPr>
-      <p:sp>
-        <p:nvSpPr>
-          <p:cNvPr id="2" name="Título 1"/>
-          <p:cNvSpPr>
-            <a:spLocks noGrp="1"/>
-          </p:cNvSpPr>
-          <p:nvPr>
-            <p:ph type="title"/>
-          </p:nvPr>
-        </p:nvSpPr>
-        <p:spPr/>
-        <p:txBody>
-          <a:bodyPr/>
-          <a:lstStyle/>
-          <a:p>
-            <a:r>
-              <a:rPr lang="es-ES" b="1" dirty="0" err="1"/>
-              <a:t>Extensive</a:t>
-            </a:r>
-            <a:r>
-              <a:rPr lang="es-ES" b="1" dirty="0"/>
-              <a:t> Standard Library</a:t>
-            </a:r>
-          </a:p>
-        </p:txBody>
-      </p:sp>
-      <p:sp>
-        <p:nvSpPr>
-          <p:cNvPr id="3" name="Marcador de contenido 2"/>
-          <p:cNvSpPr>
-            <a:spLocks noGrp="1"/>
-          </p:cNvSpPr>
-          <p:nvPr>
-            <p:ph idx="1"/>
-          </p:nvPr>
-        </p:nvSpPr>
-        <p:spPr>
-          <a:xfrm>
-            <a:off x="1141412" y="3256250"/>
-            <a:ext cx="9905999" cy="1555895"/>
-          </a:xfrm>
-        </p:spPr>
-        <p:txBody>
-          <a:bodyPr/>
-          <a:lstStyle/>
-          <a:p>
-            <a:pPr lvl="0"/>
-            <a:r>
-              <a:rPr lang="es-ES" dirty="0"/>
-              <a:t>Java comes </a:t>
-            </a:r>
-            <a:r>
-              <a:rPr lang="es-ES" dirty="0" err="1"/>
-              <a:t>with</a:t>
-            </a:r>
-            <a:r>
-              <a:rPr lang="es-ES" dirty="0"/>
-              <a:t> </a:t>
-            </a:r>
-            <a:r>
-              <a:rPr lang="es-ES" dirty="0" err="1"/>
-              <a:t>an</a:t>
-            </a:r>
-            <a:r>
-              <a:rPr lang="es-ES" dirty="0"/>
-              <a:t> </a:t>
-            </a:r>
-            <a:r>
-              <a:rPr lang="es-ES" dirty="0" err="1"/>
-              <a:t>extensive</a:t>
-            </a:r>
-            <a:r>
-              <a:rPr lang="es-ES" dirty="0"/>
-              <a:t> standard </a:t>
-            </a:r>
-            <a:r>
-              <a:rPr lang="es-ES" dirty="0" err="1"/>
-              <a:t>library</a:t>
-            </a:r>
-            <a:r>
-              <a:rPr lang="es-ES" dirty="0"/>
-              <a:t> </a:t>
-            </a:r>
-            <a:r>
-              <a:rPr lang="es-ES" dirty="0" err="1"/>
-              <a:t>that</a:t>
-            </a:r>
-            <a:r>
-              <a:rPr lang="es-ES" dirty="0"/>
-              <a:t> </a:t>
-            </a:r>
-            <a:r>
-              <a:rPr lang="es-ES" dirty="0" err="1"/>
-              <a:t>provides</a:t>
-            </a:r>
-            <a:r>
-              <a:rPr lang="es-ES" dirty="0"/>
-              <a:t> </a:t>
-            </a:r>
-            <a:r>
-              <a:rPr lang="es-ES" dirty="0" err="1"/>
-              <a:t>classes</a:t>
-            </a:r>
-            <a:r>
-              <a:rPr lang="es-ES" dirty="0"/>
-              <a:t> and </a:t>
-            </a:r>
-            <a:r>
-              <a:rPr lang="es-ES" dirty="0" err="1"/>
-              <a:t>methods</a:t>
-            </a:r>
-            <a:r>
-              <a:rPr lang="es-ES" dirty="0"/>
-              <a:t> </a:t>
-            </a:r>
-            <a:r>
-              <a:rPr lang="es-ES" dirty="0" err="1"/>
-              <a:t>for</a:t>
-            </a:r>
-            <a:r>
-              <a:rPr lang="es-ES" dirty="0"/>
-              <a:t> </a:t>
-            </a:r>
-            <a:r>
-              <a:rPr lang="es-ES" dirty="0" err="1"/>
-              <a:t>various</a:t>
-            </a:r>
-            <a:r>
-              <a:rPr lang="es-ES" dirty="0"/>
-              <a:t> </a:t>
-            </a:r>
-            <a:r>
-              <a:rPr lang="es-ES" dirty="0" err="1"/>
-              <a:t>tasks</a:t>
-            </a:r>
-            <a:r>
-              <a:rPr lang="es-ES" dirty="0"/>
-              <a:t>, </a:t>
-            </a:r>
-            <a:r>
-              <a:rPr lang="es-ES" dirty="0" err="1"/>
-              <a:t>from</a:t>
-            </a:r>
-            <a:r>
-              <a:rPr lang="es-ES" dirty="0"/>
-              <a:t> </a:t>
-            </a:r>
-            <a:r>
-              <a:rPr lang="es-ES" dirty="0" err="1"/>
-              <a:t>string</a:t>
-            </a:r>
-            <a:r>
-              <a:rPr lang="es-ES" dirty="0"/>
-              <a:t> </a:t>
-            </a:r>
-            <a:r>
-              <a:rPr lang="es-ES" dirty="0" err="1"/>
-              <a:t>manipulation</a:t>
-            </a:r>
-            <a:r>
-              <a:rPr lang="es-ES" dirty="0"/>
-              <a:t> </a:t>
-            </a:r>
-            <a:r>
-              <a:rPr lang="es-ES" dirty="0" err="1"/>
-              <a:t>to</a:t>
-            </a:r>
-            <a:r>
-              <a:rPr lang="es-ES" dirty="0"/>
-              <a:t> </a:t>
-            </a:r>
-            <a:r>
-              <a:rPr lang="es-ES" dirty="0" err="1"/>
-              <a:t>network</a:t>
-            </a:r>
-            <a:r>
-              <a:rPr lang="es-ES" dirty="0"/>
-              <a:t> </a:t>
-            </a:r>
-            <a:r>
-              <a:rPr lang="es-ES" dirty="0" err="1"/>
-              <a:t>operations</a:t>
-            </a:r>
-            <a:r>
-              <a:rPr lang="es-ES" dirty="0"/>
-              <a:t>.</a:t>
-            </a:r>
-          </a:p>
-          <a:p>
-            <a:endParaRPr lang="es-ES" dirty="0"/>
-          </a:p>
-        </p:txBody>
-      </p:sp>
-      <p:pic>
-        <p:nvPicPr>
-          <p:cNvPr id="5" name="Imagen 4" descr="Imagen digital de un librero&#10;&#10;Descripción generada automáticamente con confianza media">
-            <a:extLst>
-              <a:ext uri="{FF2B5EF4-FFF2-40B4-BE49-F238E27FC236}">
-                <a16:creationId xmlns:a16="http://schemas.microsoft.com/office/drawing/2014/main" id="{FB8DC255-75CB-860B-C69C-26E32A531808}"/>
-              </a:ext>
-            </a:extLst>
-          </p:cNvPr>
-          <p:cNvPicPr>
-            <a:picLocks noChangeAspect="1"/>
-          </p:cNvPicPr>
-          <p:nvPr/>
-        </p:nvPicPr>
-        <p:blipFill rotWithShape="1">
-          <a:blip r:embed="rId2"/>
-          <a:srcRect l="31117" t="4861" r="19550" b="28472"/>
-          <a:stretch/>
-        </p:blipFill>
-        <p:spPr>
-          <a:xfrm>
-            <a:off x="8496300" y="514350"/>
-            <a:ext cx="2157651" cy="1943100"/>
-          </a:xfrm>
-          <a:prstGeom prst="rect">
-            <a:avLst/>
-          </a:prstGeom>
-        </p:spPr>
-      </p:pic>
-    </p:spTree>
-    <p:extLst>
-      <p:ext uri="{BB962C8B-B14F-4D97-AF65-F5344CB8AC3E}">
-        <p14:creationId xmlns:p14="http://schemas.microsoft.com/office/powerpoint/2010/main" val="1712957340"/>
-      </p:ext>
-    </p:extLst>
-  </p:cSld>
-  <p:clrMapOvr>
-    <a:masterClrMapping/>
-  </p:clrMapOvr>
-</p:sld>
-</file>
-
 <file path=ppt/slides/slide7.xml><?xml version="1.0" encoding="utf-8"?>
 <p:sld xmlns:a="http://schemas.openxmlformats.org/drawingml/2006/main" xmlns:r="http://schemas.openxmlformats.org/officeDocument/2006/relationships" xmlns:p="http://schemas.openxmlformats.org/presentationml/2006/main">
   <p:cSld>
@@ -18320,94 +18676,43 @@
             <p:ph type="title"/>
           </p:nvPr>
         </p:nvSpPr>
-        <p:spPr/>
+        <p:spPr>
+          <a:xfrm>
+            <a:off x="947451" y="618518"/>
+            <a:ext cx="10764260" cy="1478570"/>
+          </a:xfrm>
+        </p:spPr>
         <p:txBody>
           <a:bodyPr/>
           <a:lstStyle/>
           <a:p>
             <a:r>
+              <a:rPr lang="es-ES" b="1" dirty="0" err="1"/>
+              <a:t>Memory</a:t>
+            </a:r>
+            <a:r>
               <a:rPr lang="es-ES" b="1" dirty="0"/>
-              <a:t>JAVA EE and se </a:t>
+              <a:t> </a:t>
             </a:r>
             <a:r>
               <a:rPr lang="es-ES" b="1" dirty="0" err="1"/>
-              <a:t>platform</a:t>
-            </a:r>
-            <a:endParaRPr lang="es-ES" b="1" dirty="0"/>
-          </a:p>
-        </p:txBody>
-      </p:sp>
-      <p:sp>
-        <p:nvSpPr>
-          <p:cNvPr id="3" name="Marcador de contenido 2"/>
-          <p:cNvSpPr>
-            <a:spLocks noGrp="1"/>
-          </p:cNvSpPr>
-          <p:nvPr>
-            <p:ph idx="1"/>
-          </p:nvPr>
-        </p:nvSpPr>
-        <p:spPr/>
-        <p:txBody>
-          <a:bodyPr/>
-          <a:lstStyle/>
-          <a:p>
-            <a:endParaRPr lang="es-ES"/>
-          </a:p>
-        </p:txBody>
-      </p:sp>
-    </p:spTree>
-    <p:extLst>
-      <p:ext uri="{BB962C8B-B14F-4D97-AF65-F5344CB8AC3E}">
-        <p14:creationId xmlns:p14="http://schemas.microsoft.com/office/powerpoint/2010/main" val="2771062716"/>
-      </p:ext>
-    </p:extLst>
-  </p:cSld>
-  <p:clrMapOvr>
-    <a:masterClrMapping/>
-  </p:clrMapOvr>
-</p:sld>
-</file>
-
-<file path=ppt/slides/slide8.xml><?xml version="1.0" encoding="utf-8"?>
-<p:sld xmlns:a="http://schemas.openxmlformats.org/drawingml/2006/main" xmlns:r="http://schemas.openxmlformats.org/officeDocument/2006/relationships" xmlns:p="http://schemas.openxmlformats.org/presentationml/2006/main">
-  <p:cSld>
-    <p:spTree>
-      <p:nvGrpSpPr>
-        <p:cNvPr id="1" name=""/>
-        <p:cNvGrpSpPr/>
-        <p:nvPr/>
-      </p:nvGrpSpPr>
-      <p:grpSpPr>
-        <a:xfrm>
-          <a:off x="0" y="0"/>
-          <a:ext cx="0" cy="0"/>
-          <a:chOff x="0" y="0"/>
-          <a:chExt cx="0" cy="0"/>
-        </a:xfrm>
-      </p:grpSpPr>
-      <p:sp>
-        <p:nvSpPr>
-          <p:cNvPr id="2" name="Título 1"/>
-          <p:cNvSpPr>
-            <a:spLocks noGrp="1"/>
-          </p:cNvSpPr>
-          <p:nvPr>
-            <p:ph type="title"/>
-          </p:nvPr>
-        </p:nvSpPr>
-        <p:spPr/>
-        <p:txBody>
-          <a:bodyPr/>
-          <a:lstStyle/>
-          <a:p>
+              <a:t>management</a:t>
+            </a:r>
             <a:r>
               <a:rPr lang="es-ES" b="1" dirty="0"/>
-              <a:t>Java </a:t>
+              <a:t> and </a:t>
             </a:r>
             <a:r>
               <a:rPr lang="es-ES" b="1" dirty="0" err="1"/>
-              <a:t>curiosities</a:t>
+              <a:t>garbaje</a:t>
+            </a:r>
+            <a:r>
+              <a:rPr lang="es-ES" b="1" dirty="0"/>
+              <a:t> </a:t>
+            </a:r>
+            <a:r>
+              <a:rPr lang="es-ES" b="1" dirty="0" err="1"/>
+              <a:t>collection</a:t>
             </a:r>
             <a:endParaRPr lang="es-ES" b="1" dirty="0"/>
           </a:p>
@@ -18425,153 +18730,28 @@
         </p:nvSpPr>
         <p:spPr>
           <a:xfrm>
-            <a:off x="559520" y="2729778"/>
-            <a:ext cx="6155315" cy="3541714"/>
+            <a:off x="1087582" y="2082664"/>
+            <a:ext cx="9905999" cy="1251095"/>
           </a:xfrm>
         </p:spPr>
         <p:txBody>
-          <a:bodyPr>
-            <a:normAutofit/>
-          </a:bodyPr>
+          <a:bodyPr/>
           <a:lstStyle/>
           <a:p>
-            <a:r>
-              <a:rPr lang="en-US" b="1" dirty="0"/>
-              <a:t>Origin of the Name:</a:t>
-            </a:r>
+            <a:pPr marL="0" indent="0">
+              <a:buNone/>
+            </a:pPr>
             <a:r>
               <a:rPr lang="en-US" dirty="0"/>
-              <a:t> Java got its name from coffee. </a:t>
-            </a:r>
-          </a:p>
-          <a:p>
-            <a:endParaRPr lang="en-US" dirty="0"/>
-          </a:p>
-          <a:p>
-            <a:r>
-              <a:rPr lang="es-ES" sz="2400" dirty="0" err="1">
-                <a:solidFill>
-                  <a:srgbClr val="FFFFFF"/>
-                </a:solidFill>
-              </a:rPr>
-              <a:t>It</a:t>
-            </a:r>
-            <a:r>
-              <a:rPr lang="es-ES" sz="2400" dirty="0">
-                <a:solidFill>
-                  <a:srgbClr val="FFFFFF"/>
-                </a:solidFill>
-              </a:rPr>
-              <a:t> </a:t>
-            </a:r>
-            <a:r>
-              <a:rPr lang="es-ES" sz="2400" dirty="0" err="1">
-                <a:solidFill>
-                  <a:srgbClr val="FFFFFF"/>
-                </a:solidFill>
-              </a:rPr>
-              <a:t>was</a:t>
-            </a:r>
-            <a:r>
-              <a:rPr lang="es-ES" sz="2400" dirty="0">
-                <a:solidFill>
-                  <a:srgbClr val="FFFFFF"/>
-                </a:solidFill>
-              </a:rPr>
-              <a:t> </a:t>
-            </a:r>
-            <a:r>
-              <a:rPr lang="es-ES" sz="2400" dirty="0" err="1">
-                <a:solidFill>
-                  <a:srgbClr val="FFFFFF"/>
-                </a:solidFill>
-              </a:rPr>
-              <a:t>designed</a:t>
-            </a:r>
-            <a:r>
-              <a:rPr lang="es-ES" sz="2400" dirty="0">
-                <a:solidFill>
-                  <a:srgbClr val="FFFFFF"/>
-                </a:solidFill>
-              </a:rPr>
-              <a:t> </a:t>
-            </a:r>
-            <a:r>
-              <a:rPr lang="es-ES" sz="2400" dirty="0" err="1">
-                <a:solidFill>
-                  <a:srgbClr val="FFFFFF"/>
-                </a:solidFill>
-              </a:rPr>
-              <a:t>to</a:t>
-            </a:r>
-            <a:r>
-              <a:rPr lang="es-ES" sz="2400" dirty="0">
-                <a:solidFill>
-                  <a:srgbClr val="FFFFFF"/>
-                </a:solidFill>
-              </a:rPr>
-              <a:t> </a:t>
-            </a:r>
-            <a:r>
-              <a:rPr lang="es-ES" sz="2400" dirty="0" err="1">
-                <a:solidFill>
-                  <a:srgbClr val="FFFFFF"/>
-                </a:solidFill>
-              </a:rPr>
-              <a:t>programm</a:t>
-            </a:r>
-            <a:r>
-              <a:rPr lang="es-ES" sz="2400" dirty="0">
-                <a:solidFill>
-                  <a:srgbClr val="FFFFFF"/>
-                </a:solidFill>
-              </a:rPr>
-              <a:t> </a:t>
-            </a:r>
-            <a:r>
-              <a:rPr lang="es-ES" sz="2400" dirty="0" err="1">
-                <a:solidFill>
-                  <a:srgbClr val="FFFFFF"/>
-                </a:solidFill>
-              </a:rPr>
-              <a:t>smart</a:t>
-            </a:r>
-            <a:r>
-              <a:rPr lang="es-ES" sz="2400" dirty="0">
-                <a:solidFill>
-                  <a:srgbClr val="FFFFFF"/>
-                </a:solidFill>
-              </a:rPr>
-              <a:t> </a:t>
-            </a:r>
-            <a:r>
-              <a:rPr lang="es-ES" sz="2400" dirty="0" err="1">
-                <a:solidFill>
-                  <a:srgbClr val="FFFFFF"/>
-                </a:solidFill>
-              </a:rPr>
-              <a:t>TVs</a:t>
-            </a:r>
-            <a:endParaRPr lang="es-ES" sz="2400" dirty="0">
-              <a:solidFill>
-                <a:srgbClr val="FFFFFF"/>
-              </a:solidFill>
-            </a:endParaRPr>
-          </a:p>
-          <a:p>
-            <a:endParaRPr lang="en-US" dirty="0"/>
+              <a:t>Java uses a garbage collector, whose main advantages are:</a:t>
+            </a:r>
+            <a:endParaRPr lang="es-ES" dirty="0"/>
           </a:p>
         </p:txBody>
       </p:sp>
       <p:pic>
         <p:nvPicPr>
-          <p:cNvPr id="4" name="Imagen 3">
-            <a:extLst>
-              <a:ext uri="{FF2B5EF4-FFF2-40B4-BE49-F238E27FC236}">
-                <a16:creationId xmlns:a16="http://schemas.microsoft.com/office/drawing/2014/main" id="{1EDE7C66-DD77-CF46-9BD3-E2B600D645ED}"/>
-              </a:ext>
-            </a:extLst>
-          </p:cNvPr>
+          <p:cNvPr id="4" name="Imagen 3"/>
           <p:cNvPicPr>
             <a:picLocks noChangeAspect="1"/>
           </p:cNvPicPr>
@@ -18585,18 +18765,82 @@
         </p:blipFill>
         <p:spPr>
           <a:xfrm>
-            <a:off x="8134350" y="1466913"/>
-            <a:ext cx="2517179" cy="3277766"/>
+            <a:off x="1385454" y="2077442"/>
+            <a:ext cx="4655128" cy="4655128"/>
           </a:xfrm>
           <a:prstGeom prst="rect">
             <a:avLst/>
           </a:prstGeom>
         </p:spPr>
       </p:pic>
+      <p:sp>
+        <p:nvSpPr>
+          <p:cNvPr id="5" name="Rectángulo 4"/>
+          <p:cNvSpPr/>
+          <p:nvPr/>
+        </p:nvSpPr>
+        <p:spPr>
+          <a:xfrm>
+            <a:off x="6626907" y="2954898"/>
+            <a:ext cx="4506805" cy="1775614"/>
+          </a:xfrm>
+          <a:prstGeom prst="rect">
+            <a:avLst/>
+          </a:prstGeom>
+        </p:spPr>
+        <p:txBody>
+          <a:bodyPr wrap="square">
+            <a:spAutoFit/>
+          </a:bodyPr>
+          <a:lstStyle/>
+          <a:p>
+            <a:pPr marL="342900" indent="-342900">
+              <a:lnSpc>
+                <a:spcPct val="107000"/>
+              </a:lnSpc>
+              <a:spcAft>
+                <a:spcPts val="800"/>
+              </a:spcAft>
+              <a:buFont typeface="Arial" panose="020B0604020202020204" pitchFamily="34" charset="0"/>
+              <a:buChar char="•"/>
+            </a:pPr>
+            <a:r>
+              <a:rPr lang="en-US" sz="2400" dirty="0" smtClean="0"/>
+              <a:t>Automatic </a:t>
+            </a:r>
+            <a:r>
+              <a:rPr lang="en-US" sz="2400" dirty="0"/>
+              <a:t>removal of unused memory. </a:t>
+            </a:r>
+            <a:endParaRPr lang="en-US" sz="2400" dirty="0" smtClean="0"/>
+          </a:p>
+          <a:p>
+            <a:pPr marL="342900" indent="-342900">
+              <a:lnSpc>
+                <a:spcPct val="107000"/>
+              </a:lnSpc>
+              <a:spcAft>
+                <a:spcPts val="800"/>
+              </a:spcAft>
+              <a:buFont typeface="Arial" panose="020B0604020202020204" pitchFamily="34" charset="0"/>
+              <a:buChar char="•"/>
+            </a:pPr>
+            <a:r>
+              <a:rPr lang="en-US" sz="2400" dirty="0" smtClean="0"/>
+              <a:t>Improves </a:t>
+            </a:r>
+            <a:r>
+              <a:rPr lang="en-US" sz="2400" dirty="0"/>
+              <a:t>productivity and prevents memory leaks.</a:t>
+            </a:r>
+            <a:endParaRPr lang="es-ES" sz="2400" dirty="0"/>
+          </a:p>
+        </p:txBody>
+      </p:sp>
     </p:spTree>
     <p:extLst>
       <p:ext uri="{BB962C8B-B14F-4D97-AF65-F5344CB8AC3E}">
-        <p14:creationId xmlns:p14="http://schemas.microsoft.com/office/powerpoint/2010/main" val="1996059269"/>
+        <p14:creationId xmlns:p14="http://schemas.microsoft.com/office/powerpoint/2010/main" val="528157625"/>
       </p:ext>
     </p:extLst>
   </p:cSld>
@@ -18606,7 +18850,7 @@
 </p:sld>
 </file>
 
-<file path=ppt/slides/slide9.xml><?xml version="1.0" encoding="utf-8"?>
+<file path=ppt/slides/slide8.xml><?xml version="1.0" encoding="utf-8"?>
 <p:sld xmlns:a="http://schemas.openxmlformats.org/drawingml/2006/main" xmlns:r="http://schemas.openxmlformats.org/officeDocument/2006/relationships" xmlns:p="http://schemas.openxmlformats.org/presentationml/2006/main">
   <p:cSld>
     <p:spTree>
@@ -19165,6 +19409,496 @@
     <p:extLst>
       <p:ext uri="{BB962C8B-B14F-4D97-AF65-F5344CB8AC3E}">
         <p14:creationId xmlns:p14="http://schemas.microsoft.com/office/powerpoint/2010/main" val="4204374602"/>
+      </p:ext>
+    </p:extLst>
+  </p:cSld>
+  <p:clrMapOvr>
+    <a:masterClrMapping/>
+  </p:clrMapOvr>
+</p:sld>
+</file>
+
+<file path=ppt/slides/slide9.xml><?xml version="1.0" encoding="utf-8"?>
+<p:sld xmlns:a="http://schemas.openxmlformats.org/drawingml/2006/main" xmlns:r="http://schemas.openxmlformats.org/officeDocument/2006/relationships" xmlns:p="http://schemas.openxmlformats.org/presentationml/2006/main">
+  <p:cSld>
+    <p:spTree>
+      <p:nvGrpSpPr>
+        <p:cNvPr id="1" name=""/>
+        <p:cNvGrpSpPr/>
+        <p:nvPr/>
+      </p:nvGrpSpPr>
+      <p:grpSpPr>
+        <a:xfrm>
+          <a:off x="0" y="0"/>
+          <a:ext cx="0" cy="0"/>
+          <a:chOff x="0" y="0"/>
+          <a:chExt cx="0" cy="0"/>
+        </a:xfrm>
+      </p:grpSpPr>
+      <p:sp>
+        <p:nvSpPr>
+          <p:cNvPr id="10" name="Rectángulo redondeado 9"/>
+          <p:cNvSpPr/>
+          <p:nvPr/>
+        </p:nvSpPr>
+        <p:spPr>
+          <a:xfrm>
+            <a:off x="2598420" y="3852176"/>
+            <a:ext cx="5467350" cy="1924050"/>
+          </a:xfrm>
+          <a:prstGeom prst="roundRect">
+            <a:avLst>
+              <a:gd name="adj" fmla="val 4291"/>
+            </a:avLst>
+          </a:prstGeom>
+          <a:solidFill>
+            <a:srgbClr val="FEFEFE"/>
+          </a:solidFill>
+          <a:ln>
+            <a:noFill/>
+          </a:ln>
+        </p:spPr>
+        <p:style>
+          <a:lnRef idx="2">
+            <a:schemeClr val="accent1">
+              <a:shade val="50000"/>
+            </a:schemeClr>
+          </a:lnRef>
+          <a:fillRef idx="1">
+            <a:schemeClr val="accent1"/>
+          </a:fillRef>
+          <a:effectRef idx="0">
+            <a:schemeClr val="accent1"/>
+          </a:effectRef>
+          <a:fontRef idx="minor">
+            <a:schemeClr val="lt1"/>
+          </a:fontRef>
+        </p:style>
+        <p:txBody>
+          <a:bodyPr rtlCol="0" anchor="ctr"/>
+          <a:lstStyle/>
+          <a:p>
+            <a:pPr algn="ctr"/>
+            <a:endParaRPr lang="es-ES"/>
+          </a:p>
+        </p:txBody>
+      </p:sp>
+      <p:sp>
+        <p:nvSpPr>
+          <p:cNvPr id="8" name="Rectángulo redondeado 7"/>
+          <p:cNvSpPr/>
+          <p:nvPr/>
+        </p:nvSpPr>
+        <p:spPr>
+          <a:xfrm>
+            <a:off x="2299340" y="369496"/>
+            <a:ext cx="5206360" cy="437878"/>
+          </a:xfrm>
+          <a:prstGeom prst="roundRect">
+            <a:avLst>
+              <a:gd name="adj" fmla="val 10141"/>
+            </a:avLst>
+          </a:prstGeom>
+          <a:solidFill>
+            <a:schemeClr val="bg1">
+              <a:lumMod val="75000"/>
+              <a:lumOff val="25000"/>
+            </a:schemeClr>
+          </a:solidFill>
+          <a:ln>
+            <a:noFill/>
+          </a:ln>
+        </p:spPr>
+        <p:style>
+          <a:lnRef idx="2">
+            <a:schemeClr val="accent1">
+              <a:shade val="50000"/>
+            </a:schemeClr>
+          </a:lnRef>
+          <a:fillRef idx="1">
+            <a:schemeClr val="accent1"/>
+          </a:fillRef>
+          <a:effectRef idx="0">
+            <a:schemeClr val="accent1"/>
+          </a:effectRef>
+          <a:fontRef idx="minor">
+            <a:schemeClr val="lt1"/>
+          </a:fontRef>
+        </p:style>
+        <p:txBody>
+          <a:bodyPr rtlCol="0" anchor="ctr"/>
+          <a:lstStyle/>
+          <a:p>
+            <a:pPr algn="ctr"/>
+            <a:endParaRPr lang="es-ES"/>
+          </a:p>
+        </p:txBody>
+      </p:sp>
+      <p:sp>
+        <p:nvSpPr>
+          <p:cNvPr id="4" name="CuadroTexto 3"/>
+          <p:cNvSpPr txBox="1"/>
+          <p:nvPr/>
+        </p:nvSpPr>
+        <p:spPr>
+          <a:xfrm>
+            <a:off x="2299340" y="388380"/>
+            <a:ext cx="5206360" cy="400110"/>
+          </a:xfrm>
+          <a:prstGeom prst="rect">
+            <a:avLst/>
+          </a:prstGeom>
+          <a:noFill/>
+        </p:spPr>
+        <p:txBody>
+          <a:bodyPr wrap="square" rtlCol="0">
+            <a:spAutoFit/>
+          </a:bodyPr>
+          <a:lstStyle/>
+          <a:p>
+            <a:r>
+              <a:rPr lang="es-ES" sz="2000" b="1" dirty="0" err="1"/>
+              <a:t>Develop</a:t>
+            </a:r>
+            <a:r>
+              <a:rPr lang="es-ES" sz="2000" b="1" dirty="0"/>
+              <a:t> </a:t>
+            </a:r>
+            <a:r>
+              <a:rPr lang="es-ES" sz="2000" b="1" dirty="0" err="1"/>
+              <a:t>applications</a:t>
+            </a:r>
+            <a:r>
+              <a:rPr lang="es-ES" sz="2000" b="1" dirty="0"/>
+              <a:t> more </a:t>
+            </a:r>
+            <a:r>
+              <a:rPr lang="es-ES" sz="2000" b="1" dirty="0" err="1"/>
+              <a:t>robust</a:t>
+            </a:r>
+            <a:r>
+              <a:rPr lang="es-ES" sz="2000" b="1" dirty="0"/>
+              <a:t> and </a:t>
+            </a:r>
+            <a:r>
+              <a:rPr lang="es-ES" sz="2000" b="1" dirty="0" err="1"/>
+              <a:t>scalable</a:t>
+            </a:r>
+            <a:endParaRPr lang="es-ES" sz="2000" b="1" dirty="0"/>
+          </a:p>
+        </p:txBody>
+      </p:sp>
+      <p:sp>
+        <p:nvSpPr>
+          <p:cNvPr id="5" name="CuadroTexto 4"/>
+          <p:cNvSpPr txBox="1"/>
+          <p:nvPr/>
+        </p:nvSpPr>
+        <p:spPr>
+          <a:xfrm>
+            <a:off x="2192655" y="1120470"/>
+            <a:ext cx="6278880" cy="923330"/>
+          </a:xfrm>
+          <a:prstGeom prst="rect">
+            <a:avLst/>
+          </a:prstGeom>
+          <a:noFill/>
+        </p:spPr>
+        <p:txBody>
+          <a:bodyPr wrap="square" rtlCol="0">
+            <a:spAutoFit/>
+          </a:bodyPr>
+          <a:lstStyle/>
+          <a:p>
+            <a:r>
+              <a:rPr lang="es-ES" b="1" dirty="0" err="1"/>
+              <a:t>Robust</a:t>
+            </a:r>
+            <a:r>
+              <a:rPr lang="es-ES" b="1" dirty="0"/>
+              <a:t>: </a:t>
+            </a:r>
+            <a:r>
+              <a:rPr lang="es-ES" dirty="0" err="1"/>
+              <a:t>Because</a:t>
+            </a:r>
+            <a:r>
+              <a:rPr lang="es-ES" dirty="0"/>
+              <a:t> </a:t>
+            </a:r>
+            <a:r>
+              <a:rPr lang="es-ES" b="1" dirty="0"/>
+              <a:t>Java</a:t>
+            </a:r>
+            <a:r>
+              <a:rPr lang="es-ES" dirty="0"/>
+              <a:t> </a:t>
+            </a:r>
+            <a:r>
+              <a:rPr lang="es-ES" b="1" dirty="0" err="1"/>
+              <a:t>memory</a:t>
+            </a:r>
+            <a:r>
+              <a:rPr lang="es-ES" dirty="0"/>
+              <a:t> </a:t>
+            </a:r>
+            <a:r>
+              <a:rPr lang="es-ES" b="1" dirty="0" err="1"/>
+              <a:t>management</a:t>
+            </a:r>
+            <a:r>
+              <a:rPr lang="es-ES" dirty="0"/>
+              <a:t> </a:t>
+            </a:r>
+            <a:r>
+              <a:rPr lang="es-ES" dirty="0" err="1"/>
+              <a:t>is</a:t>
+            </a:r>
+            <a:r>
+              <a:rPr lang="es-ES" dirty="0"/>
+              <a:t> </a:t>
+            </a:r>
+            <a:r>
+              <a:rPr lang="es-ES" dirty="0" err="1"/>
+              <a:t>very</a:t>
+            </a:r>
+            <a:r>
+              <a:rPr lang="es-ES" dirty="0"/>
+              <a:t> </a:t>
+            </a:r>
+            <a:r>
+              <a:rPr lang="es-ES" dirty="0" err="1"/>
+              <a:t>good</a:t>
+            </a:r>
+            <a:r>
+              <a:rPr lang="es-ES" dirty="0"/>
+              <a:t>, he </a:t>
+            </a:r>
+            <a:r>
+              <a:rPr lang="es-ES" dirty="0" err="1"/>
+              <a:t>know</a:t>
+            </a:r>
+            <a:r>
+              <a:rPr lang="es-ES" dirty="0"/>
+              <a:t> </a:t>
+            </a:r>
+            <a:r>
+              <a:rPr lang="es-ES" dirty="0" err="1"/>
+              <a:t>when</a:t>
+            </a:r>
+            <a:r>
+              <a:rPr lang="es-ES" dirty="0"/>
+              <a:t> to free </a:t>
+            </a:r>
+            <a:r>
+              <a:rPr lang="es-ES" dirty="0" err="1"/>
+              <a:t>memory</a:t>
+            </a:r>
+            <a:r>
+              <a:rPr lang="es-ES" dirty="0"/>
+              <a:t> and he do </a:t>
+            </a:r>
+            <a:r>
+              <a:rPr lang="es-ES" b="1" dirty="0" err="1"/>
+              <a:t>automatically</a:t>
+            </a:r>
+            <a:r>
+              <a:rPr lang="es-ES" dirty="0"/>
+              <a:t>, </a:t>
+            </a:r>
+            <a:r>
+              <a:rPr lang="es-ES" dirty="0" err="1"/>
+              <a:t>this</a:t>
+            </a:r>
+            <a:r>
+              <a:rPr lang="es-ES" dirty="0"/>
+              <a:t> </a:t>
+            </a:r>
+            <a:r>
+              <a:rPr lang="es-ES" dirty="0" err="1"/>
+              <a:t>makes</a:t>
+            </a:r>
+            <a:r>
+              <a:rPr lang="es-ES" dirty="0"/>
+              <a:t> Java </a:t>
+            </a:r>
+            <a:r>
+              <a:rPr lang="es-ES" dirty="0" err="1"/>
+              <a:t>very</a:t>
+            </a:r>
+            <a:r>
+              <a:rPr lang="es-ES" dirty="0"/>
+              <a:t> </a:t>
+            </a:r>
+            <a:r>
+              <a:rPr lang="es-ES" dirty="0" err="1"/>
+              <a:t>efficient</a:t>
+            </a:r>
+            <a:r>
+              <a:rPr lang="es-ES" dirty="0"/>
+              <a:t>.</a:t>
+            </a:r>
+          </a:p>
+        </p:txBody>
+      </p:sp>
+      <p:sp>
+        <p:nvSpPr>
+          <p:cNvPr id="6" name="CuadroTexto 5"/>
+          <p:cNvSpPr txBox="1"/>
+          <p:nvPr/>
+        </p:nvSpPr>
+        <p:spPr>
+          <a:xfrm>
+            <a:off x="2192655" y="2757269"/>
+            <a:ext cx="5113020" cy="646331"/>
+          </a:xfrm>
+          <a:prstGeom prst="rect">
+            <a:avLst/>
+          </a:prstGeom>
+          <a:noFill/>
+        </p:spPr>
+        <p:txBody>
+          <a:bodyPr wrap="square" rtlCol="0">
+            <a:spAutoFit/>
+          </a:bodyPr>
+          <a:lstStyle/>
+          <a:p>
+            <a:r>
+              <a:rPr lang="es-ES" b="1" dirty="0" err="1"/>
+              <a:t>Scalable</a:t>
+            </a:r>
+            <a:r>
+              <a:rPr lang="es-ES" b="1" dirty="0"/>
+              <a:t>: </a:t>
+            </a:r>
+            <a:r>
+              <a:rPr lang="es-ES" dirty="0"/>
+              <a:t>Java can control </a:t>
+            </a:r>
+            <a:r>
+              <a:rPr lang="es-ES" dirty="0" err="1"/>
+              <a:t>big</a:t>
+            </a:r>
+            <a:r>
+              <a:rPr lang="es-ES" dirty="0"/>
+              <a:t> </a:t>
+            </a:r>
+            <a:r>
+              <a:rPr lang="es-ES" dirty="0" err="1"/>
+              <a:t>aplications</a:t>
+            </a:r>
+            <a:r>
+              <a:rPr lang="es-ES" dirty="0"/>
+              <a:t> </a:t>
+            </a:r>
+            <a:r>
+              <a:rPr lang="es-ES" dirty="0" err="1"/>
+              <a:t>easily</a:t>
+            </a:r>
+            <a:r>
+              <a:rPr lang="es-ES" dirty="0"/>
+              <a:t>, </a:t>
+            </a:r>
+            <a:r>
+              <a:rPr lang="es-ES" dirty="0" err="1"/>
+              <a:t>is</a:t>
+            </a:r>
+            <a:r>
+              <a:rPr lang="es-ES" dirty="0"/>
+              <a:t> </a:t>
+            </a:r>
+            <a:r>
+              <a:rPr lang="es-ES" dirty="0" err="1"/>
+              <a:t>for</a:t>
+            </a:r>
+            <a:r>
+              <a:rPr lang="es-ES" dirty="0"/>
+              <a:t> </a:t>
+            </a:r>
+            <a:r>
+              <a:rPr lang="es-ES" dirty="0" err="1"/>
+              <a:t>it</a:t>
+            </a:r>
+            <a:r>
+              <a:rPr lang="es-ES" dirty="0"/>
+              <a:t> Java </a:t>
+            </a:r>
+            <a:r>
+              <a:rPr lang="es-ES" dirty="0" err="1"/>
+              <a:t>is</a:t>
+            </a:r>
+            <a:r>
+              <a:rPr lang="es-ES" dirty="0"/>
+              <a:t> </a:t>
+            </a:r>
+            <a:r>
+              <a:rPr lang="es-ES" dirty="0" err="1"/>
+              <a:t>used</a:t>
+            </a:r>
+            <a:r>
+              <a:rPr lang="es-ES" dirty="0"/>
+              <a:t> to </a:t>
+            </a:r>
+            <a:r>
+              <a:rPr lang="es-ES" dirty="0" err="1"/>
+              <a:t>big</a:t>
+            </a:r>
+            <a:r>
+              <a:rPr lang="es-ES" dirty="0"/>
+              <a:t> </a:t>
+            </a:r>
+            <a:r>
+              <a:rPr lang="es-ES" dirty="0" err="1"/>
+              <a:t>companies</a:t>
+            </a:r>
+            <a:r>
+              <a:rPr lang="es-ES" dirty="0"/>
+              <a:t> in </a:t>
+            </a:r>
+            <a:r>
+              <a:rPr lang="es-ES" dirty="0" err="1"/>
+              <a:t>her</a:t>
+            </a:r>
+            <a:r>
+              <a:rPr lang="es-ES" dirty="0"/>
+              <a:t> </a:t>
+            </a:r>
+            <a:r>
+              <a:rPr lang="es-ES" dirty="0" err="1"/>
+              <a:t>aplications</a:t>
+            </a:r>
+            <a:endParaRPr lang="es-ES" dirty="0"/>
+          </a:p>
+        </p:txBody>
+      </p:sp>
+      <p:pic>
+        <p:nvPicPr>
+          <p:cNvPr id="9" name="Imagen 8"/>
+          <p:cNvPicPr>
+            <a:picLocks noChangeAspect="1"/>
+          </p:cNvPicPr>
+          <p:nvPr/>
+        </p:nvPicPr>
+        <p:blipFill>
+          <a:blip r:embed="rId2"/>
+          <a:stretch>
+            <a:fillRect/>
+          </a:stretch>
+        </p:blipFill>
+        <p:spPr>
+          <a:xfrm>
+            <a:off x="2759305" y="4037600"/>
+            <a:ext cx="5145579" cy="1699930"/>
+          </a:xfrm>
+          <a:prstGeom prst="rect">
+            <a:avLst/>
+          </a:prstGeom>
+        </p:spPr>
+      </p:pic>
+    </p:spTree>
+    <p:extLst>
+      <p:ext uri="{BB962C8B-B14F-4D97-AF65-F5344CB8AC3E}">
+        <p14:creationId xmlns:p14="http://schemas.microsoft.com/office/powerpoint/2010/main" val="1586887626"/>
       </p:ext>
     </p:extLst>
   </p:cSld>

</xml_diff>